<commit_message>
Presentation & report update
</commit_message>
<xml_diff>
--- a/S2 Project Report/1st Project Report Presentation.pptx
+++ b/S2 Project Report/1st Project Report Presentation.pptx
@@ -28,13 +28,13 @@
     <p:sldId id="265" r:id="rId16"/>
     <p:sldId id="271" r:id="rId17"/>
     <p:sldId id="266" r:id="rId18"/>
-    <p:sldId id="272" r:id="rId19"/>
-    <p:sldId id="258" r:id="rId20"/>
-    <p:sldId id="275" r:id="rId21"/>
-    <p:sldId id="273" r:id="rId22"/>
-    <p:sldId id="274" r:id="rId23"/>
-    <p:sldId id="261" r:id="rId24"/>
-    <p:sldId id="263" r:id="rId25"/>
+    <p:sldId id="281" r:id="rId19"/>
+    <p:sldId id="272" r:id="rId20"/>
+    <p:sldId id="258" r:id="rId21"/>
+    <p:sldId id="275" r:id="rId22"/>
+    <p:sldId id="273" r:id="rId23"/>
+    <p:sldId id="274" r:id="rId24"/>
+    <p:sldId id="261" r:id="rId25"/>
   </p:sldIdLst>
   <p:sldSz cx="12192000" cy="6858000"/>
   <p:notesSz cx="6858000" cy="9144000"/>
@@ -144,6 +144,96 @@
 </p:presentation>
 </file>
 
+<file path=ppt/changesInfos/changesInfo1.xml><?xml version="1.0" encoding="utf-8"?>
+<pc:chgInfo xmlns:a="http://schemas.openxmlformats.org/drawingml/2006/main" xmlns:r="http://schemas.openxmlformats.org/officeDocument/2006/relationships" xmlns:ac="http://schemas.microsoft.com/office/drawing/2013/main/command" xmlns:pc="http://schemas.microsoft.com/office/powerpoint/2013/main/command">
+  <pc:docChgLst>
+    <pc:chgData clId="Web-{453E0E4E-DF11-41DC-99D3-5CAC7E281091}"/>
+    <pc:docChg chg="modSld">
+      <pc:chgData name="" userId="" providerId="" clId="Web-{453E0E4E-DF11-41DC-99D3-5CAC7E281091}" dt="2019-06-18T13:10:30.394" v="28"/>
+      <pc:docMkLst>
+        <pc:docMk/>
+      </pc:docMkLst>
+      <pc:sldChg chg="modSp">
+        <pc:chgData name="" userId="" providerId="" clId="Web-{453E0E4E-DF11-41DC-99D3-5CAC7E281091}" dt="2019-06-18T13:09:16.519" v="1" actId="1076"/>
+        <pc:sldMkLst>
+          <pc:docMk/>
+          <pc:sldMk cId="2533735400" sldId="262"/>
+        </pc:sldMkLst>
+        <pc:grpChg chg="mod">
+          <ac:chgData name="" userId="" providerId="" clId="Web-{453E0E4E-DF11-41DC-99D3-5CAC7E281091}" dt="2019-06-18T13:09:16.519" v="1" actId="1076"/>
+          <ac:grpSpMkLst>
+            <pc:docMk/>
+            <pc:sldMk cId="2533735400" sldId="262"/>
+            <ac:grpSpMk id="7" creationId="{1F90FF1A-7EE3-40C3-920C-220FFA81A4F7}"/>
+          </ac:grpSpMkLst>
+        </pc:grpChg>
+      </pc:sldChg>
+      <pc:sldChg chg="addSp delSp">
+        <pc:chgData name="" userId="" providerId="" clId="Web-{453E0E4E-DF11-41DC-99D3-5CAC7E281091}" dt="2019-06-18T13:10:30.394" v="28"/>
+        <pc:sldMkLst>
+          <pc:docMk/>
+          <pc:sldMk cId="1725295704" sldId="276"/>
+        </pc:sldMkLst>
+        <pc:spChg chg="del">
+          <ac:chgData name="" userId="" providerId="" clId="Web-{453E0E4E-DF11-41DC-99D3-5CAC7E281091}" dt="2019-06-18T13:10:29.894" v="27"/>
+          <ac:spMkLst>
+            <pc:docMk/>
+            <pc:sldMk cId="1725295704" sldId="276"/>
+            <ac:spMk id="4" creationId="{7FAB7C3B-7DEB-4961-BF7A-ECE23484ABD8}"/>
+          </ac:spMkLst>
+        </pc:spChg>
+        <pc:spChg chg="add">
+          <ac:chgData name="" userId="" providerId="" clId="Web-{453E0E4E-DF11-41DC-99D3-5CAC7E281091}" dt="2019-06-18T13:10:30.394" v="28"/>
+          <ac:spMkLst>
+            <pc:docMk/>
+            <pc:sldMk cId="1725295704" sldId="276"/>
+            <ac:spMk id="7" creationId="{F0E4CD0A-EBDB-4D85-B14E-A97722A08A2D}"/>
+          </ac:spMkLst>
+        </pc:spChg>
+      </pc:sldChg>
+      <pc:sldChg chg="modSp">
+        <pc:chgData name="" userId="" providerId="" clId="Web-{453E0E4E-DF11-41DC-99D3-5CAC7E281091}" dt="2019-06-18T13:10:04.550" v="22" actId="1076"/>
+        <pc:sldMkLst>
+          <pc:docMk/>
+          <pc:sldMk cId="482911284" sldId="277"/>
+        </pc:sldMkLst>
+        <pc:spChg chg="mod">
+          <ac:chgData name="" userId="" providerId="" clId="Web-{453E0E4E-DF11-41DC-99D3-5CAC7E281091}" dt="2019-06-18T13:10:04.550" v="22" actId="1076"/>
+          <ac:spMkLst>
+            <pc:docMk/>
+            <pc:sldMk cId="482911284" sldId="277"/>
+            <ac:spMk id="6" creationId="{FE2D5CEA-6B7B-4763-83F7-131DF9E21A11}"/>
+          </ac:spMkLst>
+        </pc:spChg>
+      </pc:sldChg>
+      <pc:sldChg chg="addSp delSp modSp">
+        <pc:chgData name="" userId="" providerId="" clId="Web-{453E0E4E-DF11-41DC-99D3-5CAC7E281091}" dt="2019-06-18T13:10:17.629" v="26" actId="1076"/>
+        <pc:sldMkLst>
+          <pc:docMk/>
+          <pc:sldMk cId="2409107261" sldId="280"/>
+        </pc:sldMkLst>
+        <pc:spChg chg="add mod">
+          <ac:chgData name="" userId="" providerId="" clId="Web-{453E0E4E-DF11-41DC-99D3-5CAC7E281091}" dt="2019-06-18T13:10:17.629" v="26" actId="1076"/>
+          <ac:spMkLst>
+            <pc:docMk/>
+            <pc:sldMk cId="2409107261" sldId="280"/>
+            <ac:spMk id="4" creationId="{9B4D2531-9BAD-495C-9B06-0DBA3E0F43DF}"/>
+          </ac:spMkLst>
+        </pc:spChg>
+        <pc:spChg chg="del">
+          <ac:chgData name="" userId="" providerId="" clId="Web-{453E0E4E-DF11-41DC-99D3-5CAC7E281091}" dt="2019-06-18T13:10:14.003" v="25"/>
+          <ac:spMkLst>
+            <pc:docMk/>
+            <pc:sldMk cId="2409107261" sldId="280"/>
+            <ac:spMk id="6" creationId="{FE2D5CEA-6B7B-4763-83F7-131DF9E21A11}"/>
+          </ac:spMkLst>
+        </pc:spChg>
+      </pc:sldChg>
+    </pc:docChg>
+  </pc:docChgLst>
+</pc:chgInfo>
+</file>
+
 <file path=ppt/diagrams/colors1.xml><?xml version="1.0" encoding="utf-8"?>
 <dgm:colorsDef xmlns:dgm="http://schemas.openxmlformats.org/drawingml/2006/diagram" xmlns:a="http://schemas.openxmlformats.org/drawingml/2006/main" uniqueId="urn:microsoft.com/office/officeart/2005/8/colors/accent1_2">
   <dgm:title val=""/>
@@ -892,6 +982,753 @@
 </file>
 
 <file path=ppt/diagrams/colors2.xml><?xml version="1.0" encoding="utf-8"?>
+<dgm:colorsDef xmlns:dgm="http://schemas.openxmlformats.org/drawingml/2006/diagram" xmlns:a="http://schemas.openxmlformats.org/drawingml/2006/main" uniqueId="urn:microsoft.com/office/officeart/2005/8/colors/accent1_2">
+  <dgm:title val=""/>
+  <dgm:desc val=""/>
+  <dgm:catLst>
+    <dgm:cat type="accent1" pri="11200"/>
+  </dgm:catLst>
+  <dgm:styleLbl name="node0">
+    <dgm:fillClrLst meth="repeat">
+      <a:schemeClr val="accent1"/>
+    </dgm:fillClrLst>
+    <dgm:linClrLst meth="repeat">
+      <a:schemeClr val="lt1"/>
+    </dgm:linClrLst>
+    <dgm:effectClrLst/>
+    <dgm:txLinClrLst/>
+    <dgm:txFillClrLst/>
+    <dgm:txEffectClrLst/>
+  </dgm:styleLbl>
+  <dgm:styleLbl name="alignNode1">
+    <dgm:fillClrLst meth="repeat">
+      <a:schemeClr val="accent1"/>
+    </dgm:fillClrLst>
+    <dgm:linClrLst meth="repeat">
+      <a:schemeClr val="accent1"/>
+    </dgm:linClrLst>
+    <dgm:effectClrLst/>
+    <dgm:txLinClrLst/>
+    <dgm:txFillClrLst/>
+    <dgm:txEffectClrLst/>
+  </dgm:styleLbl>
+  <dgm:styleLbl name="node1">
+    <dgm:fillClrLst meth="repeat">
+      <a:schemeClr val="accent1"/>
+    </dgm:fillClrLst>
+    <dgm:linClrLst meth="repeat">
+      <a:schemeClr val="lt1"/>
+    </dgm:linClrLst>
+    <dgm:effectClrLst/>
+    <dgm:txLinClrLst/>
+    <dgm:txFillClrLst/>
+    <dgm:txEffectClrLst/>
+  </dgm:styleLbl>
+  <dgm:styleLbl name="lnNode1">
+    <dgm:fillClrLst meth="repeat">
+      <a:schemeClr val="accent1"/>
+    </dgm:fillClrLst>
+    <dgm:linClrLst meth="repeat">
+      <a:schemeClr val="lt1"/>
+    </dgm:linClrLst>
+    <dgm:effectClrLst/>
+    <dgm:txLinClrLst/>
+    <dgm:txFillClrLst/>
+    <dgm:txEffectClrLst/>
+  </dgm:styleLbl>
+  <dgm:styleLbl name="vennNode1">
+    <dgm:fillClrLst meth="repeat">
+      <a:schemeClr val="accent1">
+        <a:alpha val="50000"/>
+      </a:schemeClr>
+    </dgm:fillClrLst>
+    <dgm:linClrLst meth="repeat">
+      <a:schemeClr val="lt1"/>
+    </dgm:linClrLst>
+    <dgm:effectClrLst/>
+    <dgm:txLinClrLst/>
+    <dgm:txFillClrLst/>
+    <dgm:txEffectClrLst/>
+  </dgm:styleLbl>
+  <dgm:styleLbl name="node2">
+    <dgm:fillClrLst meth="repeat">
+      <a:schemeClr val="accent1"/>
+    </dgm:fillClrLst>
+    <dgm:linClrLst meth="repeat">
+      <a:schemeClr val="lt1"/>
+    </dgm:linClrLst>
+    <dgm:effectClrLst/>
+    <dgm:txLinClrLst/>
+    <dgm:txFillClrLst/>
+    <dgm:txEffectClrLst/>
+  </dgm:styleLbl>
+  <dgm:styleLbl name="node3">
+    <dgm:fillClrLst meth="repeat">
+      <a:schemeClr val="accent1"/>
+    </dgm:fillClrLst>
+    <dgm:linClrLst meth="repeat">
+      <a:schemeClr val="lt1"/>
+    </dgm:linClrLst>
+    <dgm:effectClrLst/>
+    <dgm:txLinClrLst/>
+    <dgm:txFillClrLst/>
+    <dgm:txEffectClrLst/>
+  </dgm:styleLbl>
+  <dgm:styleLbl name="node4">
+    <dgm:fillClrLst meth="repeat">
+      <a:schemeClr val="accent1"/>
+    </dgm:fillClrLst>
+    <dgm:linClrLst meth="repeat">
+      <a:schemeClr val="lt1"/>
+    </dgm:linClrLst>
+    <dgm:effectClrLst/>
+    <dgm:txLinClrLst/>
+    <dgm:txFillClrLst/>
+    <dgm:txEffectClrLst/>
+  </dgm:styleLbl>
+  <dgm:styleLbl name="fgImgPlace1">
+    <dgm:fillClrLst meth="repeat">
+      <a:schemeClr val="accent1">
+        <a:tint val="50000"/>
+      </a:schemeClr>
+    </dgm:fillClrLst>
+    <dgm:linClrLst meth="repeat">
+      <a:schemeClr val="lt1"/>
+    </dgm:linClrLst>
+    <dgm:effectClrLst/>
+    <dgm:txLinClrLst/>
+    <dgm:txFillClrLst meth="repeat">
+      <a:schemeClr val="lt1"/>
+    </dgm:txFillClrLst>
+    <dgm:txEffectClrLst/>
+  </dgm:styleLbl>
+  <dgm:styleLbl name="alignImgPlace1">
+    <dgm:fillClrLst meth="repeat">
+      <a:schemeClr val="accent1">
+        <a:tint val="50000"/>
+      </a:schemeClr>
+    </dgm:fillClrLst>
+    <dgm:linClrLst meth="repeat">
+      <a:schemeClr val="lt1"/>
+    </dgm:linClrLst>
+    <dgm:effectClrLst/>
+    <dgm:txLinClrLst/>
+    <dgm:txFillClrLst meth="repeat">
+      <a:schemeClr val="lt1"/>
+    </dgm:txFillClrLst>
+    <dgm:txEffectClrLst/>
+  </dgm:styleLbl>
+  <dgm:styleLbl name="bgImgPlace1">
+    <dgm:fillClrLst meth="repeat">
+      <a:schemeClr val="accent1">
+        <a:tint val="50000"/>
+      </a:schemeClr>
+    </dgm:fillClrLst>
+    <dgm:linClrLst meth="repeat">
+      <a:schemeClr val="lt1"/>
+    </dgm:linClrLst>
+    <dgm:effectClrLst/>
+    <dgm:txLinClrLst/>
+    <dgm:txFillClrLst meth="repeat">
+      <a:schemeClr val="lt1"/>
+    </dgm:txFillClrLst>
+    <dgm:txEffectClrLst/>
+  </dgm:styleLbl>
+  <dgm:styleLbl name="sibTrans2D1">
+    <dgm:fillClrLst meth="repeat">
+      <a:schemeClr val="accent1">
+        <a:tint val="60000"/>
+      </a:schemeClr>
+    </dgm:fillClrLst>
+    <dgm:linClrLst meth="repeat">
+      <a:schemeClr val="accent1">
+        <a:tint val="60000"/>
+      </a:schemeClr>
+    </dgm:linClrLst>
+    <dgm:effectClrLst/>
+    <dgm:txLinClrLst/>
+    <dgm:txFillClrLst/>
+    <dgm:txEffectClrLst/>
+  </dgm:styleLbl>
+  <dgm:styleLbl name="fgSibTrans2D1">
+    <dgm:fillClrLst meth="repeat">
+      <a:schemeClr val="accent1">
+        <a:tint val="60000"/>
+      </a:schemeClr>
+    </dgm:fillClrLst>
+    <dgm:linClrLst meth="repeat">
+      <a:schemeClr val="accent1">
+        <a:tint val="60000"/>
+      </a:schemeClr>
+    </dgm:linClrLst>
+    <dgm:effectClrLst/>
+    <dgm:txLinClrLst/>
+    <dgm:txFillClrLst/>
+    <dgm:txEffectClrLst/>
+  </dgm:styleLbl>
+  <dgm:styleLbl name="bgSibTrans2D1">
+    <dgm:fillClrLst meth="repeat">
+      <a:schemeClr val="accent1">
+        <a:tint val="60000"/>
+      </a:schemeClr>
+    </dgm:fillClrLst>
+    <dgm:linClrLst meth="repeat">
+      <a:schemeClr val="accent1">
+        <a:tint val="60000"/>
+      </a:schemeClr>
+    </dgm:linClrLst>
+    <dgm:effectClrLst/>
+    <dgm:txLinClrLst/>
+    <dgm:txFillClrLst/>
+    <dgm:txEffectClrLst/>
+  </dgm:styleLbl>
+  <dgm:styleLbl name="sibTrans1D1">
+    <dgm:fillClrLst meth="repeat">
+      <a:schemeClr val="accent1"/>
+    </dgm:fillClrLst>
+    <dgm:linClrLst meth="repeat">
+      <a:schemeClr val="accent1"/>
+    </dgm:linClrLst>
+    <dgm:effectClrLst/>
+    <dgm:txLinClrLst/>
+    <dgm:txFillClrLst meth="repeat">
+      <a:schemeClr val="tx1"/>
+    </dgm:txFillClrLst>
+    <dgm:txEffectClrLst/>
+  </dgm:styleLbl>
+  <dgm:styleLbl name="callout">
+    <dgm:fillClrLst meth="repeat">
+      <a:schemeClr val="accent1"/>
+    </dgm:fillClrLst>
+    <dgm:linClrLst meth="repeat">
+      <a:schemeClr val="accent1">
+        <a:tint val="50000"/>
+      </a:schemeClr>
+    </dgm:linClrLst>
+    <dgm:effectClrLst/>
+    <dgm:txLinClrLst/>
+    <dgm:txFillClrLst meth="repeat">
+      <a:schemeClr val="tx1"/>
+    </dgm:txFillClrLst>
+    <dgm:txEffectClrLst/>
+  </dgm:styleLbl>
+  <dgm:styleLbl name="asst0">
+    <dgm:fillClrLst meth="repeat">
+      <a:schemeClr val="accent1"/>
+    </dgm:fillClrLst>
+    <dgm:linClrLst meth="repeat">
+      <a:schemeClr val="lt1"/>
+    </dgm:linClrLst>
+    <dgm:effectClrLst/>
+    <dgm:txLinClrLst/>
+    <dgm:txFillClrLst/>
+    <dgm:txEffectClrLst/>
+  </dgm:styleLbl>
+  <dgm:styleLbl name="asst1">
+    <dgm:fillClrLst meth="repeat">
+      <a:schemeClr val="accent1"/>
+    </dgm:fillClrLst>
+    <dgm:linClrLst meth="repeat">
+      <a:schemeClr val="lt1"/>
+    </dgm:linClrLst>
+    <dgm:effectClrLst/>
+    <dgm:txLinClrLst/>
+    <dgm:txFillClrLst/>
+    <dgm:txEffectClrLst/>
+  </dgm:styleLbl>
+  <dgm:styleLbl name="asst2">
+    <dgm:fillClrLst meth="repeat">
+      <a:schemeClr val="accent1"/>
+    </dgm:fillClrLst>
+    <dgm:linClrLst meth="repeat">
+      <a:schemeClr val="lt1"/>
+    </dgm:linClrLst>
+    <dgm:effectClrLst/>
+    <dgm:txLinClrLst/>
+    <dgm:txFillClrLst/>
+    <dgm:txEffectClrLst/>
+  </dgm:styleLbl>
+  <dgm:styleLbl name="asst3">
+    <dgm:fillClrLst meth="repeat">
+      <a:schemeClr val="accent1"/>
+    </dgm:fillClrLst>
+    <dgm:linClrLst meth="repeat">
+      <a:schemeClr val="lt1"/>
+    </dgm:linClrLst>
+    <dgm:effectClrLst/>
+    <dgm:txLinClrLst/>
+    <dgm:txFillClrLst/>
+    <dgm:txEffectClrLst/>
+  </dgm:styleLbl>
+  <dgm:styleLbl name="asst4">
+    <dgm:fillClrLst meth="repeat">
+      <a:schemeClr val="accent1"/>
+    </dgm:fillClrLst>
+    <dgm:linClrLst meth="repeat">
+      <a:schemeClr val="lt1"/>
+    </dgm:linClrLst>
+    <dgm:effectClrLst/>
+    <dgm:txLinClrLst/>
+    <dgm:txFillClrLst/>
+    <dgm:txEffectClrLst/>
+  </dgm:styleLbl>
+  <dgm:styleLbl name="parChTrans2D1">
+    <dgm:fillClrLst meth="repeat">
+      <a:schemeClr val="accent1">
+        <a:tint val="60000"/>
+      </a:schemeClr>
+    </dgm:fillClrLst>
+    <dgm:linClrLst meth="repeat">
+      <a:schemeClr val="accent1">
+        <a:tint val="60000"/>
+      </a:schemeClr>
+    </dgm:linClrLst>
+    <dgm:effectClrLst/>
+    <dgm:txLinClrLst/>
+    <dgm:txFillClrLst meth="repeat">
+      <a:schemeClr val="lt1"/>
+    </dgm:txFillClrLst>
+    <dgm:txEffectClrLst/>
+  </dgm:styleLbl>
+  <dgm:styleLbl name="parChTrans2D2">
+    <dgm:fillClrLst meth="repeat">
+      <a:schemeClr val="accent1"/>
+    </dgm:fillClrLst>
+    <dgm:linClrLst meth="repeat">
+      <a:schemeClr val="accent1"/>
+    </dgm:linClrLst>
+    <dgm:effectClrLst/>
+    <dgm:txLinClrLst/>
+    <dgm:txFillClrLst meth="repeat">
+      <a:schemeClr val="lt1"/>
+    </dgm:txFillClrLst>
+    <dgm:txEffectClrLst/>
+  </dgm:styleLbl>
+  <dgm:styleLbl name="parChTrans2D3">
+    <dgm:fillClrLst meth="repeat">
+      <a:schemeClr val="accent1"/>
+    </dgm:fillClrLst>
+    <dgm:linClrLst meth="repeat">
+      <a:schemeClr val="accent1"/>
+    </dgm:linClrLst>
+    <dgm:effectClrLst/>
+    <dgm:txLinClrLst/>
+    <dgm:txFillClrLst meth="repeat">
+      <a:schemeClr val="lt1"/>
+    </dgm:txFillClrLst>
+    <dgm:txEffectClrLst/>
+  </dgm:styleLbl>
+  <dgm:styleLbl name="parChTrans2D4">
+    <dgm:fillClrLst meth="repeat">
+      <a:schemeClr val="accent1"/>
+    </dgm:fillClrLst>
+    <dgm:linClrLst meth="repeat">
+      <a:schemeClr val="accent1"/>
+    </dgm:linClrLst>
+    <dgm:effectClrLst/>
+    <dgm:txLinClrLst/>
+    <dgm:txFillClrLst meth="repeat">
+      <a:schemeClr val="lt1"/>
+    </dgm:txFillClrLst>
+    <dgm:txEffectClrLst/>
+  </dgm:styleLbl>
+  <dgm:styleLbl name="parChTrans1D1">
+    <dgm:fillClrLst meth="repeat">
+      <a:schemeClr val="accent1"/>
+    </dgm:fillClrLst>
+    <dgm:linClrLst meth="repeat">
+      <a:schemeClr val="accent1">
+        <a:shade val="60000"/>
+      </a:schemeClr>
+    </dgm:linClrLst>
+    <dgm:effectClrLst/>
+    <dgm:txLinClrLst/>
+    <dgm:txFillClrLst meth="repeat">
+      <a:schemeClr val="tx1"/>
+    </dgm:txFillClrLst>
+    <dgm:txEffectClrLst/>
+  </dgm:styleLbl>
+  <dgm:styleLbl name="parChTrans1D2">
+    <dgm:fillClrLst meth="repeat">
+      <a:schemeClr val="accent1"/>
+    </dgm:fillClrLst>
+    <dgm:linClrLst meth="repeat">
+      <a:schemeClr val="accent1">
+        <a:shade val="60000"/>
+      </a:schemeClr>
+    </dgm:linClrLst>
+    <dgm:effectClrLst/>
+    <dgm:txLinClrLst/>
+    <dgm:txFillClrLst meth="repeat">
+      <a:schemeClr val="tx1"/>
+    </dgm:txFillClrLst>
+    <dgm:txEffectClrLst/>
+  </dgm:styleLbl>
+  <dgm:styleLbl name="parChTrans1D3">
+    <dgm:fillClrLst meth="repeat">
+      <a:schemeClr val="accent1"/>
+    </dgm:fillClrLst>
+    <dgm:linClrLst meth="repeat">
+      <a:schemeClr val="accent1">
+        <a:shade val="80000"/>
+      </a:schemeClr>
+    </dgm:linClrLst>
+    <dgm:effectClrLst/>
+    <dgm:txLinClrLst/>
+    <dgm:txFillClrLst meth="repeat">
+      <a:schemeClr val="tx1"/>
+    </dgm:txFillClrLst>
+    <dgm:txEffectClrLst/>
+  </dgm:styleLbl>
+  <dgm:styleLbl name="parChTrans1D4">
+    <dgm:fillClrLst meth="repeat">
+      <a:schemeClr val="accent1"/>
+    </dgm:fillClrLst>
+    <dgm:linClrLst meth="repeat">
+      <a:schemeClr val="accent1">
+        <a:shade val="80000"/>
+      </a:schemeClr>
+    </dgm:linClrLst>
+    <dgm:effectClrLst/>
+    <dgm:txLinClrLst/>
+    <dgm:txFillClrLst meth="repeat">
+      <a:schemeClr val="tx1"/>
+    </dgm:txFillClrLst>
+    <dgm:txEffectClrLst/>
+  </dgm:styleLbl>
+  <dgm:styleLbl name="fgAcc1">
+    <dgm:fillClrLst meth="repeat">
+      <a:schemeClr val="lt1">
+        <a:alpha val="90000"/>
+      </a:schemeClr>
+    </dgm:fillClrLst>
+    <dgm:linClrLst meth="repeat">
+      <a:schemeClr val="accent1"/>
+    </dgm:linClrLst>
+    <dgm:effectClrLst/>
+    <dgm:txLinClrLst/>
+    <dgm:txFillClrLst meth="repeat">
+      <a:schemeClr val="dk1"/>
+    </dgm:txFillClrLst>
+    <dgm:txEffectClrLst/>
+  </dgm:styleLbl>
+  <dgm:styleLbl name="conFgAcc1">
+    <dgm:fillClrLst meth="repeat">
+      <a:schemeClr val="lt1">
+        <a:alpha val="90000"/>
+      </a:schemeClr>
+    </dgm:fillClrLst>
+    <dgm:linClrLst meth="repeat">
+      <a:schemeClr val="accent1"/>
+    </dgm:linClrLst>
+    <dgm:effectClrLst/>
+    <dgm:txLinClrLst/>
+    <dgm:txFillClrLst meth="repeat">
+      <a:schemeClr val="dk1"/>
+    </dgm:txFillClrLst>
+    <dgm:txEffectClrLst/>
+  </dgm:styleLbl>
+  <dgm:styleLbl name="alignAcc1">
+    <dgm:fillClrLst meth="repeat">
+      <a:schemeClr val="lt1">
+        <a:alpha val="90000"/>
+      </a:schemeClr>
+    </dgm:fillClrLst>
+    <dgm:linClrLst meth="repeat">
+      <a:schemeClr val="accent1"/>
+    </dgm:linClrLst>
+    <dgm:effectClrLst/>
+    <dgm:txLinClrLst/>
+    <dgm:txFillClrLst meth="repeat">
+      <a:schemeClr val="dk1"/>
+    </dgm:txFillClrLst>
+    <dgm:txEffectClrLst/>
+  </dgm:styleLbl>
+  <dgm:styleLbl name="trAlignAcc1">
+    <dgm:fillClrLst meth="repeat">
+      <a:schemeClr val="lt1">
+        <a:alpha val="40000"/>
+      </a:schemeClr>
+    </dgm:fillClrLst>
+    <dgm:linClrLst meth="repeat">
+      <a:schemeClr val="accent1"/>
+    </dgm:linClrLst>
+    <dgm:effectClrLst/>
+    <dgm:txLinClrLst/>
+    <dgm:txFillClrLst meth="repeat">
+      <a:schemeClr val="dk1"/>
+    </dgm:txFillClrLst>
+    <dgm:txEffectClrLst/>
+  </dgm:styleLbl>
+  <dgm:styleLbl name="bgAcc1">
+    <dgm:fillClrLst meth="repeat">
+      <a:schemeClr val="lt1">
+        <a:alpha val="90000"/>
+      </a:schemeClr>
+    </dgm:fillClrLst>
+    <dgm:linClrLst meth="repeat">
+      <a:schemeClr val="accent1"/>
+    </dgm:linClrLst>
+    <dgm:effectClrLst/>
+    <dgm:txLinClrLst/>
+    <dgm:txFillClrLst meth="repeat">
+      <a:schemeClr val="dk1"/>
+    </dgm:txFillClrLst>
+    <dgm:txEffectClrLst/>
+  </dgm:styleLbl>
+  <dgm:styleLbl name="solidFgAcc1">
+    <dgm:fillClrLst meth="repeat">
+      <a:schemeClr val="lt1"/>
+    </dgm:fillClrLst>
+    <dgm:linClrLst meth="repeat">
+      <a:schemeClr val="accent1"/>
+    </dgm:linClrLst>
+    <dgm:effectClrLst/>
+    <dgm:txLinClrLst/>
+    <dgm:txFillClrLst meth="repeat">
+      <a:schemeClr val="dk1"/>
+    </dgm:txFillClrLst>
+    <dgm:txEffectClrLst/>
+  </dgm:styleLbl>
+  <dgm:styleLbl name="solidAlignAcc1">
+    <dgm:fillClrLst meth="repeat">
+      <a:schemeClr val="lt1"/>
+    </dgm:fillClrLst>
+    <dgm:linClrLst meth="repeat">
+      <a:schemeClr val="accent1"/>
+    </dgm:linClrLst>
+    <dgm:effectClrLst/>
+    <dgm:txLinClrLst/>
+    <dgm:txFillClrLst meth="repeat">
+      <a:schemeClr val="dk1"/>
+    </dgm:txFillClrLst>
+    <dgm:txEffectClrLst/>
+  </dgm:styleLbl>
+  <dgm:styleLbl name="solidBgAcc1">
+    <dgm:fillClrLst meth="repeat">
+      <a:schemeClr val="lt1"/>
+    </dgm:fillClrLst>
+    <dgm:linClrLst meth="repeat">
+      <a:schemeClr val="accent1"/>
+    </dgm:linClrLst>
+    <dgm:effectClrLst/>
+    <dgm:txLinClrLst/>
+    <dgm:txFillClrLst meth="repeat">
+      <a:schemeClr val="dk1"/>
+    </dgm:txFillClrLst>
+    <dgm:txEffectClrLst/>
+  </dgm:styleLbl>
+  <dgm:styleLbl name="fgAccFollowNode1">
+    <dgm:fillClrLst meth="repeat">
+      <a:schemeClr val="accent1">
+        <a:alpha val="90000"/>
+        <a:tint val="40000"/>
+      </a:schemeClr>
+    </dgm:fillClrLst>
+    <dgm:linClrLst meth="repeat">
+      <a:schemeClr val="accent1">
+        <a:alpha val="90000"/>
+        <a:tint val="40000"/>
+      </a:schemeClr>
+    </dgm:linClrLst>
+    <dgm:effectClrLst/>
+    <dgm:txLinClrLst/>
+    <dgm:txFillClrLst meth="repeat">
+      <a:schemeClr val="dk1"/>
+    </dgm:txFillClrLst>
+    <dgm:txEffectClrLst/>
+  </dgm:styleLbl>
+  <dgm:styleLbl name="alignAccFollowNode1">
+    <dgm:fillClrLst meth="repeat">
+      <a:schemeClr val="accent1">
+        <a:alpha val="90000"/>
+        <a:tint val="40000"/>
+      </a:schemeClr>
+    </dgm:fillClrLst>
+    <dgm:linClrLst meth="repeat">
+      <a:schemeClr val="accent1">
+        <a:alpha val="90000"/>
+        <a:tint val="40000"/>
+      </a:schemeClr>
+    </dgm:linClrLst>
+    <dgm:effectClrLst/>
+    <dgm:txLinClrLst/>
+    <dgm:txFillClrLst meth="repeat">
+      <a:schemeClr val="dk1"/>
+    </dgm:txFillClrLst>
+    <dgm:txEffectClrLst/>
+  </dgm:styleLbl>
+  <dgm:styleLbl name="bgAccFollowNode1">
+    <dgm:fillClrLst meth="repeat">
+      <a:schemeClr val="accent1">
+        <a:alpha val="90000"/>
+        <a:tint val="40000"/>
+      </a:schemeClr>
+    </dgm:fillClrLst>
+    <dgm:linClrLst meth="repeat">
+      <a:schemeClr val="accent1">
+        <a:alpha val="90000"/>
+        <a:tint val="40000"/>
+      </a:schemeClr>
+    </dgm:linClrLst>
+    <dgm:effectClrLst/>
+    <dgm:txLinClrLst/>
+    <dgm:txFillClrLst meth="repeat">
+      <a:schemeClr val="dk1"/>
+    </dgm:txFillClrLst>
+    <dgm:txEffectClrLst/>
+  </dgm:styleLbl>
+  <dgm:styleLbl name="fgAcc0">
+    <dgm:fillClrLst meth="repeat">
+      <a:schemeClr val="lt1">
+        <a:alpha val="90000"/>
+      </a:schemeClr>
+    </dgm:fillClrLst>
+    <dgm:linClrLst meth="repeat">
+      <a:schemeClr val="accent1"/>
+    </dgm:linClrLst>
+    <dgm:effectClrLst/>
+    <dgm:txLinClrLst/>
+    <dgm:txFillClrLst meth="repeat">
+      <a:schemeClr val="dk1"/>
+    </dgm:txFillClrLst>
+    <dgm:txEffectClrLst/>
+  </dgm:styleLbl>
+  <dgm:styleLbl name="fgAcc2">
+    <dgm:fillClrLst meth="repeat">
+      <a:schemeClr val="lt1">
+        <a:alpha val="90000"/>
+      </a:schemeClr>
+    </dgm:fillClrLst>
+    <dgm:linClrLst meth="repeat">
+      <a:schemeClr val="accent1"/>
+    </dgm:linClrLst>
+    <dgm:effectClrLst/>
+    <dgm:txLinClrLst/>
+    <dgm:txFillClrLst meth="repeat">
+      <a:schemeClr val="dk1"/>
+    </dgm:txFillClrLst>
+    <dgm:txEffectClrLst/>
+  </dgm:styleLbl>
+  <dgm:styleLbl name="fgAcc3">
+    <dgm:fillClrLst meth="repeat">
+      <a:schemeClr val="lt1">
+        <a:alpha val="90000"/>
+      </a:schemeClr>
+    </dgm:fillClrLst>
+    <dgm:linClrLst meth="repeat">
+      <a:schemeClr val="accent1"/>
+    </dgm:linClrLst>
+    <dgm:effectClrLst/>
+    <dgm:txLinClrLst/>
+    <dgm:txFillClrLst meth="repeat">
+      <a:schemeClr val="dk1"/>
+    </dgm:txFillClrLst>
+    <dgm:txEffectClrLst/>
+  </dgm:styleLbl>
+  <dgm:styleLbl name="fgAcc4">
+    <dgm:fillClrLst meth="repeat">
+      <a:schemeClr val="lt1">
+        <a:alpha val="90000"/>
+      </a:schemeClr>
+    </dgm:fillClrLst>
+    <dgm:linClrLst meth="repeat">
+      <a:schemeClr val="accent1"/>
+    </dgm:linClrLst>
+    <dgm:effectClrLst/>
+    <dgm:txLinClrLst/>
+    <dgm:txFillClrLst meth="repeat">
+      <a:schemeClr val="dk1"/>
+    </dgm:txFillClrLst>
+    <dgm:txEffectClrLst/>
+  </dgm:styleLbl>
+  <dgm:styleLbl name="bgShp">
+    <dgm:fillClrLst meth="repeat">
+      <a:schemeClr val="accent1">
+        <a:tint val="40000"/>
+      </a:schemeClr>
+    </dgm:fillClrLst>
+    <dgm:linClrLst meth="repeat">
+      <a:schemeClr val="accent1"/>
+    </dgm:linClrLst>
+    <dgm:effectClrLst/>
+    <dgm:txLinClrLst/>
+    <dgm:txFillClrLst meth="repeat">
+      <a:schemeClr val="dk1"/>
+    </dgm:txFillClrLst>
+    <dgm:txEffectClrLst/>
+  </dgm:styleLbl>
+  <dgm:styleLbl name="dkBgShp">
+    <dgm:fillClrLst meth="repeat">
+      <a:schemeClr val="accent1">
+        <a:shade val="80000"/>
+      </a:schemeClr>
+    </dgm:fillClrLst>
+    <dgm:linClrLst meth="repeat">
+      <a:schemeClr val="accent1"/>
+    </dgm:linClrLst>
+    <dgm:effectClrLst/>
+    <dgm:txLinClrLst/>
+    <dgm:txFillClrLst meth="repeat">
+      <a:schemeClr val="lt1"/>
+    </dgm:txFillClrLst>
+    <dgm:txEffectClrLst/>
+  </dgm:styleLbl>
+  <dgm:styleLbl name="trBgShp">
+    <dgm:fillClrLst meth="repeat">
+      <a:schemeClr val="accent1">
+        <a:tint val="50000"/>
+        <a:alpha val="40000"/>
+      </a:schemeClr>
+    </dgm:fillClrLst>
+    <dgm:linClrLst meth="repeat">
+      <a:schemeClr val="accent1"/>
+    </dgm:linClrLst>
+    <dgm:effectClrLst/>
+    <dgm:txLinClrLst/>
+    <dgm:txFillClrLst meth="repeat">
+      <a:schemeClr val="lt1"/>
+    </dgm:txFillClrLst>
+    <dgm:txEffectClrLst/>
+  </dgm:styleLbl>
+  <dgm:styleLbl name="fgShp">
+    <dgm:fillClrLst meth="repeat">
+      <a:schemeClr val="accent1">
+        <a:tint val="60000"/>
+      </a:schemeClr>
+    </dgm:fillClrLst>
+    <dgm:linClrLst meth="repeat">
+      <a:schemeClr val="lt1"/>
+    </dgm:linClrLst>
+    <dgm:effectClrLst/>
+    <dgm:txLinClrLst/>
+    <dgm:txFillClrLst meth="repeat">
+      <a:schemeClr val="dk1"/>
+    </dgm:txFillClrLst>
+    <dgm:txEffectClrLst/>
+  </dgm:styleLbl>
+  <dgm:styleLbl name="revTx">
+    <dgm:fillClrLst meth="repeat">
+      <a:schemeClr val="lt1">
+        <a:alpha val="0"/>
+      </a:schemeClr>
+    </dgm:fillClrLst>
+    <dgm:linClrLst meth="repeat">
+      <a:schemeClr val="dk1">
+        <a:alpha val="0"/>
+      </a:schemeClr>
+    </dgm:linClrLst>
+    <dgm:effectClrLst/>
+    <dgm:txLinClrLst/>
+    <dgm:txFillClrLst meth="repeat">
+      <a:schemeClr val="tx1"/>
+    </dgm:txFillClrLst>
+    <dgm:txEffectClrLst/>
+  </dgm:styleLbl>
+</dgm:colorsDef>
+</file>
+
+<file path=ppt/diagrams/colors3.xml><?xml version="1.0" encoding="utf-8"?>
 <dgm:colorsDef xmlns:dgm="http://schemas.openxmlformats.org/drawingml/2006/diagram" xmlns:a="http://schemas.openxmlformats.org/drawingml/2006/main" uniqueId="urn:microsoft.com/office/officeart/2018/5/colors/Iconchunking_neutralicontext_colorful1">
   <dgm:title val=""/>
   <dgm:desc val=""/>
@@ -1979,6 +2816,513 @@
 </file>
 
 <file path=ppt/diagrams/data2.xml><?xml version="1.0" encoding="utf-8"?>
+<dgm:dataModel xmlns:dgm="http://schemas.openxmlformats.org/drawingml/2006/diagram" xmlns:a="http://schemas.openxmlformats.org/drawingml/2006/main">
+  <dgm:ptLst>
+    <dgm:pt modelId="{CD5D9CA1-1089-44FF-A3DE-86CDE443F47A}" type="doc">
+      <dgm:prSet loTypeId="urn:microsoft.com/office/officeart/2005/8/layout/hProcess6" loCatId="process" qsTypeId="urn:microsoft.com/office/officeart/2005/8/quickstyle/simple1" qsCatId="simple" csTypeId="urn:microsoft.com/office/officeart/2005/8/colors/accent1_2" csCatId="accent1" phldr="1"/>
+      <dgm:spPr/>
+      <dgm:t>
+        <a:bodyPr/>
+        <a:lstStyle/>
+        <a:p>
+          <a:endParaRPr lang="es-MX"/>
+        </a:p>
+      </dgm:t>
+    </dgm:pt>
+    <dgm:pt modelId="{7CDF1763-794E-4FF9-AA1A-3C03DF343D9E}">
+      <dgm:prSet phldrT="[Texto]"/>
+      <dgm:spPr/>
+      <dgm:t>
+        <a:bodyPr/>
+        <a:lstStyle/>
+        <a:p>
+          <a:r>
+            <a:rPr lang="es-MX" dirty="0" err="1"/>
+            <a:t>Start</a:t>
+          </a:r>
+          <a:endParaRPr lang="es-MX" dirty="0"/>
+        </a:p>
+      </dgm:t>
+    </dgm:pt>
+    <dgm:pt modelId="{604C8167-B9B5-494D-B079-4AE1E2348F47}" type="parTrans" cxnId="{64A2E867-C083-4335-B79A-53B142A7AA7E}">
+      <dgm:prSet/>
+      <dgm:spPr/>
+      <dgm:t>
+        <a:bodyPr/>
+        <a:lstStyle/>
+        <a:p>
+          <a:endParaRPr lang="es-MX"/>
+        </a:p>
+      </dgm:t>
+    </dgm:pt>
+    <dgm:pt modelId="{8CC9F13A-1F51-423C-9DA7-A01960149EBC}" type="sibTrans" cxnId="{64A2E867-C083-4335-B79A-53B142A7AA7E}">
+      <dgm:prSet/>
+      <dgm:spPr/>
+      <dgm:t>
+        <a:bodyPr/>
+        <a:lstStyle/>
+        <a:p>
+          <a:endParaRPr lang="es-MX"/>
+        </a:p>
+      </dgm:t>
+    </dgm:pt>
+    <dgm:pt modelId="{9DA4A464-C39E-4847-86BA-29C956B21F98}">
+      <dgm:prSet phldrT="[Texto]"/>
+      <dgm:spPr/>
+      <dgm:t>
+        <a:bodyPr/>
+        <a:lstStyle/>
+        <a:p>
+          <a:r>
+            <a:rPr lang="es-MX" dirty="0"/>
+            <a:t>PANAIR</a:t>
+          </a:r>
+        </a:p>
+      </dgm:t>
+    </dgm:pt>
+    <dgm:pt modelId="{18D33262-67BE-43AB-B624-02B1FE7A6F63}" type="parTrans" cxnId="{14B9F25E-7D2B-4AAA-908E-6E061E58CD86}">
+      <dgm:prSet/>
+      <dgm:spPr/>
+      <dgm:t>
+        <a:bodyPr/>
+        <a:lstStyle/>
+        <a:p>
+          <a:endParaRPr lang="es-MX"/>
+        </a:p>
+      </dgm:t>
+    </dgm:pt>
+    <dgm:pt modelId="{F8DF5D2F-003A-4BBD-8BB5-C986BB373CF3}" type="sibTrans" cxnId="{14B9F25E-7D2B-4AAA-908E-6E061E58CD86}">
+      <dgm:prSet/>
+      <dgm:spPr/>
+      <dgm:t>
+        <a:bodyPr/>
+        <a:lstStyle/>
+        <a:p>
+          <a:endParaRPr lang="es-MX"/>
+        </a:p>
+      </dgm:t>
+    </dgm:pt>
+    <dgm:pt modelId="{BF014CA8-9764-4AFD-8927-98FAA2B18FAA}">
+      <dgm:prSet phldrT="[Texto]"/>
+      <dgm:spPr/>
+      <dgm:t>
+        <a:bodyPr/>
+        <a:lstStyle/>
+        <a:p>
+          <a:r>
+            <a:rPr lang="es-MX" dirty="0" err="1"/>
+            <a:t>Initial</a:t>
+          </a:r>
+          <a:r>
+            <a:rPr lang="es-MX" dirty="0"/>
+            <a:t> disp.</a:t>
+          </a:r>
+        </a:p>
+      </dgm:t>
+    </dgm:pt>
+    <dgm:pt modelId="{558E7CDD-FEAC-4733-881F-9E462E2ED6D4}" type="parTrans" cxnId="{B85A830F-EDBD-4950-9BE0-EDFCD0F90732}">
+      <dgm:prSet/>
+      <dgm:spPr/>
+      <dgm:t>
+        <a:bodyPr/>
+        <a:lstStyle/>
+        <a:p>
+          <a:endParaRPr lang="es-MX"/>
+        </a:p>
+      </dgm:t>
+    </dgm:pt>
+    <dgm:pt modelId="{1D438975-F48A-48E4-AA55-BC34A4F63805}" type="sibTrans" cxnId="{B85A830F-EDBD-4950-9BE0-EDFCD0F90732}">
+      <dgm:prSet/>
+      <dgm:spPr/>
+      <dgm:t>
+        <a:bodyPr/>
+        <a:lstStyle/>
+        <a:p>
+          <a:endParaRPr lang="es-MX"/>
+        </a:p>
+      </dgm:t>
+    </dgm:pt>
+    <dgm:pt modelId="{B641506F-02DF-468B-AC83-E36C587E1187}">
+      <dgm:prSet phldrT="[Texto]"/>
+      <dgm:spPr/>
+      <dgm:t>
+        <a:bodyPr/>
+        <a:lstStyle/>
+        <a:p>
+          <a:r>
+            <a:rPr lang="es-MX" dirty="0"/>
+            <a:t>Fidelity Change</a:t>
+          </a:r>
+        </a:p>
+      </dgm:t>
+    </dgm:pt>
+    <dgm:pt modelId="{C733213A-F888-4626-9481-CD796CB1EB72}" type="parTrans" cxnId="{53A70D90-29BB-4705-BCC7-1DFB3055A763}">
+      <dgm:prSet/>
+      <dgm:spPr/>
+      <dgm:t>
+        <a:bodyPr/>
+        <a:lstStyle/>
+        <a:p>
+          <a:endParaRPr lang="es-MX"/>
+        </a:p>
+      </dgm:t>
+    </dgm:pt>
+    <dgm:pt modelId="{40C6D9D0-F392-4F48-822F-7CDAA237B4EB}" type="sibTrans" cxnId="{53A70D90-29BB-4705-BCC7-1DFB3055A763}">
+      <dgm:prSet/>
+      <dgm:spPr/>
+      <dgm:t>
+        <a:bodyPr/>
+        <a:lstStyle/>
+        <a:p>
+          <a:endParaRPr lang="es-MX"/>
+        </a:p>
+      </dgm:t>
+    </dgm:pt>
+    <dgm:pt modelId="{97FC2353-595B-4ED5-B9DE-202BAEDA54FB}">
+      <dgm:prSet phldrT="[Texto]"/>
+      <dgm:spPr/>
+      <dgm:t>
+        <a:bodyPr/>
+        <a:lstStyle/>
+        <a:p>
+          <a:r>
+            <a:rPr lang="es-MX" dirty="0" err="1"/>
+            <a:t>AdFlow</a:t>
+          </a:r>
+          <a:endParaRPr lang="es-MX" dirty="0"/>
+        </a:p>
+      </dgm:t>
+    </dgm:pt>
+    <dgm:pt modelId="{ADBC9D8E-0838-48DF-A3B7-99582902B669}" type="parTrans" cxnId="{992A310B-1D63-47E0-B828-CB580029ECB5}">
+      <dgm:prSet/>
+      <dgm:spPr/>
+      <dgm:t>
+        <a:bodyPr/>
+        <a:lstStyle/>
+        <a:p>
+          <a:endParaRPr lang="es-MX"/>
+        </a:p>
+      </dgm:t>
+    </dgm:pt>
+    <dgm:pt modelId="{D6CD01AF-1F2E-4525-9427-BE1F011FDE7E}" type="sibTrans" cxnId="{992A310B-1D63-47E0-B828-CB580029ECB5}">
+      <dgm:prSet/>
+      <dgm:spPr/>
+      <dgm:t>
+        <a:bodyPr/>
+        <a:lstStyle/>
+        <a:p>
+          <a:endParaRPr lang="es-MX"/>
+        </a:p>
+      </dgm:t>
+    </dgm:pt>
+    <dgm:pt modelId="{B0C01E62-57CE-4E64-A0ED-B6D9423C29C6}">
+      <dgm:prSet phldrT="[Texto]"/>
+      <dgm:spPr/>
+      <dgm:t>
+        <a:bodyPr/>
+        <a:lstStyle/>
+        <a:p>
+          <a:r>
+            <a:rPr lang="es-MX" dirty="0" err="1"/>
+            <a:t>Inherit</a:t>
+          </a:r>
+          <a:r>
+            <a:rPr lang="es-MX" dirty="0"/>
+            <a:t> PANAIR </a:t>
+          </a:r>
+          <a:r>
+            <a:rPr lang="es-MX" dirty="0" err="1"/>
+            <a:t>solution</a:t>
+          </a:r>
+          <a:endParaRPr lang="es-MX" dirty="0"/>
+        </a:p>
+      </dgm:t>
+    </dgm:pt>
+    <dgm:pt modelId="{A9F2F6FC-8262-4588-B643-AC157661C77A}" type="parTrans" cxnId="{89FCD2D2-F0EA-4A0D-9342-A92115904562}">
+      <dgm:prSet/>
+      <dgm:spPr/>
+      <dgm:t>
+        <a:bodyPr/>
+        <a:lstStyle/>
+        <a:p>
+          <a:endParaRPr lang="es-MX"/>
+        </a:p>
+      </dgm:t>
+    </dgm:pt>
+    <dgm:pt modelId="{6BDA64AE-B7C8-4C71-B64A-F490D4D93ADD}" type="sibTrans" cxnId="{89FCD2D2-F0EA-4A0D-9342-A92115904562}">
+      <dgm:prSet/>
+      <dgm:spPr/>
+      <dgm:t>
+        <a:bodyPr/>
+        <a:lstStyle/>
+        <a:p>
+          <a:endParaRPr lang="es-MX"/>
+        </a:p>
+      </dgm:t>
+    </dgm:pt>
+    <dgm:pt modelId="{45534BB3-4307-4C55-B39E-5AC5C480EA9F}">
+      <dgm:prSet phldrT="[Texto]"/>
+      <dgm:spPr/>
+      <dgm:t>
+        <a:bodyPr/>
+        <a:lstStyle/>
+        <a:p>
+          <a:r>
+            <a:rPr lang="es-MX" dirty="0" err="1"/>
+            <a:t>Outer</a:t>
+          </a:r>
+          <a:r>
+            <a:rPr lang="es-MX" dirty="0"/>
+            <a:t> </a:t>
+          </a:r>
+          <a:r>
+            <a:rPr lang="es-MX" dirty="0" err="1"/>
+            <a:t>Loop</a:t>
+          </a:r>
+          <a:r>
+            <a:rPr lang="es-MX" dirty="0"/>
+            <a:t> </a:t>
+          </a:r>
+          <a:r>
+            <a:rPr lang="es-MX" dirty="0" err="1"/>
+            <a:t>Optimizer</a:t>
+          </a:r>
+          <a:endParaRPr lang="es-MX" dirty="0"/>
+        </a:p>
+      </dgm:t>
+    </dgm:pt>
+    <dgm:pt modelId="{002989FB-2A6D-4788-8039-D4227CD388EB}" type="parTrans" cxnId="{6B99AFF8-C700-4CD6-8FA7-29C0AFA4E09A}">
+      <dgm:prSet/>
+      <dgm:spPr/>
+      <dgm:t>
+        <a:bodyPr/>
+        <a:lstStyle/>
+        <a:p>
+          <a:endParaRPr lang="es-MX"/>
+        </a:p>
+      </dgm:t>
+    </dgm:pt>
+    <dgm:pt modelId="{D687F87F-D58C-40D7-B88D-2078FCEA1B17}" type="sibTrans" cxnId="{6B99AFF8-C700-4CD6-8FA7-29C0AFA4E09A}">
+      <dgm:prSet/>
+      <dgm:spPr/>
+      <dgm:t>
+        <a:bodyPr/>
+        <a:lstStyle/>
+        <a:p>
+          <a:endParaRPr lang="es-MX"/>
+        </a:p>
+      </dgm:t>
+    </dgm:pt>
+    <dgm:pt modelId="{5A923A61-7ABF-4ACA-B07F-74CA5D918E99}">
+      <dgm:prSet phldrT="[Texto]"/>
+      <dgm:spPr/>
+      <dgm:t>
+        <a:bodyPr/>
+        <a:lstStyle/>
+        <a:p>
+          <a:pPr>
+            <a:buFont typeface="Arial" panose="020B0604020202020204" pitchFamily="34" charset="0"/>
+            <a:buChar char="•"/>
+          </a:pPr>
+          <a:r>
+            <a:rPr lang="es-MX" dirty="0" err="1"/>
+            <a:t>Possible</a:t>
+          </a:r>
+          <a:r>
+            <a:rPr lang="es-MX" dirty="0"/>
+            <a:t> </a:t>
+          </a:r>
+          <a:r>
+            <a:rPr lang="es-MX" dirty="0" err="1"/>
+            <a:t>surrogate</a:t>
+          </a:r>
+          <a:r>
+            <a:rPr lang="es-MX" dirty="0"/>
+            <a:t>?</a:t>
+          </a:r>
+        </a:p>
+      </dgm:t>
+    </dgm:pt>
+    <dgm:pt modelId="{02FEEC52-CF79-4D5D-8CAA-D0C82B963D3C}" type="parTrans" cxnId="{445C70A1-3948-4EBB-B3FE-9A656FD3A156}">
+      <dgm:prSet/>
+      <dgm:spPr/>
+      <dgm:t>
+        <a:bodyPr/>
+        <a:lstStyle/>
+        <a:p>
+          <a:endParaRPr lang="es-MX"/>
+        </a:p>
+      </dgm:t>
+    </dgm:pt>
+    <dgm:pt modelId="{1D1E9F70-ECE2-4116-ADF5-7580F5834271}" type="sibTrans" cxnId="{445C70A1-3948-4EBB-B3FE-9A656FD3A156}">
+      <dgm:prSet/>
+      <dgm:spPr/>
+      <dgm:t>
+        <a:bodyPr/>
+        <a:lstStyle/>
+        <a:p>
+          <a:endParaRPr lang="es-MX"/>
+        </a:p>
+      </dgm:t>
+    </dgm:pt>
+    <dgm:pt modelId="{AB64E652-206A-4150-B9BF-ABCB8DFFC306}" type="pres">
+      <dgm:prSet presAssocID="{CD5D9CA1-1089-44FF-A3DE-86CDE443F47A}" presName="theList" presStyleCnt="0">
+        <dgm:presLayoutVars>
+          <dgm:dir/>
+          <dgm:animLvl val="lvl"/>
+          <dgm:resizeHandles val="exact"/>
+        </dgm:presLayoutVars>
+      </dgm:prSet>
+      <dgm:spPr/>
+    </dgm:pt>
+    <dgm:pt modelId="{A9E86E6A-A7B3-4C7E-80F1-CBFDFD5544DF}" type="pres">
+      <dgm:prSet presAssocID="{7CDF1763-794E-4FF9-AA1A-3C03DF343D9E}" presName="compNode" presStyleCnt="0"/>
+      <dgm:spPr/>
+    </dgm:pt>
+    <dgm:pt modelId="{92D05CA7-6A05-49D3-8928-F672BB7F4054}" type="pres">
+      <dgm:prSet presAssocID="{7CDF1763-794E-4FF9-AA1A-3C03DF343D9E}" presName="noGeometry" presStyleCnt="0"/>
+      <dgm:spPr/>
+    </dgm:pt>
+    <dgm:pt modelId="{F2106B6A-5599-485D-99A4-0B7551A0EDC0}" type="pres">
+      <dgm:prSet presAssocID="{7CDF1763-794E-4FF9-AA1A-3C03DF343D9E}" presName="childTextVisible" presStyleLbl="bgAccFollowNode1" presStyleIdx="0" presStyleCnt="3">
+        <dgm:presLayoutVars>
+          <dgm:bulletEnabled val="1"/>
+        </dgm:presLayoutVars>
+      </dgm:prSet>
+      <dgm:spPr/>
+    </dgm:pt>
+    <dgm:pt modelId="{FD685159-CF3D-4D23-A704-F011BF6621C3}" type="pres">
+      <dgm:prSet presAssocID="{7CDF1763-794E-4FF9-AA1A-3C03DF343D9E}" presName="childTextHidden" presStyleLbl="bgAccFollowNode1" presStyleIdx="0" presStyleCnt="3"/>
+      <dgm:spPr/>
+    </dgm:pt>
+    <dgm:pt modelId="{885622B4-47F1-49B6-A076-067868F4BFB5}" type="pres">
+      <dgm:prSet presAssocID="{7CDF1763-794E-4FF9-AA1A-3C03DF343D9E}" presName="parentText" presStyleLbl="node1" presStyleIdx="0" presStyleCnt="3">
+        <dgm:presLayoutVars>
+          <dgm:chMax val="1"/>
+          <dgm:bulletEnabled val="1"/>
+        </dgm:presLayoutVars>
+      </dgm:prSet>
+      <dgm:spPr/>
+    </dgm:pt>
+    <dgm:pt modelId="{D63B99B6-557E-4FB7-952F-5F9E84082FCF}" type="pres">
+      <dgm:prSet presAssocID="{7CDF1763-794E-4FF9-AA1A-3C03DF343D9E}" presName="aSpace" presStyleCnt="0"/>
+      <dgm:spPr/>
+    </dgm:pt>
+    <dgm:pt modelId="{435849F3-8D99-47FE-B563-89BE042CE0A5}" type="pres">
+      <dgm:prSet presAssocID="{B641506F-02DF-468B-AC83-E36C587E1187}" presName="compNode" presStyleCnt="0"/>
+      <dgm:spPr/>
+    </dgm:pt>
+    <dgm:pt modelId="{59F6C248-5CD8-468A-AA80-714873784FBA}" type="pres">
+      <dgm:prSet presAssocID="{B641506F-02DF-468B-AC83-E36C587E1187}" presName="noGeometry" presStyleCnt="0"/>
+      <dgm:spPr/>
+    </dgm:pt>
+    <dgm:pt modelId="{98E8AAEC-2B51-4BA0-B1A8-41608623D665}" type="pres">
+      <dgm:prSet presAssocID="{B641506F-02DF-468B-AC83-E36C587E1187}" presName="childTextVisible" presStyleLbl="bgAccFollowNode1" presStyleIdx="1" presStyleCnt="3">
+        <dgm:presLayoutVars>
+          <dgm:bulletEnabled val="1"/>
+        </dgm:presLayoutVars>
+      </dgm:prSet>
+      <dgm:spPr/>
+    </dgm:pt>
+    <dgm:pt modelId="{9FCB5ED1-D8FE-45A8-A491-6A8352B1B442}" type="pres">
+      <dgm:prSet presAssocID="{B641506F-02DF-468B-AC83-E36C587E1187}" presName="childTextHidden" presStyleLbl="bgAccFollowNode1" presStyleIdx="1" presStyleCnt="3"/>
+      <dgm:spPr/>
+    </dgm:pt>
+    <dgm:pt modelId="{34CBC0D5-A393-4C63-A161-2DA0EBAE090D}" type="pres">
+      <dgm:prSet presAssocID="{B641506F-02DF-468B-AC83-E36C587E1187}" presName="parentText" presStyleLbl="node1" presStyleIdx="1" presStyleCnt="3">
+        <dgm:presLayoutVars>
+          <dgm:chMax val="1"/>
+          <dgm:bulletEnabled val="1"/>
+        </dgm:presLayoutVars>
+      </dgm:prSet>
+      <dgm:spPr/>
+    </dgm:pt>
+    <dgm:pt modelId="{E8C34CFA-29D6-4E19-9820-C6B6A6875372}" type="pres">
+      <dgm:prSet presAssocID="{B641506F-02DF-468B-AC83-E36C587E1187}" presName="aSpace" presStyleCnt="0"/>
+      <dgm:spPr/>
+    </dgm:pt>
+    <dgm:pt modelId="{4D82E786-EACA-438A-908D-2AFC537792A1}" type="pres">
+      <dgm:prSet presAssocID="{45534BB3-4307-4C55-B39E-5AC5C480EA9F}" presName="compNode" presStyleCnt="0"/>
+      <dgm:spPr/>
+    </dgm:pt>
+    <dgm:pt modelId="{0B0AA9AB-9E62-455E-99C9-A39F16DE9B4B}" type="pres">
+      <dgm:prSet presAssocID="{45534BB3-4307-4C55-B39E-5AC5C480EA9F}" presName="noGeometry" presStyleCnt="0"/>
+      <dgm:spPr/>
+    </dgm:pt>
+    <dgm:pt modelId="{85841FB4-8FA5-49CD-8517-5BCBF26E48F7}" type="pres">
+      <dgm:prSet presAssocID="{45534BB3-4307-4C55-B39E-5AC5C480EA9F}" presName="childTextVisible" presStyleLbl="bgAccFollowNode1" presStyleIdx="2" presStyleCnt="3">
+        <dgm:presLayoutVars>
+          <dgm:bulletEnabled val="1"/>
+        </dgm:presLayoutVars>
+      </dgm:prSet>
+      <dgm:spPr/>
+    </dgm:pt>
+    <dgm:pt modelId="{76C5A459-0060-4AD1-9C61-63233071AB80}" type="pres">
+      <dgm:prSet presAssocID="{45534BB3-4307-4C55-B39E-5AC5C480EA9F}" presName="childTextHidden" presStyleLbl="bgAccFollowNode1" presStyleIdx="2" presStyleCnt="3"/>
+      <dgm:spPr/>
+    </dgm:pt>
+    <dgm:pt modelId="{2D6A50EC-2616-4D01-AB29-A50A5406B599}" type="pres">
+      <dgm:prSet presAssocID="{45534BB3-4307-4C55-B39E-5AC5C480EA9F}" presName="parentText" presStyleLbl="node1" presStyleIdx="2" presStyleCnt="3">
+        <dgm:presLayoutVars>
+          <dgm:chMax val="1"/>
+          <dgm:bulletEnabled val="1"/>
+        </dgm:presLayoutVars>
+      </dgm:prSet>
+      <dgm:spPr/>
+    </dgm:pt>
+  </dgm:ptLst>
+  <dgm:cxnLst>
+    <dgm:cxn modelId="{786BC405-6210-443D-B9F4-B9D2E912F713}" type="presOf" srcId="{9DA4A464-C39E-4847-86BA-29C956B21F98}" destId="{F2106B6A-5599-485D-99A4-0B7551A0EDC0}" srcOrd="0" destOrd="0" presId="urn:microsoft.com/office/officeart/2005/8/layout/hProcess6"/>
+    <dgm:cxn modelId="{992A310B-1D63-47E0-B828-CB580029ECB5}" srcId="{B641506F-02DF-468B-AC83-E36C587E1187}" destId="{97FC2353-595B-4ED5-B9DE-202BAEDA54FB}" srcOrd="0" destOrd="0" parTransId="{ADBC9D8E-0838-48DF-A3B7-99582902B669}" sibTransId="{D6CD01AF-1F2E-4525-9427-BE1F011FDE7E}"/>
+    <dgm:cxn modelId="{B85A830F-EDBD-4950-9BE0-EDFCD0F90732}" srcId="{7CDF1763-794E-4FF9-AA1A-3C03DF343D9E}" destId="{BF014CA8-9764-4AFD-8927-98FAA2B18FAA}" srcOrd="1" destOrd="0" parTransId="{558E7CDD-FEAC-4733-881F-9E462E2ED6D4}" sibTransId="{1D438975-F48A-48E4-AA55-BC34A4F63805}"/>
+    <dgm:cxn modelId="{57E23A17-56AB-4D31-8132-B5A1FE833EA5}" type="presOf" srcId="{CD5D9CA1-1089-44FF-A3DE-86CDE443F47A}" destId="{AB64E652-206A-4150-B9BF-ABCB8DFFC306}" srcOrd="0" destOrd="0" presId="urn:microsoft.com/office/officeart/2005/8/layout/hProcess6"/>
+    <dgm:cxn modelId="{15181E1B-4866-4C99-9E74-84ABEE461E35}" type="presOf" srcId="{9DA4A464-C39E-4847-86BA-29C956B21F98}" destId="{FD685159-CF3D-4D23-A704-F011BF6621C3}" srcOrd="1" destOrd="0" presId="urn:microsoft.com/office/officeart/2005/8/layout/hProcess6"/>
+    <dgm:cxn modelId="{805AF41F-2318-409D-BEB8-F0C40B53DE62}" type="presOf" srcId="{97FC2353-595B-4ED5-B9DE-202BAEDA54FB}" destId="{98E8AAEC-2B51-4BA0-B1A8-41608623D665}" srcOrd="0" destOrd="0" presId="urn:microsoft.com/office/officeart/2005/8/layout/hProcess6"/>
+    <dgm:cxn modelId="{DCE69D28-8D78-4669-8F04-415CF948C75F}" type="presOf" srcId="{97FC2353-595B-4ED5-B9DE-202BAEDA54FB}" destId="{9FCB5ED1-D8FE-45A8-A491-6A8352B1B442}" srcOrd="1" destOrd="0" presId="urn:microsoft.com/office/officeart/2005/8/layout/hProcess6"/>
+    <dgm:cxn modelId="{2A9A6F35-10F1-4731-A460-7E69E054F67F}" type="presOf" srcId="{B641506F-02DF-468B-AC83-E36C587E1187}" destId="{34CBC0D5-A393-4C63-A161-2DA0EBAE090D}" srcOrd="0" destOrd="0" presId="urn:microsoft.com/office/officeart/2005/8/layout/hProcess6"/>
+    <dgm:cxn modelId="{14B9F25E-7D2B-4AAA-908E-6E061E58CD86}" srcId="{7CDF1763-794E-4FF9-AA1A-3C03DF343D9E}" destId="{9DA4A464-C39E-4847-86BA-29C956B21F98}" srcOrd="0" destOrd="0" parTransId="{18D33262-67BE-43AB-B624-02B1FE7A6F63}" sibTransId="{F8DF5D2F-003A-4BBD-8BB5-C986BB373CF3}"/>
+    <dgm:cxn modelId="{64A2E867-C083-4335-B79A-53B142A7AA7E}" srcId="{CD5D9CA1-1089-44FF-A3DE-86CDE443F47A}" destId="{7CDF1763-794E-4FF9-AA1A-3C03DF343D9E}" srcOrd="0" destOrd="0" parTransId="{604C8167-B9B5-494D-B079-4AE1E2348F47}" sibTransId="{8CC9F13A-1F51-423C-9DA7-A01960149EBC}"/>
+    <dgm:cxn modelId="{F1C2A57B-0F33-4552-BA59-0C9A38EA361E}" type="presOf" srcId="{BF014CA8-9764-4AFD-8927-98FAA2B18FAA}" destId="{FD685159-CF3D-4D23-A704-F011BF6621C3}" srcOrd="1" destOrd="1" presId="urn:microsoft.com/office/officeart/2005/8/layout/hProcess6"/>
+    <dgm:cxn modelId="{45972F85-5331-4EFB-AD01-543AA09DCB15}" type="presOf" srcId="{BF014CA8-9764-4AFD-8927-98FAA2B18FAA}" destId="{F2106B6A-5599-485D-99A4-0B7551A0EDC0}" srcOrd="0" destOrd="1" presId="urn:microsoft.com/office/officeart/2005/8/layout/hProcess6"/>
+    <dgm:cxn modelId="{4A605C8D-C9C4-48A3-AE8F-683D5221733D}" type="presOf" srcId="{7CDF1763-794E-4FF9-AA1A-3C03DF343D9E}" destId="{885622B4-47F1-49B6-A076-067868F4BFB5}" srcOrd="0" destOrd="0" presId="urn:microsoft.com/office/officeart/2005/8/layout/hProcess6"/>
+    <dgm:cxn modelId="{53A70D90-29BB-4705-BCC7-1DFB3055A763}" srcId="{CD5D9CA1-1089-44FF-A3DE-86CDE443F47A}" destId="{B641506F-02DF-468B-AC83-E36C587E1187}" srcOrd="1" destOrd="0" parTransId="{C733213A-F888-4626-9481-CD796CB1EB72}" sibTransId="{40C6D9D0-F392-4F48-822F-7CDAA237B4EB}"/>
+    <dgm:cxn modelId="{445C70A1-3948-4EBB-B3FE-9A656FD3A156}" srcId="{45534BB3-4307-4C55-B39E-5AC5C480EA9F}" destId="{5A923A61-7ABF-4ACA-B07F-74CA5D918E99}" srcOrd="0" destOrd="0" parTransId="{02FEEC52-CF79-4D5D-8CAA-D0C82B963D3C}" sibTransId="{1D1E9F70-ECE2-4116-ADF5-7580F5834271}"/>
+    <dgm:cxn modelId="{417806C2-5E5C-45F0-ACDA-82D98CDB530F}" type="presOf" srcId="{45534BB3-4307-4C55-B39E-5AC5C480EA9F}" destId="{2D6A50EC-2616-4D01-AB29-A50A5406B599}" srcOrd="0" destOrd="0" presId="urn:microsoft.com/office/officeart/2005/8/layout/hProcess6"/>
+    <dgm:cxn modelId="{C60BEECD-A6A4-4291-923B-44761D7B613C}" type="presOf" srcId="{5A923A61-7ABF-4ACA-B07F-74CA5D918E99}" destId="{76C5A459-0060-4AD1-9C61-63233071AB80}" srcOrd="1" destOrd="0" presId="urn:microsoft.com/office/officeart/2005/8/layout/hProcess6"/>
+    <dgm:cxn modelId="{C8ED47D0-E838-406E-87F6-B48D24954F73}" type="presOf" srcId="{5A923A61-7ABF-4ACA-B07F-74CA5D918E99}" destId="{85841FB4-8FA5-49CD-8517-5BCBF26E48F7}" srcOrd="0" destOrd="0" presId="urn:microsoft.com/office/officeart/2005/8/layout/hProcess6"/>
+    <dgm:cxn modelId="{89FCD2D2-F0EA-4A0D-9342-A92115904562}" srcId="{B641506F-02DF-468B-AC83-E36C587E1187}" destId="{B0C01E62-57CE-4E64-A0ED-B6D9423C29C6}" srcOrd="1" destOrd="0" parTransId="{A9F2F6FC-8262-4588-B643-AC157661C77A}" sibTransId="{6BDA64AE-B7C8-4C71-B64A-F490D4D93ADD}"/>
+    <dgm:cxn modelId="{FFDE2CDC-6BF4-4687-BBD7-20F50BEFB98C}" type="presOf" srcId="{B0C01E62-57CE-4E64-A0ED-B6D9423C29C6}" destId="{98E8AAEC-2B51-4BA0-B1A8-41608623D665}" srcOrd="0" destOrd="1" presId="urn:microsoft.com/office/officeart/2005/8/layout/hProcess6"/>
+    <dgm:cxn modelId="{AE1027F1-F916-40A2-B123-A6EEE51937A0}" type="presOf" srcId="{B0C01E62-57CE-4E64-A0ED-B6D9423C29C6}" destId="{9FCB5ED1-D8FE-45A8-A491-6A8352B1B442}" srcOrd="1" destOrd="1" presId="urn:microsoft.com/office/officeart/2005/8/layout/hProcess6"/>
+    <dgm:cxn modelId="{6B99AFF8-C700-4CD6-8FA7-29C0AFA4E09A}" srcId="{CD5D9CA1-1089-44FF-A3DE-86CDE443F47A}" destId="{45534BB3-4307-4C55-B39E-5AC5C480EA9F}" srcOrd="2" destOrd="0" parTransId="{002989FB-2A6D-4788-8039-D4227CD388EB}" sibTransId="{D687F87F-D58C-40D7-B88D-2078FCEA1B17}"/>
+    <dgm:cxn modelId="{09DF78B8-83A7-4116-9B0B-4E77F9E96FAD}" type="presParOf" srcId="{AB64E652-206A-4150-B9BF-ABCB8DFFC306}" destId="{A9E86E6A-A7B3-4C7E-80F1-CBFDFD5544DF}" srcOrd="0" destOrd="0" presId="urn:microsoft.com/office/officeart/2005/8/layout/hProcess6"/>
+    <dgm:cxn modelId="{1975FDCA-EC62-48F3-AE37-0A9DF03ADBCC}" type="presParOf" srcId="{A9E86E6A-A7B3-4C7E-80F1-CBFDFD5544DF}" destId="{92D05CA7-6A05-49D3-8928-F672BB7F4054}" srcOrd="0" destOrd="0" presId="urn:microsoft.com/office/officeart/2005/8/layout/hProcess6"/>
+    <dgm:cxn modelId="{E5741803-5161-4D5D-B854-FF7C19A380B4}" type="presParOf" srcId="{A9E86E6A-A7B3-4C7E-80F1-CBFDFD5544DF}" destId="{F2106B6A-5599-485D-99A4-0B7551A0EDC0}" srcOrd="1" destOrd="0" presId="urn:microsoft.com/office/officeart/2005/8/layout/hProcess6"/>
+    <dgm:cxn modelId="{FAD9B3D8-0027-4D41-B9BF-AC32B55FF0D3}" type="presParOf" srcId="{A9E86E6A-A7B3-4C7E-80F1-CBFDFD5544DF}" destId="{FD685159-CF3D-4D23-A704-F011BF6621C3}" srcOrd="2" destOrd="0" presId="urn:microsoft.com/office/officeart/2005/8/layout/hProcess6"/>
+    <dgm:cxn modelId="{9958EAFF-5516-43C5-ACC4-3211897E6951}" type="presParOf" srcId="{A9E86E6A-A7B3-4C7E-80F1-CBFDFD5544DF}" destId="{885622B4-47F1-49B6-A076-067868F4BFB5}" srcOrd="3" destOrd="0" presId="urn:microsoft.com/office/officeart/2005/8/layout/hProcess6"/>
+    <dgm:cxn modelId="{A56CF4C4-7275-4ECE-A7CF-C8FE577F8B8B}" type="presParOf" srcId="{AB64E652-206A-4150-B9BF-ABCB8DFFC306}" destId="{D63B99B6-557E-4FB7-952F-5F9E84082FCF}" srcOrd="1" destOrd="0" presId="urn:microsoft.com/office/officeart/2005/8/layout/hProcess6"/>
+    <dgm:cxn modelId="{861459E9-CC1B-4009-87C3-FCF32D0FF660}" type="presParOf" srcId="{AB64E652-206A-4150-B9BF-ABCB8DFFC306}" destId="{435849F3-8D99-47FE-B563-89BE042CE0A5}" srcOrd="2" destOrd="0" presId="urn:microsoft.com/office/officeart/2005/8/layout/hProcess6"/>
+    <dgm:cxn modelId="{A4F4CBAE-B796-4572-961F-201BAC97434F}" type="presParOf" srcId="{435849F3-8D99-47FE-B563-89BE042CE0A5}" destId="{59F6C248-5CD8-468A-AA80-714873784FBA}" srcOrd="0" destOrd="0" presId="urn:microsoft.com/office/officeart/2005/8/layout/hProcess6"/>
+    <dgm:cxn modelId="{C8EEF594-0183-406E-87BC-9A9533752801}" type="presParOf" srcId="{435849F3-8D99-47FE-B563-89BE042CE0A5}" destId="{98E8AAEC-2B51-4BA0-B1A8-41608623D665}" srcOrd="1" destOrd="0" presId="urn:microsoft.com/office/officeart/2005/8/layout/hProcess6"/>
+    <dgm:cxn modelId="{3B977D5B-BD3C-4CEA-BE7D-E2BEF66CA6DD}" type="presParOf" srcId="{435849F3-8D99-47FE-B563-89BE042CE0A5}" destId="{9FCB5ED1-D8FE-45A8-A491-6A8352B1B442}" srcOrd="2" destOrd="0" presId="urn:microsoft.com/office/officeart/2005/8/layout/hProcess6"/>
+    <dgm:cxn modelId="{60D5E778-F5FF-4462-90FA-2562ED5AB523}" type="presParOf" srcId="{435849F3-8D99-47FE-B563-89BE042CE0A5}" destId="{34CBC0D5-A393-4C63-A161-2DA0EBAE090D}" srcOrd="3" destOrd="0" presId="urn:microsoft.com/office/officeart/2005/8/layout/hProcess6"/>
+    <dgm:cxn modelId="{95BB1345-A27C-4AD9-B5D3-412C4CCC2EA6}" type="presParOf" srcId="{AB64E652-206A-4150-B9BF-ABCB8DFFC306}" destId="{E8C34CFA-29D6-4E19-9820-C6B6A6875372}" srcOrd="3" destOrd="0" presId="urn:microsoft.com/office/officeart/2005/8/layout/hProcess6"/>
+    <dgm:cxn modelId="{0E4BFCC7-58C9-4093-B0C1-F892CF0B20C2}" type="presParOf" srcId="{AB64E652-206A-4150-B9BF-ABCB8DFFC306}" destId="{4D82E786-EACA-438A-908D-2AFC537792A1}" srcOrd="4" destOrd="0" presId="urn:microsoft.com/office/officeart/2005/8/layout/hProcess6"/>
+    <dgm:cxn modelId="{F5910192-24C5-4D1F-B064-B538D34289F1}" type="presParOf" srcId="{4D82E786-EACA-438A-908D-2AFC537792A1}" destId="{0B0AA9AB-9E62-455E-99C9-A39F16DE9B4B}" srcOrd="0" destOrd="0" presId="urn:microsoft.com/office/officeart/2005/8/layout/hProcess6"/>
+    <dgm:cxn modelId="{DEBA7673-5909-4BC1-98EE-0DD91F61E1A4}" type="presParOf" srcId="{4D82E786-EACA-438A-908D-2AFC537792A1}" destId="{85841FB4-8FA5-49CD-8517-5BCBF26E48F7}" srcOrd="1" destOrd="0" presId="urn:microsoft.com/office/officeart/2005/8/layout/hProcess6"/>
+    <dgm:cxn modelId="{52421AA9-818C-49C2-BFC3-629E8F3A2F5E}" type="presParOf" srcId="{4D82E786-EACA-438A-908D-2AFC537792A1}" destId="{76C5A459-0060-4AD1-9C61-63233071AB80}" srcOrd="2" destOrd="0" presId="urn:microsoft.com/office/officeart/2005/8/layout/hProcess6"/>
+    <dgm:cxn modelId="{CD78DBFD-1708-4DA1-83C1-C8A6DDABE393}" type="presParOf" srcId="{4D82E786-EACA-438A-908D-2AFC537792A1}" destId="{2D6A50EC-2616-4D01-AB29-A50A5406B599}" srcOrd="3" destOrd="0" presId="urn:microsoft.com/office/officeart/2005/8/layout/hProcess6"/>
+  </dgm:cxnLst>
+  <dgm:bg/>
+  <dgm:whole/>
+  <dgm:extLst>
+    <a:ext uri="http://schemas.microsoft.com/office/drawing/2008/diagram">
+      <dsp:dataModelExt xmlns:dsp="http://schemas.microsoft.com/office/drawing/2008/diagram" relId="rId10" minVer="http://schemas.openxmlformats.org/drawingml/2006/diagram"/>
+    </a:ext>
+  </dgm:extLst>
+</dgm:dataModel>
+</file>
+
+<file path=ppt/diagrams/data3.xml><?xml version="1.0" encoding="utf-8"?>
 <dgm:dataModel xmlns:dgm="http://schemas.openxmlformats.org/drawingml/2006/diagram" xmlns:a="http://schemas.openxmlformats.org/drawingml/2006/main">
   <dgm:ptLst>
     <dgm:pt modelId="{F360D8E8-CE83-45FE-AD6B-CF3420B081BA}" type="doc">
@@ -2761,6 +4105,576 @@
 </file>
 
 <file path=ppt/diagrams/drawing2.xml><?xml version="1.0" encoding="utf-8"?>
+<dsp:drawing xmlns:dgm="http://schemas.openxmlformats.org/drawingml/2006/diagram" xmlns:dsp="http://schemas.microsoft.com/office/drawing/2008/diagram" xmlns:a="http://schemas.openxmlformats.org/drawingml/2006/main">
+  <dsp:spTree>
+    <dsp:nvGrpSpPr>
+      <dsp:cNvPr id="0" name=""/>
+      <dsp:cNvGrpSpPr/>
+    </dsp:nvGrpSpPr>
+    <dsp:grpSpPr/>
+    <dsp:sp modelId="{F2106B6A-5599-485D-99A4-0B7551A0EDC0}">
+      <dsp:nvSpPr>
+        <dsp:cNvPr id="0" name=""/>
+        <dsp:cNvSpPr/>
+      </dsp:nvSpPr>
+      <dsp:spPr>
+        <a:xfrm>
+          <a:off x="433484" y="1053537"/>
+          <a:ext cx="1720899" cy="1504282"/>
+        </a:xfrm>
+        <a:prstGeom prst="rightArrow">
+          <a:avLst>
+            <a:gd name="adj1" fmla="val 70000"/>
+            <a:gd name="adj2" fmla="val 50000"/>
+          </a:avLst>
+        </a:prstGeom>
+        <a:solidFill>
+          <a:schemeClr val="accent1">
+            <a:alpha val="90000"/>
+            <a:tint val="40000"/>
+            <a:hueOff val="0"/>
+            <a:satOff val="0"/>
+            <a:lumOff val="0"/>
+            <a:alphaOff val="0"/>
+          </a:schemeClr>
+        </a:solidFill>
+        <a:ln w="15875" cap="flat" cmpd="sng" algn="ctr">
+          <a:solidFill>
+            <a:schemeClr val="accent1">
+              <a:alpha val="90000"/>
+              <a:tint val="40000"/>
+              <a:hueOff val="0"/>
+              <a:satOff val="0"/>
+              <a:lumOff val="0"/>
+              <a:alphaOff val="0"/>
+            </a:schemeClr>
+          </a:solidFill>
+          <a:prstDash val="solid"/>
+        </a:ln>
+        <a:effectLst/>
+      </dsp:spPr>
+      <dsp:style>
+        <a:lnRef idx="2">
+          <a:scrgbClr r="0" g="0" b="0"/>
+        </a:lnRef>
+        <a:fillRef idx="1">
+          <a:scrgbClr r="0" g="0" b="0"/>
+        </a:fillRef>
+        <a:effectRef idx="0">
+          <a:scrgbClr r="0" g="0" b="0"/>
+        </a:effectRef>
+        <a:fontRef idx="minor"/>
+      </dsp:style>
+      <dsp:txBody>
+        <a:bodyPr spcFirstLastPara="0" vert="horz" wrap="square" lIns="35560" tIns="8890" rIns="17780" bIns="8890" numCol="1" spcCol="1270" anchor="ctr" anchorCtr="0">
+          <a:noAutofit/>
+        </a:bodyPr>
+        <a:lstStyle/>
+        <a:p>
+          <a:pPr marL="114300" lvl="1" indent="-114300" algn="l" defTabSz="622300">
+            <a:lnSpc>
+              <a:spcPct val="90000"/>
+            </a:lnSpc>
+            <a:spcBef>
+              <a:spcPct val="0"/>
+            </a:spcBef>
+            <a:spcAft>
+              <a:spcPct val="15000"/>
+            </a:spcAft>
+            <a:buChar char="•"/>
+          </a:pPr>
+          <a:r>
+            <a:rPr lang="es-MX" sz="1400" kern="1200" dirty="0"/>
+            <a:t>PANAIR</a:t>
+          </a:r>
+        </a:p>
+        <a:p>
+          <a:pPr marL="114300" lvl="1" indent="-114300" algn="l" defTabSz="622300">
+            <a:lnSpc>
+              <a:spcPct val="90000"/>
+            </a:lnSpc>
+            <a:spcBef>
+              <a:spcPct val="0"/>
+            </a:spcBef>
+            <a:spcAft>
+              <a:spcPct val="15000"/>
+            </a:spcAft>
+            <a:buChar char="•"/>
+          </a:pPr>
+          <a:r>
+            <a:rPr lang="es-MX" sz="1400" kern="1200" dirty="0" err="1"/>
+            <a:t>Initial</a:t>
+          </a:r>
+          <a:r>
+            <a:rPr lang="es-MX" sz="1400" kern="1200" dirty="0"/>
+            <a:t> disp.</a:t>
+          </a:r>
+        </a:p>
+      </dsp:txBody>
+      <dsp:txXfrm>
+        <a:off x="863709" y="1279179"/>
+        <a:ext cx="838938" cy="1052998"/>
+      </dsp:txXfrm>
+    </dsp:sp>
+    <dsp:sp modelId="{885622B4-47F1-49B6-A076-067868F4BFB5}">
+      <dsp:nvSpPr>
+        <dsp:cNvPr id="0" name=""/>
+        <dsp:cNvSpPr/>
+      </dsp:nvSpPr>
+      <dsp:spPr>
+        <a:xfrm>
+          <a:off x="3259" y="1375453"/>
+          <a:ext cx="860449" cy="860449"/>
+        </a:xfrm>
+        <a:prstGeom prst="ellipse">
+          <a:avLst/>
+        </a:prstGeom>
+        <a:solidFill>
+          <a:schemeClr val="accent1">
+            <a:hueOff val="0"/>
+            <a:satOff val="0"/>
+            <a:lumOff val="0"/>
+            <a:alphaOff val="0"/>
+          </a:schemeClr>
+        </a:solidFill>
+        <a:ln w="15875" cap="flat" cmpd="sng" algn="ctr">
+          <a:solidFill>
+            <a:schemeClr val="lt1">
+              <a:hueOff val="0"/>
+              <a:satOff val="0"/>
+              <a:lumOff val="0"/>
+              <a:alphaOff val="0"/>
+            </a:schemeClr>
+          </a:solidFill>
+          <a:prstDash val="solid"/>
+        </a:ln>
+        <a:effectLst/>
+      </dsp:spPr>
+      <dsp:style>
+        <a:lnRef idx="2">
+          <a:scrgbClr r="0" g="0" b="0"/>
+        </a:lnRef>
+        <a:fillRef idx="1">
+          <a:scrgbClr r="0" g="0" b="0"/>
+        </a:fillRef>
+        <a:effectRef idx="0">
+          <a:scrgbClr r="0" g="0" b="0"/>
+        </a:effectRef>
+        <a:fontRef idx="minor">
+          <a:schemeClr val="lt1"/>
+        </a:fontRef>
+      </dsp:style>
+      <dsp:txBody>
+        <a:bodyPr spcFirstLastPara="0" vert="horz" wrap="square" lIns="6985" tIns="6985" rIns="6985" bIns="6985" numCol="1" spcCol="1270" anchor="ctr" anchorCtr="0">
+          <a:noAutofit/>
+        </a:bodyPr>
+        <a:lstStyle/>
+        <a:p>
+          <a:pPr marL="0" lvl="0" indent="0" algn="ctr" defTabSz="488950">
+            <a:lnSpc>
+              <a:spcPct val="90000"/>
+            </a:lnSpc>
+            <a:spcBef>
+              <a:spcPct val="0"/>
+            </a:spcBef>
+            <a:spcAft>
+              <a:spcPct val="35000"/>
+            </a:spcAft>
+            <a:buNone/>
+          </a:pPr>
+          <a:r>
+            <a:rPr lang="es-MX" sz="1100" kern="1200" dirty="0" err="1"/>
+            <a:t>Start</a:t>
+          </a:r>
+          <a:endParaRPr lang="es-MX" sz="1100" kern="1200" dirty="0"/>
+        </a:p>
+      </dsp:txBody>
+      <dsp:txXfrm>
+        <a:off x="129269" y="1501463"/>
+        <a:ext cx="608429" cy="608429"/>
+      </dsp:txXfrm>
+    </dsp:sp>
+    <dsp:sp modelId="{98E8AAEC-2B51-4BA0-B1A8-41608623D665}">
+      <dsp:nvSpPr>
+        <dsp:cNvPr id="0" name=""/>
+        <dsp:cNvSpPr/>
+      </dsp:nvSpPr>
+      <dsp:spPr>
+        <a:xfrm>
+          <a:off x="2692165" y="1053537"/>
+          <a:ext cx="1720899" cy="1504282"/>
+        </a:xfrm>
+        <a:prstGeom prst="rightArrow">
+          <a:avLst>
+            <a:gd name="adj1" fmla="val 70000"/>
+            <a:gd name="adj2" fmla="val 50000"/>
+          </a:avLst>
+        </a:prstGeom>
+        <a:solidFill>
+          <a:schemeClr val="accent1">
+            <a:alpha val="90000"/>
+            <a:tint val="40000"/>
+            <a:hueOff val="0"/>
+            <a:satOff val="0"/>
+            <a:lumOff val="0"/>
+            <a:alphaOff val="0"/>
+          </a:schemeClr>
+        </a:solidFill>
+        <a:ln w="15875" cap="flat" cmpd="sng" algn="ctr">
+          <a:solidFill>
+            <a:schemeClr val="accent1">
+              <a:alpha val="90000"/>
+              <a:tint val="40000"/>
+              <a:hueOff val="0"/>
+              <a:satOff val="0"/>
+              <a:lumOff val="0"/>
+              <a:alphaOff val="0"/>
+            </a:schemeClr>
+          </a:solidFill>
+          <a:prstDash val="solid"/>
+        </a:ln>
+        <a:effectLst/>
+      </dsp:spPr>
+      <dsp:style>
+        <a:lnRef idx="2">
+          <a:scrgbClr r="0" g="0" b="0"/>
+        </a:lnRef>
+        <a:fillRef idx="1">
+          <a:scrgbClr r="0" g="0" b="0"/>
+        </a:fillRef>
+        <a:effectRef idx="0">
+          <a:scrgbClr r="0" g="0" b="0"/>
+        </a:effectRef>
+        <a:fontRef idx="minor"/>
+      </dsp:style>
+      <dsp:txBody>
+        <a:bodyPr spcFirstLastPara="0" vert="horz" wrap="square" lIns="35560" tIns="8890" rIns="17780" bIns="8890" numCol="1" spcCol="1270" anchor="ctr" anchorCtr="0">
+          <a:noAutofit/>
+        </a:bodyPr>
+        <a:lstStyle/>
+        <a:p>
+          <a:pPr marL="114300" lvl="1" indent="-114300" algn="l" defTabSz="622300">
+            <a:lnSpc>
+              <a:spcPct val="90000"/>
+            </a:lnSpc>
+            <a:spcBef>
+              <a:spcPct val="0"/>
+            </a:spcBef>
+            <a:spcAft>
+              <a:spcPct val="15000"/>
+            </a:spcAft>
+            <a:buChar char="•"/>
+          </a:pPr>
+          <a:r>
+            <a:rPr lang="es-MX" sz="1400" kern="1200" dirty="0" err="1"/>
+            <a:t>AdFlow</a:t>
+          </a:r>
+          <a:endParaRPr lang="es-MX" sz="1400" kern="1200" dirty="0"/>
+        </a:p>
+        <a:p>
+          <a:pPr marL="114300" lvl="1" indent="-114300" algn="l" defTabSz="622300">
+            <a:lnSpc>
+              <a:spcPct val="90000"/>
+            </a:lnSpc>
+            <a:spcBef>
+              <a:spcPct val="0"/>
+            </a:spcBef>
+            <a:spcAft>
+              <a:spcPct val="15000"/>
+            </a:spcAft>
+            <a:buChar char="•"/>
+          </a:pPr>
+          <a:r>
+            <a:rPr lang="es-MX" sz="1400" kern="1200" dirty="0" err="1"/>
+            <a:t>Inherit</a:t>
+          </a:r>
+          <a:r>
+            <a:rPr lang="es-MX" sz="1400" kern="1200" dirty="0"/>
+            <a:t> PANAIR </a:t>
+          </a:r>
+          <a:r>
+            <a:rPr lang="es-MX" sz="1400" kern="1200" dirty="0" err="1"/>
+            <a:t>solution</a:t>
+          </a:r>
+          <a:endParaRPr lang="es-MX" sz="1400" kern="1200" dirty="0"/>
+        </a:p>
+      </dsp:txBody>
+      <dsp:txXfrm>
+        <a:off x="3122390" y="1279179"/>
+        <a:ext cx="838938" cy="1052998"/>
+      </dsp:txXfrm>
+    </dsp:sp>
+    <dsp:sp modelId="{34CBC0D5-A393-4C63-A161-2DA0EBAE090D}">
+      <dsp:nvSpPr>
+        <dsp:cNvPr id="0" name=""/>
+        <dsp:cNvSpPr/>
+      </dsp:nvSpPr>
+      <dsp:spPr>
+        <a:xfrm>
+          <a:off x="2261940" y="1375453"/>
+          <a:ext cx="860449" cy="860449"/>
+        </a:xfrm>
+        <a:prstGeom prst="ellipse">
+          <a:avLst/>
+        </a:prstGeom>
+        <a:solidFill>
+          <a:schemeClr val="accent1">
+            <a:hueOff val="0"/>
+            <a:satOff val="0"/>
+            <a:lumOff val="0"/>
+            <a:alphaOff val="0"/>
+          </a:schemeClr>
+        </a:solidFill>
+        <a:ln w="15875" cap="flat" cmpd="sng" algn="ctr">
+          <a:solidFill>
+            <a:schemeClr val="lt1">
+              <a:hueOff val="0"/>
+              <a:satOff val="0"/>
+              <a:lumOff val="0"/>
+              <a:alphaOff val="0"/>
+            </a:schemeClr>
+          </a:solidFill>
+          <a:prstDash val="solid"/>
+        </a:ln>
+        <a:effectLst/>
+      </dsp:spPr>
+      <dsp:style>
+        <a:lnRef idx="2">
+          <a:scrgbClr r="0" g="0" b="0"/>
+        </a:lnRef>
+        <a:fillRef idx="1">
+          <a:scrgbClr r="0" g="0" b="0"/>
+        </a:fillRef>
+        <a:effectRef idx="0">
+          <a:scrgbClr r="0" g="0" b="0"/>
+        </a:effectRef>
+        <a:fontRef idx="minor">
+          <a:schemeClr val="lt1"/>
+        </a:fontRef>
+      </dsp:style>
+      <dsp:txBody>
+        <a:bodyPr spcFirstLastPara="0" vert="horz" wrap="square" lIns="6985" tIns="6985" rIns="6985" bIns="6985" numCol="1" spcCol="1270" anchor="ctr" anchorCtr="0">
+          <a:noAutofit/>
+        </a:bodyPr>
+        <a:lstStyle/>
+        <a:p>
+          <a:pPr marL="0" lvl="0" indent="0" algn="ctr" defTabSz="488950">
+            <a:lnSpc>
+              <a:spcPct val="90000"/>
+            </a:lnSpc>
+            <a:spcBef>
+              <a:spcPct val="0"/>
+            </a:spcBef>
+            <a:spcAft>
+              <a:spcPct val="35000"/>
+            </a:spcAft>
+            <a:buNone/>
+          </a:pPr>
+          <a:r>
+            <a:rPr lang="es-MX" sz="1100" kern="1200" dirty="0"/>
+            <a:t>Fidelity Change</a:t>
+          </a:r>
+        </a:p>
+      </dsp:txBody>
+      <dsp:txXfrm>
+        <a:off x="2387950" y="1501463"/>
+        <a:ext cx="608429" cy="608429"/>
+      </dsp:txXfrm>
+    </dsp:sp>
+    <dsp:sp modelId="{85841FB4-8FA5-49CD-8517-5BCBF26E48F7}">
+      <dsp:nvSpPr>
+        <dsp:cNvPr id="0" name=""/>
+        <dsp:cNvSpPr/>
+      </dsp:nvSpPr>
+      <dsp:spPr>
+        <a:xfrm>
+          <a:off x="4950845" y="1053537"/>
+          <a:ext cx="1720899" cy="1504282"/>
+        </a:xfrm>
+        <a:prstGeom prst="rightArrow">
+          <a:avLst>
+            <a:gd name="adj1" fmla="val 70000"/>
+            <a:gd name="adj2" fmla="val 50000"/>
+          </a:avLst>
+        </a:prstGeom>
+        <a:solidFill>
+          <a:schemeClr val="accent1">
+            <a:alpha val="90000"/>
+            <a:tint val="40000"/>
+            <a:hueOff val="0"/>
+            <a:satOff val="0"/>
+            <a:lumOff val="0"/>
+            <a:alphaOff val="0"/>
+          </a:schemeClr>
+        </a:solidFill>
+        <a:ln w="15875" cap="flat" cmpd="sng" algn="ctr">
+          <a:solidFill>
+            <a:schemeClr val="accent1">
+              <a:alpha val="90000"/>
+              <a:tint val="40000"/>
+              <a:hueOff val="0"/>
+              <a:satOff val="0"/>
+              <a:lumOff val="0"/>
+              <a:alphaOff val="0"/>
+            </a:schemeClr>
+          </a:solidFill>
+          <a:prstDash val="solid"/>
+        </a:ln>
+        <a:effectLst/>
+      </dsp:spPr>
+      <dsp:style>
+        <a:lnRef idx="2">
+          <a:scrgbClr r="0" g="0" b="0"/>
+        </a:lnRef>
+        <a:fillRef idx="1">
+          <a:scrgbClr r="0" g="0" b="0"/>
+        </a:fillRef>
+        <a:effectRef idx="0">
+          <a:scrgbClr r="0" g="0" b="0"/>
+        </a:effectRef>
+        <a:fontRef idx="minor"/>
+      </dsp:style>
+      <dsp:txBody>
+        <a:bodyPr spcFirstLastPara="0" vert="horz" wrap="square" lIns="35560" tIns="8890" rIns="17780" bIns="8890" numCol="1" spcCol="1270" anchor="ctr" anchorCtr="0">
+          <a:noAutofit/>
+        </a:bodyPr>
+        <a:lstStyle/>
+        <a:p>
+          <a:pPr marL="0" lvl="0" indent="0" algn="ctr" defTabSz="622300">
+            <a:lnSpc>
+              <a:spcPct val="90000"/>
+            </a:lnSpc>
+            <a:spcBef>
+              <a:spcPct val="0"/>
+            </a:spcBef>
+            <a:spcAft>
+              <a:spcPct val="35000"/>
+            </a:spcAft>
+            <a:buFont typeface="Arial" panose="020B0604020202020204" pitchFamily="34" charset="0"/>
+            <a:buNone/>
+          </a:pPr>
+          <a:r>
+            <a:rPr lang="es-MX" sz="1400" kern="1200" dirty="0" err="1"/>
+            <a:t>Possible</a:t>
+          </a:r>
+          <a:r>
+            <a:rPr lang="es-MX" sz="1400" kern="1200" dirty="0"/>
+            <a:t> </a:t>
+          </a:r>
+          <a:r>
+            <a:rPr lang="es-MX" sz="1400" kern="1200" dirty="0" err="1"/>
+            <a:t>surrogate</a:t>
+          </a:r>
+          <a:r>
+            <a:rPr lang="es-MX" sz="1400" kern="1200" dirty="0"/>
+            <a:t>?</a:t>
+          </a:r>
+        </a:p>
+      </dsp:txBody>
+      <dsp:txXfrm>
+        <a:off x="5381070" y="1279179"/>
+        <a:ext cx="838938" cy="1052998"/>
+      </dsp:txXfrm>
+    </dsp:sp>
+    <dsp:sp modelId="{2D6A50EC-2616-4D01-AB29-A50A5406B599}">
+      <dsp:nvSpPr>
+        <dsp:cNvPr id="0" name=""/>
+        <dsp:cNvSpPr/>
+      </dsp:nvSpPr>
+      <dsp:spPr>
+        <a:xfrm>
+          <a:off x="4520621" y="1375453"/>
+          <a:ext cx="860449" cy="860449"/>
+        </a:xfrm>
+        <a:prstGeom prst="ellipse">
+          <a:avLst/>
+        </a:prstGeom>
+        <a:solidFill>
+          <a:schemeClr val="accent1">
+            <a:hueOff val="0"/>
+            <a:satOff val="0"/>
+            <a:lumOff val="0"/>
+            <a:alphaOff val="0"/>
+          </a:schemeClr>
+        </a:solidFill>
+        <a:ln w="15875" cap="flat" cmpd="sng" algn="ctr">
+          <a:solidFill>
+            <a:schemeClr val="lt1">
+              <a:hueOff val="0"/>
+              <a:satOff val="0"/>
+              <a:lumOff val="0"/>
+              <a:alphaOff val="0"/>
+            </a:schemeClr>
+          </a:solidFill>
+          <a:prstDash val="solid"/>
+        </a:ln>
+        <a:effectLst/>
+      </dsp:spPr>
+      <dsp:style>
+        <a:lnRef idx="2">
+          <a:scrgbClr r="0" g="0" b="0"/>
+        </a:lnRef>
+        <a:fillRef idx="1">
+          <a:scrgbClr r="0" g="0" b="0"/>
+        </a:fillRef>
+        <a:effectRef idx="0">
+          <a:scrgbClr r="0" g="0" b="0"/>
+        </a:effectRef>
+        <a:fontRef idx="minor">
+          <a:schemeClr val="lt1"/>
+        </a:fontRef>
+      </dsp:style>
+      <dsp:txBody>
+        <a:bodyPr spcFirstLastPara="0" vert="horz" wrap="square" lIns="6985" tIns="6985" rIns="6985" bIns="6985" numCol="1" spcCol="1270" anchor="ctr" anchorCtr="0">
+          <a:noAutofit/>
+        </a:bodyPr>
+        <a:lstStyle/>
+        <a:p>
+          <a:pPr marL="0" lvl="0" indent="0" algn="ctr" defTabSz="488950">
+            <a:lnSpc>
+              <a:spcPct val="90000"/>
+            </a:lnSpc>
+            <a:spcBef>
+              <a:spcPct val="0"/>
+            </a:spcBef>
+            <a:spcAft>
+              <a:spcPct val="35000"/>
+            </a:spcAft>
+            <a:buNone/>
+          </a:pPr>
+          <a:r>
+            <a:rPr lang="es-MX" sz="1100" kern="1200" dirty="0" err="1"/>
+            <a:t>Outer</a:t>
+          </a:r>
+          <a:r>
+            <a:rPr lang="es-MX" sz="1100" kern="1200" dirty="0"/>
+            <a:t> </a:t>
+          </a:r>
+          <a:r>
+            <a:rPr lang="es-MX" sz="1100" kern="1200" dirty="0" err="1"/>
+            <a:t>Loop</a:t>
+          </a:r>
+          <a:r>
+            <a:rPr lang="es-MX" sz="1100" kern="1200" dirty="0"/>
+            <a:t> </a:t>
+          </a:r>
+          <a:r>
+            <a:rPr lang="es-MX" sz="1100" kern="1200" dirty="0" err="1"/>
+            <a:t>Optimizer</a:t>
+          </a:r>
+          <a:endParaRPr lang="es-MX" sz="1100" kern="1200" dirty="0"/>
+        </a:p>
+      </dsp:txBody>
+      <dsp:txXfrm>
+        <a:off x="4646631" y="1501463"/>
+        <a:ext cx="608429" cy="608429"/>
+      </dsp:txXfrm>
+    </dsp:sp>
+  </dsp:spTree>
+</dsp:drawing>
+</file>
+
+<file path=ppt/diagrams/drawing3.xml><?xml version="1.0" encoding="utf-8"?>
 <dsp:drawing xmlns:dgm="http://schemas.openxmlformats.org/drawingml/2006/diagram" xmlns:dsp="http://schemas.microsoft.com/office/drawing/2008/diagram" xmlns:a="http://schemas.openxmlformats.org/drawingml/2006/main">
   <dsp:spTree>
     <dsp:nvGrpSpPr>
@@ -3801,6 +5715,300 @@
 </file>
 
 <file path=ppt/diagrams/layout2.xml><?xml version="1.0" encoding="utf-8"?>
+<dgm:layoutDef xmlns:dgm="http://schemas.openxmlformats.org/drawingml/2006/diagram" xmlns:a="http://schemas.openxmlformats.org/drawingml/2006/main" uniqueId="urn:microsoft.com/office/officeart/2005/8/layout/hProcess6">
+  <dgm:title val=""/>
+  <dgm:desc val=""/>
+  <dgm:catLst>
+    <dgm:cat type="process" pri="7000"/>
+  </dgm:catLst>
+  <dgm:sampData>
+    <dgm:dataModel>
+      <dgm:ptLst>
+        <dgm:pt modelId="0" type="doc"/>
+        <dgm:pt modelId="1">
+          <dgm:prSet phldr="1"/>
+        </dgm:pt>
+        <dgm:pt modelId="11">
+          <dgm:prSet phldr="1"/>
+        </dgm:pt>
+        <dgm:pt modelId="12">
+          <dgm:prSet phldr="1"/>
+        </dgm:pt>
+        <dgm:pt modelId="2">
+          <dgm:prSet phldr="1"/>
+        </dgm:pt>
+        <dgm:pt modelId="21">
+          <dgm:prSet phldr="1"/>
+        </dgm:pt>
+        <dgm:pt modelId="22">
+          <dgm:prSet phldr="1"/>
+        </dgm:pt>
+        <dgm:pt modelId="3">
+          <dgm:prSet phldr="1"/>
+        </dgm:pt>
+        <dgm:pt modelId="31">
+          <dgm:prSet phldr="1"/>
+        </dgm:pt>
+        <dgm:pt modelId="32">
+          <dgm:prSet phldr="1"/>
+        </dgm:pt>
+      </dgm:ptLst>
+      <dgm:cxnLst>
+        <dgm:cxn modelId="4" srcId="0" destId="1" srcOrd="0" destOrd="0"/>
+        <dgm:cxn modelId="5" srcId="0" destId="2" srcOrd="1" destOrd="0"/>
+        <dgm:cxn modelId="13" srcId="1" destId="11" srcOrd="0" destOrd="0"/>
+        <dgm:cxn modelId="14" srcId="1" destId="12" srcOrd="0" destOrd="0"/>
+        <dgm:cxn modelId="23" srcId="2" destId="21" srcOrd="0" destOrd="0"/>
+        <dgm:cxn modelId="24" srcId="2" destId="22" srcOrd="0" destOrd="0"/>
+        <dgm:cxn modelId="33" srcId="3" destId="31" srcOrd="0" destOrd="0"/>
+        <dgm:cxn modelId="34" srcId="3" destId="32" srcOrd="0" destOrd="0"/>
+      </dgm:cxnLst>
+      <dgm:bg/>
+      <dgm:whole/>
+    </dgm:dataModel>
+  </dgm:sampData>
+  <dgm:styleData>
+    <dgm:dataModel>
+      <dgm:ptLst>
+        <dgm:pt modelId="0" type="doc"/>
+        <dgm:pt modelId="1"/>
+        <dgm:pt modelId="11"/>
+        <dgm:pt modelId="2"/>
+        <dgm:pt modelId="21"/>
+      </dgm:ptLst>
+      <dgm:cxnLst>
+        <dgm:cxn modelId="4" srcId="0" destId="1" srcOrd="0" destOrd="0"/>
+        <dgm:cxn modelId="5" srcId="0" destId="2" srcOrd="1" destOrd="0"/>
+        <dgm:cxn modelId="13" srcId="1" destId="11" srcOrd="0" destOrd="0"/>
+        <dgm:cxn modelId="23" srcId="2" destId="21" srcOrd="0" destOrd="0"/>
+      </dgm:cxnLst>
+      <dgm:bg/>
+      <dgm:whole/>
+    </dgm:dataModel>
+  </dgm:styleData>
+  <dgm:clrData>
+    <dgm:dataModel>
+      <dgm:ptLst>
+        <dgm:pt modelId="0" type="doc"/>
+        <dgm:pt modelId="1"/>
+        <dgm:pt modelId="11"/>
+        <dgm:pt modelId="2"/>
+        <dgm:pt modelId="21"/>
+        <dgm:pt modelId="3"/>
+        <dgm:pt modelId="31"/>
+        <dgm:pt modelId="4"/>
+        <dgm:pt modelId="41"/>
+      </dgm:ptLst>
+      <dgm:cxnLst>
+        <dgm:cxn modelId="5" srcId="0" destId="1" srcOrd="0" destOrd="0"/>
+        <dgm:cxn modelId="6" srcId="0" destId="2" srcOrd="1" destOrd="0"/>
+        <dgm:cxn modelId="7" srcId="0" destId="3" srcOrd="2" destOrd="0"/>
+        <dgm:cxn modelId="8" srcId="0" destId="4" srcOrd="3" destOrd="0"/>
+        <dgm:cxn modelId="13" srcId="1" destId="11" srcOrd="0" destOrd="0"/>
+        <dgm:cxn modelId="23" srcId="2" destId="21" srcOrd="0" destOrd="0"/>
+        <dgm:cxn modelId="33" srcId="3" destId="31" srcOrd="0" destOrd="0"/>
+        <dgm:cxn modelId="43" srcId="4" destId="41" srcOrd="0" destOrd="0"/>
+      </dgm:cxnLst>
+      <dgm:bg/>
+      <dgm:whole/>
+    </dgm:dataModel>
+  </dgm:clrData>
+  <dgm:layoutNode name="theList">
+    <dgm:varLst>
+      <dgm:dir/>
+      <dgm:animLvl val="lvl"/>
+      <dgm:resizeHandles val="exact"/>
+    </dgm:varLst>
+    <dgm:choose name="Name0">
+      <dgm:if name="Name1" func="var" arg="dir" op="equ" val="norm">
+        <dgm:alg type="lin">
+          <dgm:param type="linDir" val="fromL"/>
+          <dgm:param type="nodeHorzAlign" val="l"/>
+        </dgm:alg>
+      </dgm:if>
+      <dgm:else name="Name2">
+        <dgm:alg type="lin">
+          <dgm:param type="linDir" val="fromR"/>
+          <dgm:param type="nodeHorzAlign" val="r"/>
+        </dgm:alg>
+      </dgm:else>
+    </dgm:choose>
+    <dgm:shape xmlns:r="http://schemas.openxmlformats.org/officeDocument/2006/relationships" r:blip="">
+      <dgm:adjLst/>
+    </dgm:shape>
+    <dgm:presOf/>
+    <dgm:constrLst>
+      <dgm:constr type="w" for="ch" forName="compNode" refType="w"/>
+      <dgm:constr type="h" for="ch" forName="compNode" refType="w" refFor="ch" refForName="compNode" fact="0.7"/>
+      <dgm:constr type="ctrY" for="ch" forName="compNode" refType="h" fact="0.5"/>
+      <dgm:constr type="w" for="ch" forName="aSpace" refType="w" fact="0.05"/>
+      <dgm:constr type="primFontSz" for="des" forName="childTextHidden" op="equ" val="65"/>
+      <dgm:constr type="primFontSz" for="des" forName="parentText" op="equ"/>
+    </dgm:constrLst>
+    <dgm:ruleLst/>
+    <dgm:forEach name="aNodeForEach" axis="ch" ptType="node">
+      <dgm:layoutNode name="compNode">
+        <dgm:alg type="composite">
+          <dgm:param type="ar" val="1.43"/>
+        </dgm:alg>
+        <dgm:shape xmlns:r="http://schemas.openxmlformats.org/officeDocument/2006/relationships" r:blip="">
+          <dgm:adjLst/>
+        </dgm:shape>
+        <dgm:presOf/>
+        <dgm:choose name="Name3">
+          <dgm:if name="Name4" func="var" arg="dir" op="equ" val="norm">
+            <dgm:constrLst>
+              <dgm:constr type="w" for="ch" forName="childTextVisible" refType="w" fact="0.8"/>
+              <dgm:constr type="h" for="ch" forName="childTextVisible" refType="h"/>
+              <dgm:constr type="r" for="ch" forName="childTextVisible" refType="w"/>
+              <dgm:constr type="w" for="ch" forName="childTextHidden" refType="w" fact="0.6"/>
+              <dgm:constr type="h" for="ch" forName="childTextHidden" refType="h"/>
+              <dgm:constr type="r" for="ch" forName="childTextHidden" refType="w"/>
+              <dgm:constr type="l" for="ch" forName="parentText"/>
+              <dgm:constr type="w" for="ch" forName="parentText" refType="w" fact="0.4"/>
+              <dgm:constr type="h" for="ch" forName="parentText" refType="w" refFor="ch" refForName="parentText" op="equ"/>
+              <dgm:constr type="ctrY" for="ch" forName="parentText" refType="h" fact="0.5"/>
+            </dgm:constrLst>
+          </dgm:if>
+          <dgm:else name="Name5">
+            <dgm:constrLst>
+              <dgm:constr type="w" for="ch" forName="childTextVisible" refType="w" fact="0.8"/>
+              <dgm:constr type="h" for="ch" forName="childTextVisible" refType="h"/>
+              <dgm:constr type="l" for="ch" forName="childTextVisible"/>
+              <dgm:constr type="w" for="ch" forName="childTextHidden" refType="w" fact="0.6"/>
+              <dgm:constr type="h" for="ch" forName="childTextHidden" refType="h"/>
+              <dgm:constr type="l" for="ch" forName="childTextHidden"/>
+              <dgm:constr type="r" for="ch" forName="parentText" refType="w"/>
+              <dgm:constr type="w" for="ch" forName="parentText" refType="w" fact="0.4"/>
+              <dgm:constr type="h" for="ch" forName="parentText" refType="w" refFor="ch" refForName="parentText" op="equ"/>
+              <dgm:constr type="ctrY" for="ch" forName="parentText" refType="h" fact="0.5"/>
+            </dgm:constrLst>
+          </dgm:else>
+        </dgm:choose>
+        <dgm:ruleLst/>
+        <dgm:layoutNode name="noGeometry">
+          <dgm:alg type="sp"/>
+          <dgm:shape xmlns:r="http://schemas.openxmlformats.org/officeDocument/2006/relationships" r:blip="">
+            <dgm:adjLst/>
+          </dgm:shape>
+          <dgm:presOf/>
+          <dgm:constrLst/>
+          <dgm:ruleLst/>
+        </dgm:layoutNode>
+        <dgm:layoutNode name="childTextVisible" styleLbl="bgAccFollowNode1">
+          <dgm:varLst>
+            <dgm:bulletEnabled val="1"/>
+          </dgm:varLst>
+          <dgm:alg type="sp"/>
+          <dgm:choose name="Name6">
+            <dgm:if name="Name7" func="var" arg="dir" op="equ" val="norm">
+              <dgm:shape xmlns:r="http://schemas.openxmlformats.org/officeDocument/2006/relationships" type="rightArrow" r:blip="">
+                <dgm:adjLst>
+                  <dgm:adj idx="1" val="0.7"/>
+                  <dgm:adj idx="2" val="0.5"/>
+                </dgm:adjLst>
+              </dgm:shape>
+            </dgm:if>
+            <dgm:else name="Name8">
+              <dgm:shape xmlns:r="http://schemas.openxmlformats.org/officeDocument/2006/relationships" type="leftArrow" r:blip="">
+                <dgm:adjLst>
+                  <dgm:adj idx="1" val="0.7"/>
+                  <dgm:adj idx="2" val="0.5"/>
+                </dgm:adjLst>
+              </dgm:shape>
+            </dgm:else>
+          </dgm:choose>
+          <dgm:presOf axis="des" ptType="node"/>
+          <dgm:constrLst/>
+          <dgm:ruleLst/>
+        </dgm:layoutNode>
+        <dgm:layoutNode name="childTextHidden" styleLbl="bgAccFollowNode1">
+          <dgm:choose name="Name9">
+            <dgm:if name="Name10" axis="des followSib" ptType="node node" st="1 1" cnt="1 0" func="cnt" op="gte" val="1">
+              <dgm:alg type="tx">
+                <dgm:param type="stBulletLvl" val="1"/>
+                <dgm:param type="txAnchorVertCh" val="mid"/>
+              </dgm:alg>
+            </dgm:if>
+            <dgm:else name="Name11">
+              <dgm:alg type="tx">
+                <dgm:param type="stBulletLvl" val="2"/>
+                <dgm:param type="txAnchorVertCh" val="mid"/>
+              </dgm:alg>
+            </dgm:else>
+          </dgm:choose>
+          <dgm:choose name="Name12">
+            <dgm:if name="Name13" func="var" arg="dir" op="equ" val="norm">
+              <dgm:shape xmlns:r="http://schemas.openxmlformats.org/officeDocument/2006/relationships" type="rightArrow" r:blip="" hideGeom="1">
+                <dgm:adjLst>
+                  <dgm:adj idx="1" val="0.7"/>
+                  <dgm:adj idx="2" val="0.5"/>
+                </dgm:adjLst>
+              </dgm:shape>
+            </dgm:if>
+            <dgm:else name="Name14">
+              <dgm:shape xmlns:r="http://schemas.openxmlformats.org/officeDocument/2006/relationships" type="leftArrow" r:blip="" hideGeom="1">
+                <dgm:adjLst>
+                  <dgm:adj idx="1" val="0.7"/>
+                  <dgm:adj idx="2" val="0.5"/>
+                </dgm:adjLst>
+              </dgm:shape>
+            </dgm:else>
+          </dgm:choose>
+          <dgm:presOf axis="des" ptType="node"/>
+          <dgm:constrLst>
+            <dgm:constr type="secFontSz" refType="primFontSz"/>
+            <dgm:constr type="tMarg" refType="primFontSz" fact="0.05"/>
+            <dgm:constr type="bMarg" refType="primFontSz" fact="0.05"/>
+            <dgm:constr type="rMarg" refType="primFontSz" fact="0.1"/>
+            <dgm:constr type="lMarg" refType="primFontSz" fact="0.2"/>
+          </dgm:constrLst>
+          <dgm:ruleLst>
+            <dgm:rule type="primFontSz" val="5" fact="NaN" max="NaN"/>
+          </dgm:ruleLst>
+        </dgm:layoutNode>
+        <dgm:layoutNode name="parentText" styleLbl="node1">
+          <dgm:varLst>
+            <dgm:chMax val="1"/>
+            <dgm:bulletEnabled val="1"/>
+          </dgm:varLst>
+          <dgm:alg type="tx"/>
+          <dgm:shape xmlns:r="http://schemas.openxmlformats.org/officeDocument/2006/relationships" type="ellipse" r:blip="">
+            <dgm:adjLst/>
+          </dgm:shape>
+          <dgm:presOf axis="self"/>
+          <dgm:constrLst>
+            <dgm:constr type="primFontSz" val="65"/>
+            <dgm:constr type="tMarg" refType="primFontSz" fact="0.05"/>
+            <dgm:constr type="bMarg" refType="primFontSz" fact="0.05"/>
+            <dgm:constr type="lMarg" refType="primFontSz" fact="0.05"/>
+            <dgm:constr type="rMarg" refType="primFontSz" fact="0.05"/>
+          </dgm:constrLst>
+          <dgm:ruleLst>
+            <dgm:rule type="primFontSz" val="5" fact="NaN" max="NaN"/>
+          </dgm:ruleLst>
+        </dgm:layoutNode>
+      </dgm:layoutNode>
+      <dgm:choose name="Name15">
+        <dgm:if name="Name16" axis="self" ptType="node" func="revPos" op="gte" val="2">
+          <dgm:layoutNode name="aSpace">
+            <dgm:alg type="sp"/>
+            <dgm:shape xmlns:r="http://schemas.openxmlformats.org/officeDocument/2006/relationships" r:blip="">
+              <dgm:adjLst/>
+            </dgm:shape>
+            <dgm:presOf/>
+            <dgm:constrLst/>
+            <dgm:ruleLst/>
+          </dgm:layoutNode>
+        </dgm:if>
+        <dgm:else name="Name17"/>
+      </dgm:choose>
+    </dgm:forEach>
+  </dgm:layoutNode>
+</dgm:layoutDef>
+</file>
+
+<file path=ppt/diagrams/layout3.xml><?xml version="1.0" encoding="utf-8"?>
 <dgm:layoutDef xmlns:dgm="http://schemas.openxmlformats.org/drawingml/2006/diagram" xmlns:a="http://schemas.openxmlformats.org/drawingml/2006/main" uniqueId="urn:microsoft.com/office/officeart/2018/2/layout/IconVerticalSolidList">
   <dgm:title val="Icon Vertical Solid List"/>
   <dgm:desc val="Use to show a series of visuals from top to bottom with Level 1 or Level 1 and Level 2 text grouped in a shape. Works best with icons or small pictures with lengthier descriptions."/>
@@ -6162,6 +8370,1040 @@
 </dgm:styleDef>
 </file>
 
+<file path=ppt/diagrams/quickStyle3.xml><?xml version="1.0" encoding="utf-8"?>
+<dgm:styleDef xmlns:dgm="http://schemas.openxmlformats.org/drawingml/2006/diagram" xmlns:a="http://schemas.openxmlformats.org/drawingml/2006/main" uniqueId="urn:microsoft.com/office/officeart/2005/8/quickstyle/simple1">
+  <dgm:title val=""/>
+  <dgm:desc val=""/>
+  <dgm:catLst>
+    <dgm:cat type="simple" pri="10100"/>
+  </dgm:catLst>
+  <dgm:scene3d>
+    <a:camera prst="orthographicFront"/>
+    <a:lightRig rig="threePt" dir="t"/>
+  </dgm:scene3d>
+  <dgm:styleLbl name="node0">
+    <dgm:scene3d>
+      <a:camera prst="orthographicFront"/>
+      <a:lightRig rig="threePt" dir="t"/>
+    </dgm:scene3d>
+    <dgm:sp3d/>
+    <dgm:txPr/>
+    <dgm:style>
+      <a:lnRef idx="2">
+        <a:scrgbClr r="0" g="0" b="0"/>
+      </a:lnRef>
+      <a:fillRef idx="1">
+        <a:scrgbClr r="0" g="0" b="0"/>
+      </a:fillRef>
+      <a:effectRef idx="0">
+        <a:scrgbClr r="0" g="0" b="0"/>
+      </a:effectRef>
+      <a:fontRef idx="minor">
+        <a:schemeClr val="lt1"/>
+      </a:fontRef>
+    </dgm:style>
+  </dgm:styleLbl>
+  <dgm:styleLbl name="lnNode1">
+    <dgm:scene3d>
+      <a:camera prst="orthographicFront"/>
+      <a:lightRig rig="threePt" dir="t"/>
+    </dgm:scene3d>
+    <dgm:sp3d/>
+    <dgm:txPr/>
+    <dgm:style>
+      <a:lnRef idx="2">
+        <a:scrgbClr r="0" g="0" b="0"/>
+      </a:lnRef>
+      <a:fillRef idx="1">
+        <a:scrgbClr r="0" g="0" b="0"/>
+      </a:fillRef>
+      <a:effectRef idx="0">
+        <a:scrgbClr r="0" g="0" b="0"/>
+      </a:effectRef>
+      <a:fontRef idx="minor">
+        <a:schemeClr val="lt1"/>
+      </a:fontRef>
+    </dgm:style>
+  </dgm:styleLbl>
+  <dgm:styleLbl name="vennNode1">
+    <dgm:scene3d>
+      <a:camera prst="orthographicFront"/>
+      <a:lightRig rig="threePt" dir="t"/>
+    </dgm:scene3d>
+    <dgm:sp3d/>
+    <dgm:txPr/>
+    <dgm:style>
+      <a:lnRef idx="2">
+        <a:scrgbClr r="0" g="0" b="0"/>
+      </a:lnRef>
+      <a:fillRef idx="1">
+        <a:scrgbClr r="0" g="0" b="0"/>
+      </a:fillRef>
+      <a:effectRef idx="0">
+        <a:scrgbClr r="0" g="0" b="0"/>
+      </a:effectRef>
+      <a:fontRef idx="minor">
+        <a:schemeClr val="tx1"/>
+      </a:fontRef>
+    </dgm:style>
+  </dgm:styleLbl>
+  <dgm:styleLbl name="alignNode1">
+    <dgm:scene3d>
+      <a:camera prst="orthographicFront"/>
+      <a:lightRig rig="threePt" dir="t"/>
+    </dgm:scene3d>
+    <dgm:sp3d/>
+    <dgm:txPr/>
+    <dgm:style>
+      <a:lnRef idx="2">
+        <a:scrgbClr r="0" g="0" b="0"/>
+      </a:lnRef>
+      <a:fillRef idx="1">
+        <a:scrgbClr r="0" g="0" b="0"/>
+      </a:fillRef>
+      <a:effectRef idx="0">
+        <a:scrgbClr r="0" g="0" b="0"/>
+      </a:effectRef>
+      <a:fontRef idx="minor">
+        <a:schemeClr val="lt1"/>
+      </a:fontRef>
+    </dgm:style>
+  </dgm:styleLbl>
+  <dgm:styleLbl name="node1">
+    <dgm:scene3d>
+      <a:camera prst="orthographicFront"/>
+      <a:lightRig rig="threePt" dir="t"/>
+    </dgm:scene3d>
+    <dgm:sp3d/>
+    <dgm:txPr/>
+    <dgm:style>
+      <a:lnRef idx="2">
+        <a:scrgbClr r="0" g="0" b="0"/>
+      </a:lnRef>
+      <a:fillRef idx="1">
+        <a:scrgbClr r="0" g="0" b="0"/>
+      </a:fillRef>
+      <a:effectRef idx="0">
+        <a:scrgbClr r="0" g="0" b="0"/>
+      </a:effectRef>
+      <a:fontRef idx="minor">
+        <a:schemeClr val="lt1"/>
+      </a:fontRef>
+    </dgm:style>
+  </dgm:styleLbl>
+  <dgm:styleLbl name="node2">
+    <dgm:scene3d>
+      <a:camera prst="orthographicFront"/>
+      <a:lightRig rig="threePt" dir="t"/>
+    </dgm:scene3d>
+    <dgm:sp3d/>
+    <dgm:txPr/>
+    <dgm:style>
+      <a:lnRef idx="2">
+        <a:scrgbClr r="0" g="0" b="0"/>
+      </a:lnRef>
+      <a:fillRef idx="1">
+        <a:scrgbClr r="0" g="0" b="0"/>
+      </a:fillRef>
+      <a:effectRef idx="0">
+        <a:scrgbClr r="0" g="0" b="0"/>
+      </a:effectRef>
+      <a:fontRef idx="minor">
+        <a:schemeClr val="lt1"/>
+      </a:fontRef>
+    </dgm:style>
+  </dgm:styleLbl>
+  <dgm:styleLbl name="node3">
+    <dgm:scene3d>
+      <a:camera prst="orthographicFront"/>
+      <a:lightRig rig="threePt" dir="t"/>
+    </dgm:scene3d>
+    <dgm:sp3d/>
+    <dgm:txPr/>
+    <dgm:style>
+      <a:lnRef idx="2">
+        <a:scrgbClr r="0" g="0" b="0"/>
+      </a:lnRef>
+      <a:fillRef idx="1">
+        <a:scrgbClr r="0" g="0" b="0"/>
+      </a:fillRef>
+      <a:effectRef idx="0">
+        <a:scrgbClr r="0" g="0" b="0"/>
+      </a:effectRef>
+      <a:fontRef idx="minor">
+        <a:schemeClr val="lt1"/>
+      </a:fontRef>
+    </dgm:style>
+  </dgm:styleLbl>
+  <dgm:styleLbl name="node4">
+    <dgm:scene3d>
+      <a:camera prst="orthographicFront"/>
+      <a:lightRig rig="threePt" dir="t"/>
+    </dgm:scene3d>
+    <dgm:sp3d/>
+    <dgm:txPr/>
+    <dgm:style>
+      <a:lnRef idx="2">
+        <a:scrgbClr r="0" g="0" b="0"/>
+      </a:lnRef>
+      <a:fillRef idx="1">
+        <a:scrgbClr r="0" g="0" b="0"/>
+      </a:fillRef>
+      <a:effectRef idx="0">
+        <a:scrgbClr r="0" g="0" b="0"/>
+      </a:effectRef>
+      <a:fontRef idx="minor">
+        <a:schemeClr val="lt1"/>
+      </a:fontRef>
+    </dgm:style>
+  </dgm:styleLbl>
+  <dgm:styleLbl name="fgImgPlace1">
+    <dgm:scene3d>
+      <a:camera prst="orthographicFront"/>
+      <a:lightRig rig="threePt" dir="t"/>
+    </dgm:scene3d>
+    <dgm:sp3d/>
+    <dgm:txPr/>
+    <dgm:style>
+      <a:lnRef idx="2">
+        <a:scrgbClr r="0" g="0" b="0"/>
+      </a:lnRef>
+      <a:fillRef idx="1">
+        <a:scrgbClr r="0" g="0" b="0"/>
+      </a:fillRef>
+      <a:effectRef idx="0">
+        <a:scrgbClr r="0" g="0" b="0"/>
+      </a:effectRef>
+      <a:fontRef idx="minor"/>
+    </dgm:style>
+  </dgm:styleLbl>
+  <dgm:styleLbl name="alignImgPlace1">
+    <dgm:scene3d>
+      <a:camera prst="orthographicFront"/>
+      <a:lightRig rig="threePt" dir="t"/>
+    </dgm:scene3d>
+    <dgm:sp3d/>
+    <dgm:txPr/>
+    <dgm:style>
+      <a:lnRef idx="2">
+        <a:scrgbClr r="0" g="0" b="0"/>
+      </a:lnRef>
+      <a:fillRef idx="1">
+        <a:scrgbClr r="0" g="0" b="0"/>
+      </a:fillRef>
+      <a:effectRef idx="0">
+        <a:scrgbClr r="0" g="0" b="0"/>
+      </a:effectRef>
+      <a:fontRef idx="minor"/>
+    </dgm:style>
+  </dgm:styleLbl>
+  <dgm:styleLbl name="bgImgPlace1">
+    <dgm:scene3d>
+      <a:camera prst="orthographicFront"/>
+      <a:lightRig rig="threePt" dir="t"/>
+    </dgm:scene3d>
+    <dgm:sp3d/>
+    <dgm:txPr/>
+    <dgm:style>
+      <a:lnRef idx="2">
+        <a:scrgbClr r="0" g="0" b="0"/>
+      </a:lnRef>
+      <a:fillRef idx="1">
+        <a:scrgbClr r="0" g="0" b="0"/>
+      </a:fillRef>
+      <a:effectRef idx="0">
+        <a:scrgbClr r="0" g="0" b="0"/>
+      </a:effectRef>
+      <a:fontRef idx="minor"/>
+    </dgm:style>
+  </dgm:styleLbl>
+  <dgm:styleLbl name="sibTrans2D1">
+    <dgm:scene3d>
+      <a:camera prst="orthographicFront"/>
+      <a:lightRig rig="threePt" dir="t"/>
+    </dgm:scene3d>
+    <dgm:sp3d/>
+    <dgm:txPr/>
+    <dgm:style>
+      <a:lnRef idx="0">
+        <a:scrgbClr r="0" g="0" b="0"/>
+      </a:lnRef>
+      <a:fillRef idx="1">
+        <a:scrgbClr r="0" g="0" b="0"/>
+      </a:fillRef>
+      <a:effectRef idx="0">
+        <a:scrgbClr r="0" g="0" b="0"/>
+      </a:effectRef>
+      <a:fontRef idx="minor">
+        <a:schemeClr val="lt1"/>
+      </a:fontRef>
+    </dgm:style>
+  </dgm:styleLbl>
+  <dgm:styleLbl name="fgSibTrans2D1">
+    <dgm:scene3d>
+      <a:camera prst="orthographicFront"/>
+      <a:lightRig rig="threePt" dir="t"/>
+    </dgm:scene3d>
+    <dgm:sp3d/>
+    <dgm:txPr/>
+    <dgm:style>
+      <a:lnRef idx="0">
+        <a:scrgbClr r="0" g="0" b="0"/>
+      </a:lnRef>
+      <a:fillRef idx="1">
+        <a:scrgbClr r="0" g="0" b="0"/>
+      </a:fillRef>
+      <a:effectRef idx="0">
+        <a:scrgbClr r="0" g="0" b="0"/>
+      </a:effectRef>
+      <a:fontRef idx="minor">
+        <a:schemeClr val="lt1"/>
+      </a:fontRef>
+    </dgm:style>
+  </dgm:styleLbl>
+  <dgm:styleLbl name="bgSibTrans2D1">
+    <dgm:scene3d>
+      <a:camera prst="orthographicFront"/>
+      <a:lightRig rig="threePt" dir="t"/>
+    </dgm:scene3d>
+    <dgm:sp3d/>
+    <dgm:txPr/>
+    <dgm:style>
+      <a:lnRef idx="0">
+        <a:scrgbClr r="0" g="0" b="0"/>
+      </a:lnRef>
+      <a:fillRef idx="1">
+        <a:scrgbClr r="0" g="0" b="0"/>
+      </a:fillRef>
+      <a:effectRef idx="0">
+        <a:scrgbClr r="0" g="0" b="0"/>
+      </a:effectRef>
+      <a:fontRef idx="minor">
+        <a:schemeClr val="lt1"/>
+      </a:fontRef>
+    </dgm:style>
+  </dgm:styleLbl>
+  <dgm:styleLbl name="sibTrans1D1">
+    <dgm:scene3d>
+      <a:camera prst="orthographicFront"/>
+      <a:lightRig rig="threePt" dir="t"/>
+    </dgm:scene3d>
+    <dgm:sp3d/>
+    <dgm:txPr/>
+    <dgm:style>
+      <a:lnRef idx="1">
+        <a:scrgbClr r="0" g="0" b="0"/>
+      </a:lnRef>
+      <a:fillRef idx="0">
+        <a:scrgbClr r="0" g="0" b="0"/>
+      </a:fillRef>
+      <a:effectRef idx="0">
+        <a:scrgbClr r="0" g="0" b="0"/>
+      </a:effectRef>
+      <a:fontRef idx="minor"/>
+    </dgm:style>
+  </dgm:styleLbl>
+  <dgm:styleLbl name="callout">
+    <dgm:scene3d>
+      <a:camera prst="orthographicFront"/>
+      <a:lightRig rig="threePt" dir="t"/>
+    </dgm:scene3d>
+    <dgm:sp3d/>
+    <dgm:txPr/>
+    <dgm:style>
+      <a:lnRef idx="2">
+        <a:scrgbClr r="0" g="0" b="0"/>
+      </a:lnRef>
+      <a:fillRef idx="1">
+        <a:scrgbClr r="0" g="0" b="0"/>
+      </a:fillRef>
+      <a:effectRef idx="0">
+        <a:scrgbClr r="0" g="0" b="0"/>
+      </a:effectRef>
+      <a:fontRef idx="minor"/>
+    </dgm:style>
+  </dgm:styleLbl>
+  <dgm:styleLbl name="asst0">
+    <dgm:scene3d>
+      <a:camera prst="orthographicFront"/>
+      <a:lightRig rig="threePt" dir="t"/>
+    </dgm:scene3d>
+    <dgm:sp3d/>
+    <dgm:txPr/>
+    <dgm:style>
+      <a:lnRef idx="2">
+        <a:scrgbClr r="0" g="0" b="0"/>
+      </a:lnRef>
+      <a:fillRef idx="1">
+        <a:scrgbClr r="0" g="0" b="0"/>
+      </a:fillRef>
+      <a:effectRef idx="0">
+        <a:scrgbClr r="0" g="0" b="0"/>
+      </a:effectRef>
+      <a:fontRef idx="minor">
+        <a:schemeClr val="lt1"/>
+      </a:fontRef>
+    </dgm:style>
+  </dgm:styleLbl>
+  <dgm:styleLbl name="asst1">
+    <dgm:scene3d>
+      <a:camera prst="orthographicFront"/>
+      <a:lightRig rig="threePt" dir="t"/>
+    </dgm:scene3d>
+    <dgm:sp3d/>
+    <dgm:txPr/>
+    <dgm:style>
+      <a:lnRef idx="2">
+        <a:scrgbClr r="0" g="0" b="0"/>
+      </a:lnRef>
+      <a:fillRef idx="1">
+        <a:scrgbClr r="0" g="0" b="0"/>
+      </a:fillRef>
+      <a:effectRef idx="0">
+        <a:scrgbClr r="0" g="0" b="0"/>
+      </a:effectRef>
+      <a:fontRef idx="minor">
+        <a:schemeClr val="lt1"/>
+      </a:fontRef>
+    </dgm:style>
+  </dgm:styleLbl>
+  <dgm:styleLbl name="asst2">
+    <dgm:scene3d>
+      <a:camera prst="orthographicFront"/>
+      <a:lightRig rig="threePt" dir="t"/>
+    </dgm:scene3d>
+    <dgm:sp3d/>
+    <dgm:txPr/>
+    <dgm:style>
+      <a:lnRef idx="2">
+        <a:scrgbClr r="0" g="0" b="0"/>
+      </a:lnRef>
+      <a:fillRef idx="1">
+        <a:scrgbClr r="0" g="0" b="0"/>
+      </a:fillRef>
+      <a:effectRef idx="0">
+        <a:scrgbClr r="0" g="0" b="0"/>
+      </a:effectRef>
+      <a:fontRef idx="minor">
+        <a:schemeClr val="lt1"/>
+      </a:fontRef>
+    </dgm:style>
+  </dgm:styleLbl>
+  <dgm:styleLbl name="asst3">
+    <dgm:scene3d>
+      <a:camera prst="orthographicFront"/>
+      <a:lightRig rig="threePt" dir="t"/>
+    </dgm:scene3d>
+    <dgm:sp3d/>
+    <dgm:txPr/>
+    <dgm:style>
+      <a:lnRef idx="2">
+        <a:scrgbClr r="0" g="0" b="0"/>
+      </a:lnRef>
+      <a:fillRef idx="1">
+        <a:scrgbClr r="0" g="0" b="0"/>
+      </a:fillRef>
+      <a:effectRef idx="0">
+        <a:scrgbClr r="0" g="0" b="0"/>
+      </a:effectRef>
+      <a:fontRef idx="minor">
+        <a:schemeClr val="lt1"/>
+      </a:fontRef>
+    </dgm:style>
+  </dgm:styleLbl>
+  <dgm:styleLbl name="asst4">
+    <dgm:scene3d>
+      <a:camera prst="orthographicFront"/>
+      <a:lightRig rig="threePt" dir="t"/>
+    </dgm:scene3d>
+    <dgm:sp3d/>
+    <dgm:txPr/>
+    <dgm:style>
+      <a:lnRef idx="2">
+        <a:scrgbClr r="0" g="0" b="0"/>
+      </a:lnRef>
+      <a:fillRef idx="1">
+        <a:scrgbClr r="0" g="0" b="0"/>
+      </a:fillRef>
+      <a:effectRef idx="0">
+        <a:scrgbClr r="0" g="0" b="0"/>
+      </a:effectRef>
+      <a:fontRef idx="minor">
+        <a:schemeClr val="lt1"/>
+      </a:fontRef>
+    </dgm:style>
+  </dgm:styleLbl>
+  <dgm:styleLbl name="parChTrans2D1">
+    <dgm:scene3d>
+      <a:camera prst="orthographicFront"/>
+      <a:lightRig rig="threePt" dir="t"/>
+    </dgm:scene3d>
+    <dgm:sp3d/>
+    <dgm:txPr/>
+    <dgm:style>
+      <a:lnRef idx="2">
+        <a:scrgbClr r="0" g="0" b="0"/>
+      </a:lnRef>
+      <a:fillRef idx="1">
+        <a:scrgbClr r="0" g="0" b="0"/>
+      </a:fillRef>
+      <a:effectRef idx="0">
+        <a:scrgbClr r="0" g="0" b="0"/>
+      </a:effectRef>
+      <a:fontRef idx="minor">
+        <a:schemeClr val="lt1"/>
+      </a:fontRef>
+    </dgm:style>
+  </dgm:styleLbl>
+  <dgm:styleLbl name="parChTrans2D2">
+    <dgm:scene3d>
+      <a:camera prst="orthographicFront"/>
+      <a:lightRig rig="threePt" dir="t"/>
+    </dgm:scene3d>
+    <dgm:sp3d/>
+    <dgm:txPr/>
+    <dgm:style>
+      <a:lnRef idx="2">
+        <a:scrgbClr r="0" g="0" b="0"/>
+      </a:lnRef>
+      <a:fillRef idx="1">
+        <a:scrgbClr r="0" g="0" b="0"/>
+      </a:fillRef>
+      <a:effectRef idx="0">
+        <a:scrgbClr r="0" g="0" b="0"/>
+      </a:effectRef>
+      <a:fontRef idx="minor">
+        <a:schemeClr val="lt1"/>
+      </a:fontRef>
+    </dgm:style>
+  </dgm:styleLbl>
+  <dgm:styleLbl name="parChTrans2D3">
+    <dgm:scene3d>
+      <a:camera prst="orthographicFront"/>
+      <a:lightRig rig="threePt" dir="t"/>
+    </dgm:scene3d>
+    <dgm:sp3d/>
+    <dgm:txPr/>
+    <dgm:style>
+      <a:lnRef idx="2">
+        <a:scrgbClr r="0" g="0" b="0"/>
+      </a:lnRef>
+      <a:fillRef idx="1">
+        <a:scrgbClr r="0" g="0" b="0"/>
+      </a:fillRef>
+      <a:effectRef idx="0">
+        <a:scrgbClr r="0" g="0" b="0"/>
+      </a:effectRef>
+      <a:fontRef idx="minor">
+        <a:schemeClr val="lt1"/>
+      </a:fontRef>
+    </dgm:style>
+  </dgm:styleLbl>
+  <dgm:styleLbl name="parChTrans2D4">
+    <dgm:scene3d>
+      <a:camera prst="orthographicFront"/>
+      <a:lightRig rig="threePt" dir="t"/>
+    </dgm:scene3d>
+    <dgm:sp3d/>
+    <dgm:txPr/>
+    <dgm:style>
+      <a:lnRef idx="2">
+        <a:scrgbClr r="0" g="0" b="0"/>
+      </a:lnRef>
+      <a:fillRef idx="1">
+        <a:scrgbClr r="0" g="0" b="0"/>
+      </a:fillRef>
+      <a:effectRef idx="0">
+        <a:scrgbClr r="0" g="0" b="0"/>
+      </a:effectRef>
+      <a:fontRef idx="minor">
+        <a:schemeClr val="lt1"/>
+      </a:fontRef>
+    </dgm:style>
+  </dgm:styleLbl>
+  <dgm:styleLbl name="parChTrans1D1">
+    <dgm:scene3d>
+      <a:camera prst="orthographicFront"/>
+      <a:lightRig rig="threePt" dir="t"/>
+    </dgm:scene3d>
+    <dgm:sp3d/>
+    <dgm:txPr/>
+    <dgm:style>
+      <a:lnRef idx="2">
+        <a:scrgbClr r="0" g="0" b="0"/>
+      </a:lnRef>
+      <a:fillRef idx="0">
+        <a:scrgbClr r="0" g="0" b="0"/>
+      </a:fillRef>
+      <a:effectRef idx="0">
+        <a:scrgbClr r="0" g="0" b="0"/>
+      </a:effectRef>
+      <a:fontRef idx="minor"/>
+    </dgm:style>
+  </dgm:styleLbl>
+  <dgm:styleLbl name="parChTrans1D2">
+    <dgm:scene3d>
+      <a:camera prst="orthographicFront"/>
+      <a:lightRig rig="threePt" dir="t"/>
+    </dgm:scene3d>
+    <dgm:sp3d/>
+    <dgm:txPr/>
+    <dgm:style>
+      <a:lnRef idx="2">
+        <a:scrgbClr r="0" g="0" b="0"/>
+      </a:lnRef>
+      <a:fillRef idx="0">
+        <a:scrgbClr r="0" g="0" b="0"/>
+      </a:fillRef>
+      <a:effectRef idx="0">
+        <a:scrgbClr r="0" g="0" b="0"/>
+      </a:effectRef>
+      <a:fontRef idx="minor"/>
+    </dgm:style>
+  </dgm:styleLbl>
+  <dgm:styleLbl name="parChTrans1D3">
+    <dgm:scene3d>
+      <a:camera prst="orthographicFront"/>
+      <a:lightRig rig="threePt" dir="t"/>
+    </dgm:scene3d>
+    <dgm:sp3d/>
+    <dgm:txPr/>
+    <dgm:style>
+      <a:lnRef idx="2">
+        <a:scrgbClr r="0" g="0" b="0"/>
+      </a:lnRef>
+      <a:fillRef idx="0">
+        <a:scrgbClr r="0" g="0" b="0"/>
+      </a:fillRef>
+      <a:effectRef idx="0">
+        <a:scrgbClr r="0" g="0" b="0"/>
+      </a:effectRef>
+      <a:fontRef idx="minor"/>
+    </dgm:style>
+  </dgm:styleLbl>
+  <dgm:styleLbl name="parChTrans1D4">
+    <dgm:scene3d>
+      <a:camera prst="orthographicFront"/>
+      <a:lightRig rig="threePt" dir="t"/>
+    </dgm:scene3d>
+    <dgm:sp3d/>
+    <dgm:txPr/>
+    <dgm:style>
+      <a:lnRef idx="2">
+        <a:scrgbClr r="0" g="0" b="0"/>
+      </a:lnRef>
+      <a:fillRef idx="0">
+        <a:scrgbClr r="0" g="0" b="0"/>
+      </a:fillRef>
+      <a:effectRef idx="0">
+        <a:scrgbClr r="0" g="0" b="0"/>
+      </a:effectRef>
+      <a:fontRef idx="minor"/>
+    </dgm:style>
+  </dgm:styleLbl>
+  <dgm:styleLbl name="fgAcc1">
+    <dgm:scene3d>
+      <a:camera prst="orthographicFront"/>
+      <a:lightRig rig="threePt" dir="t"/>
+    </dgm:scene3d>
+    <dgm:sp3d/>
+    <dgm:txPr/>
+    <dgm:style>
+      <a:lnRef idx="2">
+        <a:scrgbClr r="0" g="0" b="0"/>
+      </a:lnRef>
+      <a:fillRef idx="1">
+        <a:scrgbClr r="0" g="0" b="0"/>
+      </a:fillRef>
+      <a:effectRef idx="0">
+        <a:scrgbClr r="0" g="0" b="0"/>
+      </a:effectRef>
+      <a:fontRef idx="minor"/>
+    </dgm:style>
+  </dgm:styleLbl>
+  <dgm:styleLbl name="conFgAcc1">
+    <dgm:scene3d>
+      <a:camera prst="orthographicFront"/>
+      <a:lightRig rig="threePt" dir="t"/>
+    </dgm:scene3d>
+    <dgm:sp3d/>
+    <dgm:txPr/>
+    <dgm:style>
+      <a:lnRef idx="2">
+        <a:scrgbClr r="0" g="0" b="0"/>
+      </a:lnRef>
+      <a:fillRef idx="1">
+        <a:scrgbClr r="0" g="0" b="0"/>
+      </a:fillRef>
+      <a:effectRef idx="0">
+        <a:scrgbClr r="0" g="0" b="0"/>
+      </a:effectRef>
+      <a:fontRef idx="minor"/>
+    </dgm:style>
+  </dgm:styleLbl>
+  <dgm:styleLbl name="alignAcc1">
+    <dgm:scene3d>
+      <a:camera prst="orthographicFront"/>
+      <a:lightRig rig="threePt" dir="t"/>
+    </dgm:scene3d>
+    <dgm:sp3d/>
+    <dgm:txPr/>
+    <dgm:style>
+      <a:lnRef idx="2">
+        <a:scrgbClr r="0" g="0" b="0"/>
+      </a:lnRef>
+      <a:fillRef idx="1">
+        <a:scrgbClr r="0" g="0" b="0"/>
+      </a:fillRef>
+      <a:effectRef idx="0">
+        <a:scrgbClr r="0" g="0" b="0"/>
+      </a:effectRef>
+      <a:fontRef idx="minor"/>
+    </dgm:style>
+  </dgm:styleLbl>
+  <dgm:styleLbl name="trAlignAcc1">
+    <dgm:scene3d>
+      <a:camera prst="orthographicFront"/>
+      <a:lightRig rig="threePt" dir="t"/>
+    </dgm:scene3d>
+    <dgm:sp3d/>
+    <dgm:txPr/>
+    <dgm:style>
+      <a:lnRef idx="1">
+        <a:scrgbClr r="0" g="0" b="0"/>
+      </a:lnRef>
+      <a:fillRef idx="1">
+        <a:scrgbClr r="0" g="0" b="0"/>
+      </a:fillRef>
+      <a:effectRef idx="0">
+        <a:scrgbClr r="0" g="0" b="0"/>
+      </a:effectRef>
+      <a:fontRef idx="minor"/>
+    </dgm:style>
+  </dgm:styleLbl>
+  <dgm:styleLbl name="bgAcc1">
+    <dgm:scene3d>
+      <a:camera prst="orthographicFront"/>
+      <a:lightRig rig="threePt" dir="t"/>
+    </dgm:scene3d>
+    <dgm:sp3d/>
+    <dgm:txPr/>
+    <dgm:style>
+      <a:lnRef idx="2">
+        <a:scrgbClr r="0" g="0" b="0"/>
+      </a:lnRef>
+      <a:fillRef idx="1">
+        <a:scrgbClr r="0" g="0" b="0"/>
+      </a:fillRef>
+      <a:effectRef idx="0">
+        <a:scrgbClr r="0" g="0" b="0"/>
+      </a:effectRef>
+      <a:fontRef idx="minor"/>
+    </dgm:style>
+  </dgm:styleLbl>
+  <dgm:styleLbl name="solidFgAcc1">
+    <dgm:scene3d>
+      <a:camera prst="orthographicFront"/>
+      <a:lightRig rig="threePt" dir="t"/>
+    </dgm:scene3d>
+    <dgm:sp3d/>
+    <dgm:txPr/>
+    <dgm:style>
+      <a:lnRef idx="2">
+        <a:scrgbClr r="0" g="0" b="0"/>
+      </a:lnRef>
+      <a:fillRef idx="1">
+        <a:scrgbClr r="0" g="0" b="0"/>
+      </a:fillRef>
+      <a:effectRef idx="0">
+        <a:scrgbClr r="0" g="0" b="0"/>
+      </a:effectRef>
+      <a:fontRef idx="minor"/>
+    </dgm:style>
+  </dgm:styleLbl>
+  <dgm:styleLbl name="solidAlignAcc1">
+    <dgm:scene3d>
+      <a:camera prst="orthographicFront"/>
+      <a:lightRig rig="threePt" dir="t"/>
+    </dgm:scene3d>
+    <dgm:sp3d/>
+    <dgm:txPr/>
+    <dgm:style>
+      <a:lnRef idx="2">
+        <a:scrgbClr r="0" g="0" b="0"/>
+      </a:lnRef>
+      <a:fillRef idx="1">
+        <a:scrgbClr r="0" g="0" b="0"/>
+      </a:fillRef>
+      <a:effectRef idx="0">
+        <a:scrgbClr r="0" g="0" b="0"/>
+      </a:effectRef>
+      <a:fontRef idx="minor"/>
+    </dgm:style>
+  </dgm:styleLbl>
+  <dgm:styleLbl name="solidBgAcc1">
+    <dgm:scene3d>
+      <a:camera prst="orthographicFront"/>
+      <a:lightRig rig="threePt" dir="t"/>
+    </dgm:scene3d>
+    <dgm:sp3d/>
+    <dgm:txPr/>
+    <dgm:style>
+      <a:lnRef idx="2">
+        <a:scrgbClr r="0" g="0" b="0"/>
+      </a:lnRef>
+      <a:fillRef idx="1">
+        <a:scrgbClr r="0" g="0" b="0"/>
+      </a:fillRef>
+      <a:effectRef idx="0">
+        <a:scrgbClr r="0" g="0" b="0"/>
+      </a:effectRef>
+      <a:fontRef idx="minor"/>
+    </dgm:style>
+  </dgm:styleLbl>
+  <dgm:styleLbl name="fgAccFollowNode1">
+    <dgm:scene3d>
+      <a:camera prst="orthographicFront"/>
+      <a:lightRig rig="threePt" dir="t"/>
+    </dgm:scene3d>
+    <dgm:sp3d/>
+    <dgm:txPr/>
+    <dgm:style>
+      <a:lnRef idx="2">
+        <a:scrgbClr r="0" g="0" b="0"/>
+      </a:lnRef>
+      <a:fillRef idx="1">
+        <a:scrgbClr r="0" g="0" b="0"/>
+      </a:fillRef>
+      <a:effectRef idx="0">
+        <a:scrgbClr r="0" g="0" b="0"/>
+      </a:effectRef>
+      <a:fontRef idx="minor"/>
+    </dgm:style>
+  </dgm:styleLbl>
+  <dgm:styleLbl name="alignAccFollowNode1">
+    <dgm:scene3d>
+      <a:camera prst="orthographicFront"/>
+      <a:lightRig rig="threePt" dir="t"/>
+    </dgm:scene3d>
+    <dgm:sp3d/>
+    <dgm:txPr/>
+    <dgm:style>
+      <a:lnRef idx="2">
+        <a:scrgbClr r="0" g="0" b="0"/>
+      </a:lnRef>
+      <a:fillRef idx="1">
+        <a:scrgbClr r="0" g="0" b="0"/>
+      </a:fillRef>
+      <a:effectRef idx="0">
+        <a:scrgbClr r="0" g="0" b="0"/>
+      </a:effectRef>
+      <a:fontRef idx="minor"/>
+    </dgm:style>
+  </dgm:styleLbl>
+  <dgm:styleLbl name="bgAccFollowNode1">
+    <dgm:scene3d>
+      <a:camera prst="orthographicFront"/>
+      <a:lightRig rig="threePt" dir="t"/>
+    </dgm:scene3d>
+    <dgm:sp3d/>
+    <dgm:txPr/>
+    <dgm:style>
+      <a:lnRef idx="2">
+        <a:scrgbClr r="0" g="0" b="0"/>
+      </a:lnRef>
+      <a:fillRef idx="1">
+        <a:scrgbClr r="0" g="0" b="0"/>
+      </a:fillRef>
+      <a:effectRef idx="0">
+        <a:scrgbClr r="0" g="0" b="0"/>
+      </a:effectRef>
+      <a:fontRef idx="minor"/>
+    </dgm:style>
+  </dgm:styleLbl>
+  <dgm:styleLbl name="fgAcc0">
+    <dgm:scene3d>
+      <a:camera prst="orthographicFront"/>
+      <a:lightRig rig="threePt" dir="t"/>
+    </dgm:scene3d>
+    <dgm:sp3d/>
+    <dgm:txPr/>
+    <dgm:style>
+      <a:lnRef idx="2">
+        <a:scrgbClr r="0" g="0" b="0"/>
+      </a:lnRef>
+      <a:fillRef idx="1">
+        <a:scrgbClr r="0" g="0" b="0"/>
+      </a:fillRef>
+      <a:effectRef idx="0">
+        <a:scrgbClr r="0" g="0" b="0"/>
+      </a:effectRef>
+      <a:fontRef idx="minor"/>
+    </dgm:style>
+  </dgm:styleLbl>
+  <dgm:styleLbl name="fgAcc2">
+    <dgm:scene3d>
+      <a:camera prst="orthographicFront"/>
+      <a:lightRig rig="threePt" dir="t"/>
+    </dgm:scene3d>
+    <dgm:sp3d/>
+    <dgm:txPr/>
+    <dgm:style>
+      <a:lnRef idx="2">
+        <a:scrgbClr r="0" g="0" b="0"/>
+      </a:lnRef>
+      <a:fillRef idx="1">
+        <a:scrgbClr r="0" g="0" b="0"/>
+      </a:fillRef>
+      <a:effectRef idx="0">
+        <a:scrgbClr r="0" g="0" b="0"/>
+      </a:effectRef>
+      <a:fontRef idx="minor"/>
+    </dgm:style>
+  </dgm:styleLbl>
+  <dgm:styleLbl name="fgAcc3">
+    <dgm:scene3d>
+      <a:camera prst="orthographicFront"/>
+      <a:lightRig rig="threePt" dir="t"/>
+    </dgm:scene3d>
+    <dgm:sp3d/>
+    <dgm:txPr/>
+    <dgm:style>
+      <a:lnRef idx="2">
+        <a:scrgbClr r="0" g="0" b="0"/>
+      </a:lnRef>
+      <a:fillRef idx="1">
+        <a:scrgbClr r="0" g="0" b="0"/>
+      </a:fillRef>
+      <a:effectRef idx="0">
+        <a:scrgbClr r="0" g="0" b="0"/>
+      </a:effectRef>
+      <a:fontRef idx="minor"/>
+    </dgm:style>
+  </dgm:styleLbl>
+  <dgm:styleLbl name="fgAcc4">
+    <dgm:scene3d>
+      <a:camera prst="orthographicFront"/>
+      <a:lightRig rig="threePt" dir="t"/>
+    </dgm:scene3d>
+    <dgm:sp3d/>
+    <dgm:txPr/>
+    <dgm:style>
+      <a:lnRef idx="2">
+        <a:scrgbClr r="0" g="0" b="0"/>
+      </a:lnRef>
+      <a:fillRef idx="1">
+        <a:scrgbClr r="0" g="0" b="0"/>
+      </a:fillRef>
+      <a:effectRef idx="0">
+        <a:scrgbClr r="0" g="0" b="0"/>
+      </a:effectRef>
+      <a:fontRef idx="minor"/>
+    </dgm:style>
+  </dgm:styleLbl>
+  <dgm:styleLbl name="bgShp">
+    <dgm:scene3d>
+      <a:camera prst="orthographicFront"/>
+      <a:lightRig rig="threePt" dir="t"/>
+    </dgm:scene3d>
+    <dgm:sp3d/>
+    <dgm:txPr/>
+    <dgm:style>
+      <a:lnRef idx="0">
+        <a:scrgbClr r="0" g="0" b="0"/>
+      </a:lnRef>
+      <a:fillRef idx="1">
+        <a:scrgbClr r="0" g="0" b="0"/>
+      </a:fillRef>
+      <a:effectRef idx="0">
+        <a:scrgbClr r="0" g="0" b="0"/>
+      </a:effectRef>
+      <a:fontRef idx="minor"/>
+    </dgm:style>
+  </dgm:styleLbl>
+  <dgm:styleLbl name="dkBgShp">
+    <dgm:scene3d>
+      <a:camera prst="orthographicFront"/>
+      <a:lightRig rig="threePt" dir="t"/>
+    </dgm:scene3d>
+    <dgm:sp3d/>
+    <dgm:txPr/>
+    <dgm:style>
+      <a:lnRef idx="0">
+        <a:scrgbClr r="0" g="0" b="0"/>
+      </a:lnRef>
+      <a:fillRef idx="1">
+        <a:scrgbClr r="0" g="0" b="0"/>
+      </a:fillRef>
+      <a:effectRef idx="0">
+        <a:scrgbClr r="0" g="0" b="0"/>
+      </a:effectRef>
+      <a:fontRef idx="minor"/>
+    </dgm:style>
+  </dgm:styleLbl>
+  <dgm:styleLbl name="trBgShp">
+    <dgm:scene3d>
+      <a:camera prst="orthographicFront"/>
+      <a:lightRig rig="threePt" dir="t"/>
+    </dgm:scene3d>
+    <dgm:sp3d/>
+    <dgm:txPr/>
+    <dgm:style>
+      <a:lnRef idx="0">
+        <a:scrgbClr r="0" g="0" b="0"/>
+      </a:lnRef>
+      <a:fillRef idx="1">
+        <a:scrgbClr r="0" g="0" b="0"/>
+      </a:fillRef>
+      <a:effectRef idx="0">
+        <a:scrgbClr r="0" g="0" b="0"/>
+      </a:effectRef>
+      <a:fontRef idx="minor"/>
+    </dgm:style>
+  </dgm:styleLbl>
+  <dgm:styleLbl name="fgShp">
+    <dgm:scene3d>
+      <a:camera prst="orthographicFront"/>
+      <a:lightRig rig="threePt" dir="t"/>
+    </dgm:scene3d>
+    <dgm:sp3d/>
+    <dgm:txPr/>
+    <dgm:style>
+      <a:lnRef idx="2">
+        <a:scrgbClr r="0" g="0" b="0"/>
+      </a:lnRef>
+      <a:fillRef idx="1">
+        <a:scrgbClr r="0" g="0" b="0"/>
+      </a:fillRef>
+      <a:effectRef idx="0">
+        <a:scrgbClr r="0" g="0" b="0"/>
+      </a:effectRef>
+      <a:fontRef idx="minor"/>
+    </dgm:style>
+  </dgm:styleLbl>
+  <dgm:styleLbl name="revTx">
+    <dgm:scene3d>
+      <a:camera prst="orthographicFront"/>
+      <a:lightRig rig="threePt" dir="t"/>
+    </dgm:scene3d>
+    <dgm:sp3d/>
+    <dgm:txPr/>
+    <dgm:style>
+      <a:lnRef idx="0">
+        <a:scrgbClr r="0" g="0" b="0"/>
+      </a:lnRef>
+      <a:fillRef idx="0">
+        <a:scrgbClr r="0" g="0" b="0"/>
+      </a:fillRef>
+      <a:effectRef idx="0">
+        <a:scrgbClr r="0" g="0" b="0"/>
+      </a:effectRef>
+      <a:fontRef idx="minor"/>
+    </dgm:style>
+  </dgm:styleLbl>
+</dgm:styleDef>
+</file>
+
 <file path=ppt/handoutMasters/handoutMaster1.xml><?xml version="1.0" encoding="utf-8"?>
 <p:handoutMaster xmlns:a="http://schemas.openxmlformats.org/drawingml/2006/main" xmlns:r="http://schemas.openxmlformats.org/officeDocument/2006/relationships" xmlns:p="http://schemas.openxmlformats.org/presentationml/2006/main">
   <p:cSld>
@@ -6256,7 +9498,7 @@
           <a:p>
             <a:fld id="{BCAD67F1-0BE2-4E29-A99D-4783B791450C}" type="datetimeFigureOut">
               <a:rPr lang="es-MX" smtClean="0"/>
-              <a:t>17/06/2019</a:t>
+              <a:t>24/06/2019</a:t>
             </a:fld>
             <a:endParaRPr lang="es-MX"/>
           </a:p>
@@ -6434,7 +9676,7 @@
           <a:p>
             <a:fld id="{AA948CDE-ADCE-45D9-AE05-A9E4EE4E7D78}" type="datetimeFigureOut">
               <a:rPr lang="es-MX" smtClean="0"/>
-              <a:t>17/06/2019</a:t>
+              <a:t>24/06/2019</a:t>
             </a:fld>
             <a:endParaRPr lang="es-MX"/>
           </a:p>
@@ -7129,7 +10371,7 @@
           <a:p>
             <a:fld id="{AE3C5649-CA51-4F46-A02D-A44801B2394D}" type="slidenum">
               <a:rPr lang="es-MX" smtClean="0"/>
-              <a:t>23</a:t>
+              <a:t>24</a:t>
             </a:fld>
             <a:endParaRPr lang="es-MX"/>
           </a:p>
@@ -7374,7 +10616,7 @@
           <a:p>
             <a:fld id="{ED67FDF6-CDE2-4543-A2C0-BEB898A72469}" type="datetime1">
               <a:rPr lang="es-MX" smtClean="0"/>
-              <a:t>17/06/2019</a:t>
+              <a:t>24/06/2019</a:t>
             </a:fld>
             <a:endParaRPr lang="es-MX"/>
           </a:p>
@@ -7587,7 +10829,7 @@
           <a:p>
             <a:fld id="{4DB12CE3-1D82-4FBF-82A7-A78A2B9BDED2}" type="datetime1">
               <a:rPr lang="es-MX" smtClean="0"/>
-              <a:t>17/06/2019</a:t>
+              <a:t>24/06/2019</a:t>
             </a:fld>
             <a:endParaRPr lang="es-MX"/>
           </a:p>
@@ -7843,7 +11085,7 @@
           <a:p>
             <a:fld id="{E5FEDFFE-DA6B-4E77-AC9A-E8E5279EA324}" type="datetime1">
               <a:rPr lang="es-MX" smtClean="0"/>
-              <a:t>17/06/2019</a:t>
+              <a:t>24/06/2019</a:t>
             </a:fld>
             <a:endParaRPr lang="es-MX"/>
           </a:p>
@@ -8013,7 +11255,7 @@
           <a:p>
             <a:fld id="{70D862E3-0A08-46FB-83F9-AD12ACE2B9EF}" type="datetime1">
               <a:rPr lang="es-MX" smtClean="0"/>
-              <a:t>17/06/2019</a:t>
+              <a:t>24/06/2019</a:t>
             </a:fld>
             <a:endParaRPr lang="es-MX"/>
           </a:p>
@@ -8356,7 +11598,7 @@
           <a:p>
             <a:fld id="{4FA0EEC0-F7FA-4E1A-965B-9810599A897E}" type="datetime1">
               <a:rPr lang="es-MX" smtClean="0"/>
-              <a:t>17/06/2019</a:t>
+              <a:t>24/06/2019</a:t>
             </a:fld>
             <a:endParaRPr lang="es-MX"/>
           </a:p>
@@ -8631,7 +11873,7 @@
           <a:p>
             <a:fld id="{7FEE7C51-708B-4B5B-92DA-54112C5F1DFC}" type="datetime1">
               <a:rPr lang="es-MX" smtClean="0"/>
-              <a:t>17/06/2019</a:t>
+              <a:t>24/06/2019</a:t>
             </a:fld>
             <a:endParaRPr lang="es-MX"/>
           </a:p>
@@ -9010,7 +12252,7 @@
           <a:p>
             <a:fld id="{5730618B-CA54-4B5A-9AEC-51A15085ECE0}" type="datetime1">
               <a:rPr lang="es-MX" smtClean="0"/>
-              <a:t>17/06/2019</a:t>
+              <a:t>24/06/2019</a:t>
             </a:fld>
             <a:endParaRPr lang="es-MX"/>
           </a:p>
@@ -9128,7 +12370,7 @@
           <a:p>
             <a:fld id="{70FDFF41-C871-40C9-B84B-D24DBDF6261B}" type="datetime1">
               <a:rPr lang="es-MX" smtClean="0"/>
-              <a:t>17/06/2019</a:t>
+              <a:t>24/06/2019</a:t>
             </a:fld>
             <a:endParaRPr lang="es-MX"/>
           </a:p>
@@ -9299,7 +12541,7 @@
           <a:p>
             <a:fld id="{97786756-7C32-4595-8DF4-B3BDECEECFD8}" type="datetime1">
               <a:rPr lang="es-MX" smtClean="0"/>
-              <a:t>17/06/2019</a:t>
+              <a:t>24/06/2019</a:t>
             </a:fld>
             <a:endParaRPr lang="es-MX"/>
           </a:p>
@@ -9653,7 +12895,7 @@
           <a:p>
             <a:fld id="{FD6CCBAA-0DB8-4D6A-8A2C-82A40A4F8064}" type="datetime1">
               <a:rPr lang="es-MX" smtClean="0"/>
-              <a:t>17/06/2019</a:t>
+              <a:t>24/06/2019</a:t>
             </a:fld>
             <a:endParaRPr lang="es-MX"/>
           </a:p>
@@ -10030,7 +13272,7 @@
           <a:p>
             <a:fld id="{221C526B-6DBC-4BBB-BB1F-673303724ED9}" type="datetime1">
               <a:rPr lang="es-MX" smtClean="0"/>
-              <a:t>17/06/2019</a:t>
+              <a:t>24/06/2019</a:t>
             </a:fld>
             <a:endParaRPr lang="es-MX"/>
           </a:p>
@@ -10317,7 +13559,7 @@
           <a:p>
             <a:fld id="{1AA3569D-419A-414F-9108-C46D8F7B1960}" type="datetime1">
               <a:rPr lang="es-MX" smtClean="0"/>
-              <a:t>17/06/2019</a:t>
+              <a:t>24/06/2019</a:t>
             </a:fld>
             <a:endParaRPr lang="es-MX"/>
           </a:p>
@@ -11689,47 +14931,6 @@
           </a:p>
         </p:txBody>
       </p:sp>
-      <p:sp>
-        <p:nvSpPr>
-          <p:cNvPr id="6" name="CuadroTexto 5">
-            <a:extLst>
-              <a:ext uri="{FF2B5EF4-FFF2-40B4-BE49-F238E27FC236}">
-                <a16:creationId xmlns:a16="http://schemas.microsoft.com/office/drawing/2014/main" id="{FE2D5CEA-6B7B-4763-83F7-131DF9E21A11}"/>
-              </a:ext>
-            </a:extLst>
-          </p:cNvPr>
-          <p:cNvSpPr txBox="1"/>
-          <p:nvPr/>
-        </p:nvSpPr>
-        <p:spPr>
-          <a:xfrm>
-            <a:off x="9618135" y="5951569"/>
-            <a:ext cx="2095445" cy="369332"/>
-          </a:xfrm>
-          <a:prstGeom prst="rect">
-            <a:avLst/>
-          </a:prstGeom>
-          <a:noFill/>
-        </p:spPr>
-        <p:txBody>
-          <a:bodyPr wrap="none" rtlCol="0">
-            <a:spAutoFit/>
-          </a:bodyPr>
-          <a:lstStyle/>
-          <a:p>
-            <a:r>
-              <a:rPr lang="es-MX" i="1" dirty="0">
-                <a:hlinkClick r:id="rId2" action="ppaction://hlinksldjump"/>
-              </a:rPr>
-              <a:t>[9]</a:t>
-            </a:r>
-            <a:r>
-              <a:rPr lang="es-MX" i="1" dirty="0"/>
-              <a:t> Zhang et al. AIAA</a:t>
-            </a:r>
-          </a:p>
-        </p:txBody>
-      </p:sp>
       <p:pic>
         <p:nvPicPr>
           <p:cNvPr id="9" name="Imagen 8">
@@ -11745,7 +14946,7 @@
           <p:nvPr/>
         </p:nvPicPr>
         <p:blipFill>
-          <a:blip r:embed="rId3"/>
+          <a:blip r:embed="rId2"/>
           <a:stretch>
             <a:fillRect/>
           </a:stretch>
@@ -11775,7 +14976,7 @@
           <p:nvPr/>
         </p:nvPicPr>
         <p:blipFill>
-          <a:blip r:embed="rId4"/>
+          <a:blip r:embed="rId3"/>
           <a:stretch>
             <a:fillRect/>
           </a:stretch>
@@ -11790,6 +14991,63 @@
           </a:prstGeom>
         </p:spPr>
       </p:pic>
+      <p:sp>
+        <p:nvSpPr>
+          <p:cNvPr id="4" name="CuadroTexto 5">
+            <a:extLst>
+              <a:ext uri="{FF2B5EF4-FFF2-40B4-BE49-F238E27FC236}">
+                <a16:creationId xmlns:a16="http://schemas.microsoft.com/office/drawing/2014/main" id="{9B4D2531-9BAD-495C-9B06-0DBA3E0F43DF}"/>
+              </a:ext>
+            </a:extLst>
+          </p:cNvPr>
+          <p:cNvSpPr txBox="1"/>
+          <p:nvPr/>
+        </p:nvSpPr>
+        <p:spPr>
+          <a:xfrm>
+            <a:off x="8254555" y="5931516"/>
+            <a:ext cx="3937488" cy="369332"/>
+          </a:xfrm>
+          <a:prstGeom prst="rect">
+            <a:avLst/>
+          </a:prstGeom>
+          <a:noFill/>
+        </p:spPr>
+        <p:txBody>
+          <a:bodyPr wrap="none" rtlCol="0" anchor="t">
+            <a:spAutoFit/>
+          </a:bodyPr>
+          <a:lstStyle/>
+          <a:p>
+            <a:r>
+              <a:rPr lang="es-MX" i="1" dirty="0">
+                <a:hlinkClick r:id="rId4" action="ppaction://hlinksldjump"/>
+              </a:rPr>
+              <a:t>[2]</a:t>
+            </a:r>
+            <a:r>
+              <a:rPr lang="es-MX" i="1" dirty="0"/>
+              <a:t> Forrester et al. </a:t>
+            </a:r>
+            <a:r>
+              <a:rPr lang="es-MX" i="1" dirty="0" err="1"/>
+              <a:t>Proc</a:t>
+            </a:r>
+            <a:r>
+              <a:rPr lang="es-MX" i="1" dirty="0"/>
+              <a:t>. Royal Soc. </a:t>
+            </a:r>
+            <a:r>
+              <a:rPr lang="es-MX" i="1" dirty="0" err="1"/>
+              <a:t>Lond</a:t>
+            </a:r>
+            <a:r>
+              <a:rPr lang="es-MX" i="1" dirty="0"/>
+              <a:t>.</a:t>
+            </a:r>
+          </a:p>
+        </p:txBody>
+      </p:sp>
     </p:spTree>
     <p:extLst>
       <p:ext uri="{BB962C8B-B14F-4D97-AF65-F5344CB8AC3E}">
@@ -14758,28 +18016,305 @@
           <a:p>
             <a:r>
               <a:rPr lang="en-GB" dirty="0"/>
-              <a:t>Why not leverage this advantage to connect both fidelities? </a:t>
+              <a:t>Why not leverage this advantage to connect both fidelities at the MDA level? </a:t>
             </a:r>
           </a:p>
           <a:p>
             <a:r>
               <a:rPr lang="en-GB" dirty="0"/>
-              <a:t>Two options: </a:t>
-            </a:r>
-          </a:p>
-          <a:p>
-            <a:pPr lvl="1"/>
+              <a:t> </a:t>
+            </a:r>
+          </a:p>
+        </p:txBody>
+      </p:sp>
+      <p:sp>
+        <p:nvSpPr>
+          <p:cNvPr id="20" name="CuadroTexto 19">
+            <a:extLst>
+              <a:ext uri="{FF2B5EF4-FFF2-40B4-BE49-F238E27FC236}">
+                <a16:creationId xmlns:a16="http://schemas.microsoft.com/office/drawing/2014/main" id="{99C5DD1D-4083-4778-85D5-D84B82095006}"/>
+              </a:ext>
+            </a:extLst>
+          </p:cNvPr>
+          <p:cNvSpPr txBox="1"/>
+          <p:nvPr/>
+        </p:nvSpPr>
+        <p:spPr>
+          <a:xfrm>
+            <a:off x="8057126" y="5654456"/>
+            <a:ext cx="4619852" cy="307777"/>
+          </a:xfrm>
+          <a:prstGeom prst="rect">
+            <a:avLst/>
+          </a:prstGeom>
+          <a:noFill/>
+        </p:spPr>
+        <p:txBody>
+          <a:bodyPr wrap="square" rtlCol="0" anchor="t">
+            <a:spAutoFit/>
+          </a:bodyPr>
+          <a:lstStyle/>
+          <a:p>
+            <a:r>
+              <a:rPr lang="en-GB" sz="1400" b="1" dirty="0"/>
+              <a:t>Figure 6. </a:t>
+            </a:r>
+            <a:r>
+              <a:rPr lang="en-GB" sz="1400" dirty="0"/>
+              <a:t>Solution monitors for the MDA problem. </a:t>
+            </a:r>
+          </a:p>
+        </p:txBody>
+      </p:sp>
+      <p:sp>
+        <p:nvSpPr>
+          <p:cNvPr id="11" name="Marcador de número de diapositiva 10">
+            <a:extLst>
+              <a:ext uri="{FF2B5EF4-FFF2-40B4-BE49-F238E27FC236}">
+                <a16:creationId xmlns:a16="http://schemas.microsoft.com/office/drawing/2014/main" id="{5A8DCDC0-8F5C-4157-926B-BF2AFACA3A14}"/>
+              </a:ext>
+            </a:extLst>
+          </p:cNvPr>
+          <p:cNvSpPr>
+            <a:spLocks noGrp="1"/>
+          </p:cNvSpPr>
+          <p:nvPr>
+            <p:ph type="sldNum" sz="quarter" idx="12"/>
+          </p:nvPr>
+        </p:nvSpPr>
+        <p:spPr/>
+        <p:txBody>
+          <a:bodyPr/>
+          <a:lstStyle/>
+          <a:p>
+            <a:fld id="{8593F739-6935-4A8B-A2D0-1ADB6DBDBEE9}" type="slidenum">
+              <a:rPr lang="es-MX" smtClean="0"/>
+              <a:t>17</a:t>
+            </a:fld>
+            <a:endParaRPr lang="es-MX"/>
+          </a:p>
+        </p:txBody>
+      </p:sp>
+      <p:pic>
+        <p:nvPicPr>
+          <p:cNvPr id="13" name="Gráfico 12">
+            <a:extLst>
+              <a:ext uri="{FF2B5EF4-FFF2-40B4-BE49-F238E27FC236}">
+                <a16:creationId xmlns:a16="http://schemas.microsoft.com/office/drawing/2014/main" id="{295F5112-CF1F-4AF3-A8F3-E1A217E8AF92}"/>
+              </a:ext>
+            </a:extLst>
+          </p:cNvPr>
+          <p:cNvPicPr>
+            <a:picLocks noChangeAspect="1"/>
+          </p:cNvPicPr>
+          <p:nvPr/>
+        </p:nvPicPr>
+        <p:blipFill>
+          <a:blip r:embed="rId2">
+            <a:extLst>
+              <a:ext uri="{28A0092B-C50C-407E-A947-70E740481C1C}">
+                <a14:useLocalDpi xmlns:a14="http://schemas.microsoft.com/office/drawing/2010/main" val="0"/>
+              </a:ext>
+              <a:ext uri="{96DAC541-7B7A-43D3-8B79-37D633B846F1}">
+                <asvg:svgBlip xmlns:asvg="http://schemas.microsoft.com/office/drawing/2016/SVG/main" r:embed="rId3"/>
+              </a:ext>
+            </a:extLst>
+          </a:blip>
+          <a:stretch>
+            <a:fillRect/>
+          </a:stretch>
+        </p:blipFill>
+        <p:spPr>
+          <a:xfrm>
+            <a:off x="8123068" y="129140"/>
+            <a:ext cx="3602274" cy="2813266"/>
+          </a:xfrm>
+          <a:prstGeom prst="rect">
+            <a:avLst/>
+          </a:prstGeom>
+        </p:spPr>
+      </p:pic>
+      <p:pic>
+        <p:nvPicPr>
+          <p:cNvPr id="15" name="Gráfico 14">
+            <a:extLst>
+              <a:ext uri="{FF2B5EF4-FFF2-40B4-BE49-F238E27FC236}">
+                <a16:creationId xmlns:a16="http://schemas.microsoft.com/office/drawing/2014/main" id="{4905CDCC-80EC-4A71-86D4-AC9C7A9CC3AB}"/>
+              </a:ext>
+            </a:extLst>
+          </p:cNvPr>
+          <p:cNvPicPr>
+            <a:picLocks noChangeAspect="1"/>
+          </p:cNvPicPr>
+          <p:nvPr/>
+        </p:nvPicPr>
+        <p:blipFill>
+          <a:blip r:embed="rId4">
+            <a:extLst>
+              <a:ext uri="{28A0092B-C50C-407E-A947-70E740481C1C}">
+                <a14:useLocalDpi xmlns:a14="http://schemas.microsoft.com/office/drawing/2010/main" val="0"/>
+              </a:ext>
+              <a:ext uri="{96DAC541-7B7A-43D3-8B79-37D633B846F1}">
+                <asvg:svgBlip xmlns:asvg="http://schemas.microsoft.com/office/drawing/2016/SVG/main" r:embed="rId5"/>
+              </a:ext>
+            </a:extLst>
+          </a:blip>
+          <a:stretch>
+            <a:fillRect/>
+          </a:stretch>
+        </p:blipFill>
+        <p:spPr>
+          <a:xfrm>
+            <a:off x="8057126" y="2919958"/>
+            <a:ext cx="3686664" cy="2774768"/>
+          </a:xfrm>
+          <a:prstGeom prst="rect">
+            <a:avLst/>
+          </a:prstGeom>
+        </p:spPr>
+      </p:pic>
+      <p:graphicFrame>
+        <p:nvGraphicFramePr>
+          <p:cNvPr id="16" name="Diagrama 15">
+            <a:extLst>
+              <a:ext uri="{FF2B5EF4-FFF2-40B4-BE49-F238E27FC236}">
+                <a16:creationId xmlns:a16="http://schemas.microsoft.com/office/drawing/2014/main" id="{7FD65BB5-1F23-4382-9B59-42063A538C0E}"/>
+              </a:ext>
+            </a:extLst>
+          </p:cNvPr>
+          <p:cNvGraphicFramePr/>
+          <p:nvPr>
+            <p:extLst>
+              <p:ext uri="{D42A27DB-BD31-4B8C-83A1-F6EECF244321}">
+                <p14:modId xmlns:p14="http://schemas.microsoft.com/office/powerpoint/2010/main" val="2438108485"/>
+              </p:ext>
+            </p:extLst>
+          </p:nvPr>
+        </p:nvGraphicFramePr>
+        <p:xfrm>
+          <a:off x="1146222" y="3213552"/>
+          <a:ext cx="6675005" cy="3611357"/>
+        </p:xfrm>
+        <a:graphic>
+          <a:graphicData uri="http://schemas.openxmlformats.org/drawingml/2006/diagram">
+            <dgm:relIds xmlns:dgm="http://schemas.openxmlformats.org/drawingml/2006/diagram" xmlns:r="http://schemas.openxmlformats.org/officeDocument/2006/relationships" r:dm="rId6" r:lo="rId7" r:qs="rId8" r:cs="rId9"/>
+          </a:graphicData>
+        </a:graphic>
+      </p:graphicFrame>
+    </p:spTree>
+    <p:extLst>
+      <p:ext uri="{BB962C8B-B14F-4D97-AF65-F5344CB8AC3E}">
+        <p14:creationId xmlns:p14="http://schemas.microsoft.com/office/powerpoint/2010/main" val="375746953"/>
+      </p:ext>
+    </p:extLst>
+  </p:cSld>
+  <p:clrMapOvr>
+    <a:masterClrMapping/>
+  </p:clrMapOvr>
+</p:sld>
+</file>
+
+<file path=ppt/slides/slide18.xml><?xml version="1.0" encoding="utf-8"?>
+<p:sld xmlns:a="http://schemas.openxmlformats.org/drawingml/2006/main" xmlns:r="http://schemas.openxmlformats.org/officeDocument/2006/relationships" xmlns:p="http://schemas.openxmlformats.org/presentationml/2006/main">
+  <p:cSld>
+    <p:spTree>
+      <p:nvGrpSpPr>
+        <p:cNvPr id="1" name=""/>
+        <p:cNvGrpSpPr/>
+        <p:nvPr/>
+      </p:nvGrpSpPr>
+      <p:grpSpPr>
+        <a:xfrm>
+          <a:off x="0" y="0"/>
+          <a:ext cx="0" cy="0"/>
+          <a:chOff x="0" y="0"/>
+          <a:chExt cx="0" cy="0"/>
+        </a:xfrm>
+      </p:grpSpPr>
+      <p:sp>
+        <p:nvSpPr>
+          <p:cNvPr id="2" name="Título 1">
+            <a:extLst>
+              <a:ext uri="{FF2B5EF4-FFF2-40B4-BE49-F238E27FC236}">
+                <a16:creationId xmlns:a16="http://schemas.microsoft.com/office/drawing/2014/main" id="{86E20183-E297-47AA-8F65-99338E05E52D}"/>
+              </a:ext>
+            </a:extLst>
+          </p:cNvPr>
+          <p:cNvSpPr>
+            <a:spLocks noGrp="1"/>
+          </p:cNvSpPr>
+          <p:nvPr>
+            <p:ph type="title"/>
+          </p:nvPr>
+        </p:nvSpPr>
+        <p:spPr>
+          <a:xfrm>
+            <a:off x="1097280" y="286603"/>
+            <a:ext cx="10058400" cy="1450757"/>
+          </a:xfrm>
+        </p:spPr>
+        <p:txBody>
+          <a:bodyPr/>
+          <a:lstStyle/>
+          <a:p>
             <a:r>
               <a:rPr lang="en-GB" dirty="0"/>
-              <a:t>Monitor the constraint convergence (stress, cruise lift)</a:t>
-            </a:r>
-          </a:p>
-          <a:p>
-            <a:pPr lvl="1"/>
+              <a:t>Proposed method</a:t>
+            </a:r>
+          </a:p>
+        </p:txBody>
+      </p:sp>
+      <p:sp>
+        <p:nvSpPr>
+          <p:cNvPr id="3" name="Marcador de contenido 2">
+            <a:extLst>
+              <a:ext uri="{FF2B5EF4-FFF2-40B4-BE49-F238E27FC236}">
+                <a16:creationId xmlns:a16="http://schemas.microsoft.com/office/drawing/2014/main" id="{BA181630-B999-4B59-BB05-9EE7536F7BF4}"/>
+              </a:ext>
+            </a:extLst>
+          </p:cNvPr>
+          <p:cNvSpPr>
+            <a:spLocks noGrp="1"/>
+          </p:cNvSpPr>
+          <p:nvPr>
+            <p:ph idx="1"/>
+          </p:nvPr>
+        </p:nvSpPr>
+        <p:spPr>
+          <a:xfrm>
+            <a:off x="1146222" y="1784985"/>
+            <a:ext cx="6351945" cy="4023360"/>
+          </a:xfrm>
+        </p:spPr>
+        <p:txBody>
+          <a:bodyPr/>
+          <a:lstStyle/>
+          <a:p>
             <a:r>
               <a:rPr lang="en-GB" dirty="0"/>
-              <a:t>Go to Hi-Fi after n iterations of the optimization solver</a:t>
-            </a:r>
+              <a:t>An outer loop surrogate built from the MDA solution can be added. </a:t>
+            </a:r>
+          </a:p>
+          <a:p>
+            <a:r>
+              <a:rPr lang="en-GB" dirty="0"/>
+              <a:t>This would reduce MDA calls, as the surrogate would be evaluated instead. </a:t>
+            </a:r>
+          </a:p>
+          <a:p>
+            <a:r>
+              <a:rPr lang="en-GB" dirty="0"/>
+              <a:t>However, it adds computation time to create and tune the surrogate… </a:t>
+            </a:r>
+          </a:p>
+          <a:p>
+            <a:r>
+              <a:rPr lang="en-GB" dirty="0"/>
+              <a:t>Still early to tell if this part of the method is feasible/convenient.</a:t>
+            </a:r>
+          </a:p>
+          <a:p>
+            <a:endParaRPr lang="en-GB" dirty="0"/>
           </a:p>
           <a:p>
             <a:r>
@@ -14834,7 +18369,7 @@
         <p:spPr>
           <a:xfrm>
             <a:off x="7498167" y="5694726"/>
-            <a:ext cx="4619852" cy="523220"/>
+            <a:ext cx="4619852" cy="307777"/>
           </a:xfrm>
           <a:prstGeom prst="rect">
             <a:avLst/>
@@ -14849,11 +18384,11 @@
           <a:p>
             <a:r>
               <a:rPr lang="en-GB" sz="1400" b="1" dirty="0"/>
-              <a:t>Figure 6. </a:t>
+              <a:t>Figure 7. </a:t>
             </a:r>
             <a:r>
               <a:rPr lang="en-GB" sz="1400" dirty="0"/>
-              <a:t>Solution monitors for the MDAO problem. A green vertical line signals a possible fidelity interchange point.</a:t>
+              <a:t>Solution monitors for the MDAO problem. </a:t>
             </a:r>
           </a:p>
         </p:txBody>
@@ -14888,49 +18423,6 @@
           </a:prstGeom>
         </p:spPr>
       </p:pic>
-      <p:cxnSp>
-        <p:nvCxnSpPr>
-          <p:cNvPr id="8" name="Conector recto 7">
-            <a:extLst>
-              <a:ext uri="{FF2B5EF4-FFF2-40B4-BE49-F238E27FC236}">
-                <a16:creationId xmlns:a16="http://schemas.microsoft.com/office/drawing/2014/main" id="{AF6469E1-E5A0-4885-BDD9-14296BE1FDE2}"/>
-              </a:ext>
-            </a:extLst>
-          </p:cNvPr>
-          <p:cNvCxnSpPr>
-            <a:cxnSpLocks/>
-          </p:cNvCxnSpPr>
-          <p:nvPr/>
-        </p:nvCxnSpPr>
-        <p:spPr>
-          <a:xfrm flipH="1" flipV="1">
-            <a:off x="10006988" y="3094995"/>
-            <a:ext cx="8878" cy="2128550"/>
-          </a:xfrm>
-          <a:prstGeom prst="line">
-            <a:avLst/>
-          </a:prstGeom>
-          <a:ln w="28575">
-            <a:solidFill>
-              <a:srgbClr val="00B050"/>
-            </a:solidFill>
-          </a:ln>
-        </p:spPr>
-        <p:style>
-          <a:lnRef idx="1">
-            <a:schemeClr val="accent1"/>
-          </a:lnRef>
-          <a:fillRef idx="0">
-            <a:schemeClr val="accent1"/>
-          </a:fillRef>
-          <a:effectRef idx="0">
-            <a:schemeClr val="accent1"/>
-          </a:effectRef>
-          <a:fontRef idx="minor">
-            <a:schemeClr val="tx1"/>
-          </a:fontRef>
-        </p:style>
-      </p:cxnSp>
       <p:sp>
         <p:nvSpPr>
           <p:cNvPr id="11" name="Marcador de número de diapositiva 10">
@@ -14954,7 +18446,7 @@
           <a:p>
             <a:fld id="{8593F739-6935-4A8B-A2D0-1ADB6DBDBEE9}" type="slidenum">
               <a:rPr lang="es-MX" smtClean="0"/>
-              <a:t>17</a:t>
+              <a:t>18</a:t>
             </a:fld>
             <a:endParaRPr lang="es-MX"/>
           </a:p>
@@ -14963,7 +18455,7 @@
     </p:spTree>
     <p:extLst>
       <p:ext uri="{BB962C8B-B14F-4D97-AF65-F5344CB8AC3E}">
-        <p14:creationId xmlns:p14="http://schemas.microsoft.com/office/powerpoint/2010/main" val="375746953"/>
+        <p14:creationId xmlns:p14="http://schemas.microsoft.com/office/powerpoint/2010/main" val="2954875708"/>
       </p:ext>
     </p:extLst>
   </p:cSld>
@@ -14973,7 +18465,7 @@
 </p:sld>
 </file>
 
-<file path=ppt/slides/slide18.xml><?xml version="1.0" encoding="utf-8"?>
+<file path=ppt/slides/slide19.xml><?xml version="1.0" encoding="utf-8"?>
 <p:sld xmlns:a="http://schemas.openxmlformats.org/drawingml/2006/main" xmlns:r="http://schemas.openxmlformats.org/officeDocument/2006/relationships" xmlns:p="http://schemas.openxmlformats.org/presentationml/2006/main">
   <p:cSld>
     <p:spTree>
@@ -15167,7 +18659,7 @@
           <a:p>
             <a:fld id="{8593F739-6935-4A8B-A2D0-1ADB6DBDBEE9}" type="slidenum">
               <a:rPr lang="es-MX" smtClean="0"/>
-              <a:t>18</a:t>
+              <a:t>19</a:t>
             </a:fld>
             <a:endParaRPr lang="es-MX"/>
           </a:p>
@@ -15186,7 +18678,220 @@
 </p:sld>
 </file>
 
-<file path=ppt/slides/slide19.xml><?xml version="1.0" encoding="utf-8"?>
+<file path=ppt/slides/slide2.xml><?xml version="1.0" encoding="utf-8"?>
+<p:sld xmlns:a="http://schemas.openxmlformats.org/drawingml/2006/main" xmlns:r="http://schemas.openxmlformats.org/officeDocument/2006/relationships" xmlns:p="http://schemas.openxmlformats.org/presentationml/2006/main">
+  <p:cSld>
+    <p:spTree>
+      <p:nvGrpSpPr>
+        <p:cNvPr id="1" name=""/>
+        <p:cNvGrpSpPr/>
+        <p:nvPr/>
+      </p:nvGrpSpPr>
+      <p:grpSpPr>
+        <a:xfrm>
+          <a:off x="0" y="0"/>
+          <a:ext cx="0" cy="0"/>
+          <a:chOff x="0" y="0"/>
+          <a:chExt cx="0" cy="0"/>
+        </a:xfrm>
+      </p:grpSpPr>
+      <p:sp>
+        <p:nvSpPr>
+          <p:cNvPr id="2" name="Título 1">
+            <a:extLst>
+              <a:ext uri="{FF2B5EF4-FFF2-40B4-BE49-F238E27FC236}">
+                <a16:creationId xmlns:a16="http://schemas.microsoft.com/office/drawing/2014/main" id="{5B3EB483-7023-48DD-AA8F-6B2C7D57BBBD}"/>
+              </a:ext>
+            </a:extLst>
+          </p:cNvPr>
+          <p:cNvSpPr>
+            <a:spLocks noGrp="1"/>
+          </p:cNvSpPr>
+          <p:nvPr>
+            <p:ph type="title"/>
+          </p:nvPr>
+        </p:nvSpPr>
+        <p:spPr/>
+        <p:txBody>
+          <a:bodyPr/>
+          <a:lstStyle/>
+          <a:p>
+            <a:r>
+              <a:rPr lang="en-GB" dirty="0"/>
+              <a:t>Contents</a:t>
+            </a:r>
+          </a:p>
+        </p:txBody>
+      </p:sp>
+      <p:sp>
+        <p:nvSpPr>
+          <p:cNvPr id="3" name="Marcador de contenido 2">
+            <a:extLst>
+              <a:ext uri="{FF2B5EF4-FFF2-40B4-BE49-F238E27FC236}">
+                <a16:creationId xmlns:a16="http://schemas.microsoft.com/office/drawing/2014/main" id="{4A99FFC1-F970-457E-8884-E323F2F6ADF1}"/>
+              </a:ext>
+            </a:extLst>
+          </p:cNvPr>
+          <p:cNvSpPr>
+            <a:spLocks noGrp="1"/>
+          </p:cNvSpPr>
+          <p:nvPr>
+            <p:ph idx="1"/>
+          </p:nvPr>
+        </p:nvSpPr>
+        <p:spPr/>
+        <p:txBody>
+          <a:bodyPr/>
+          <a:lstStyle/>
+          <a:p>
+            <a:pPr marL="457200" indent="-457200">
+              <a:buFont typeface="+mj-lt"/>
+              <a:buAutoNum type="arabicPeriod"/>
+            </a:pPr>
+            <a:r>
+              <a:rPr lang="en-GB" b="1" dirty="0"/>
+              <a:t>Introduction</a:t>
+            </a:r>
+          </a:p>
+          <a:p>
+            <a:pPr marL="457200" indent="-457200">
+              <a:buFont typeface="+mj-lt"/>
+              <a:buAutoNum type="arabicPeriod"/>
+            </a:pPr>
+            <a:r>
+              <a:rPr lang="es-MX" dirty="0" err="1"/>
+              <a:t>State</a:t>
+            </a:r>
+            <a:r>
+              <a:rPr lang="es-MX" dirty="0"/>
+              <a:t> </a:t>
+            </a:r>
+            <a:r>
+              <a:rPr lang="es-MX" dirty="0" err="1"/>
+              <a:t>of</a:t>
+            </a:r>
+            <a:r>
+              <a:rPr lang="es-MX" dirty="0"/>
+              <a:t> </a:t>
+            </a:r>
+            <a:r>
+              <a:rPr lang="es-MX" dirty="0" err="1"/>
+              <a:t>the</a:t>
+            </a:r>
+            <a:r>
+              <a:rPr lang="es-MX" dirty="0"/>
+              <a:t> art</a:t>
+            </a:r>
+          </a:p>
+          <a:p>
+            <a:pPr marL="457200" indent="-457200">
+              <a:buFont typeface="+mj-lt"/>
+              <a:buAutoNum type="arabicPeriod"/>
+            </a:pPr>
+            <a:r>
+              <a:rPr lang="en-GB" dirty="0"/>
+              <a:t>Previous work</a:t>
+            </a:r>
+            <a:endParaRPr lang="es-MX" dirty="0"/>
+          </a:p>
+          <a:p>
+            <a:pPr marL="457200" indent="-457200">
+              <a:buFont typeface="+mj-lt"/>
+              <a:buAutoNum type="arabicPeriod"/>
+            </a:pPr>
+            <a:r>
+              <a:rPr lang="es-MX" dirty="0" err="1"/>
+              <a:t>Proposed</a:t>
+            </a:r>
+            <a:r>
+              <a:rPr lang="es-MX" dirty="0"/>
+              <a:t> </a:t>
+            </a:r>
+            <a:r>
+              <a:rPr lang="es-MX" dirty="0" err="1"/>
+              <a:t>method</a:t>
+            </a:r>
+            <a:endParaRPr lang="es-MX" dirty="0"/>
+          </a:p>
+          <a:p>
+            <a:pPr marL="457200" indent="-457200">
+              <a:buFont typeface="+mj-lt"/>
+              <a:buAutoNum type="arabicPeriod"/>
+            </a:pPr>
+            <a:r>
+              <a:rPr lang="es-MX" dirty="0" err="1"/>
+              <a:t>Preliminary</a:t>
+            </a:r>
+            <a:r>
+              <a:rPr lang="es-MX" dirty="0"/>
+              <a:t> </a:t>
+            </a:r>
+            <a:r>
+              <a:rPr lang="es-MX" dirty="0" err="1"/>
+              <a:t>Results</a:t>
+            </a:r>
+            <a:endParaRPr lang="es-MX" dirty="0"/>
+          </a:p>
+          <a:p>
+            <a:pPr marL="457200" indent="-457200">
+              <a:buFont typeface="+mj-lt"/>
+              <a:buAutoNum type="arabicPeriod"/>
+            </a:pPr>
+            <a:r>
+              <a:rPr lang="es-MX" dirty="0"/>
+              <a:t>Future </a:t>
+            </a:r>
+            <a:r>
+              <a:rPr lang="es-MX" dirty="0" err="1"/>
+              <a:t>work</a:t>
+            </a:r>
+            <a:endParaRPr lang="es-MX" dirty="0"/>
+          </a:p>
+        </p:txBody>
+      </p:sp>
+      <p:sp>
+        <p:nvSpPr>
+          <p:cNvPr id="6" name="Marcador de número de diapositiva 5">
+            <a:extLst>
+              <a:ext uri="{FF2B5EF4-FFF2-40B4-BE49-F238E27FC236}">
+                <a16:creationId xmlns:a16="http://schemas.microsoft.com/office/drawing/2014/main" id="{5870CAD4-BA4A-44EA-B40E-7534B9141ED4}"/>
+              </a:ext>
+            </a:extLst>
+          </p:cNvPr>
+          <p:cNvSpPr>
+            <a:spLocks noGrp="1"/>
+          </p:cNvSpPr>
+          <p:nvPr>
+            <p:ph type="sldNum" sz="quarter" idx="12"/>
+          </p:nvPr>
+        </p:nvSpPr>
+        <p:spPr/>
+        <p:txBody>
+          <a:bodyPr/>
+          <a:lstStyle/>
+          <a:p>
+            <a:fld id="{8593F739-6935-4A8B-A2D0-1ADB6DBDBEE9}" type="slidenum">
+              <a:rPr lang="es-MX" smtClean="0"/>
+              <a:t>2</a:t>
+            </a:fld>
+            <a:endParaRPr lang="es-MX"/>
+          </a:p>
+        </p:txBody>
+      </p:sp>
+    </p:spTree>
+    <p:extLst>
+      <p:ext uri="{BB962C8B-B14F-4D97-AF65-F5344CB8AC3E}">
+        <p14:creationId xmlns:p14="http://schemas.microsoft.com/office/powerpoint/2010/main" val="863121660"/>
+      </p:ext>
+    </p:extLst>
+  </p:cSld>
+  <p:clrMapOvr>
+    <a:masterClrMapping/>
+  </p:clrMapOvr>
+</p:sld>
+</file>
+
+<file path=ppt/slides/slide20.xml><?xml version="1.0" encoding="utf-8"?>
 <p:sld xmlns:a="http://schemas.openxmlformats.org/drawingml/2006/main" xmlns:r="http://schemas.openxmlformats.org/officeDocument/2006/relationships" xmlns:p="http://schemas.openxmlformats.org/presentationml/2006/main">
   <p:cSld>
     <p:bg>
@@ -15645,11 +19350,11 @@
           <a:p>
             <a:r>
               <a:rPr lang="en-GB" sz="1400" b="1" dirty="0"/>
-              <a:t>Figure 7. </a:t>
+              <a:t>Figure 8. </a:t>
             </a:r>
             <a:r>
               <a:rPr lang="en-GB" sz="1400" dirty="0"/>
-              <a:t>Von Mises Stress on the sample wing problem, low, single fidelity optimization. Structural Mesh. </a:t>
+              <a:t>Von Mises Stress on the sample wing problem (NASA CRM), low, single fidelity optimization. Structural Mesh. </a:t>
             </a:r>
           </a:p>
         </p:txBody>
@@ -15677,7 +19382,7 @@
           <a:p>
             <a:fld id="{8593F739-6935-4A8B-A2D0-1ADB6DBDBEE9}" type="slidenum">
               <a:rPr lang="es-MX" smtClean="0"/>
-              <a:t>19</a:t>
+              <a:t>20</a:t>
             </a:fld>
             <a:endParaRPr lang="es-MX"/>
           </a:p>
@@ -15696,220 +19401,7 @@
 </p:sld>
 </file>
 
-<file path=ppt/slides/slide2.xml><?xml version="1.0" encoding="utf-8"?>
-<p:sld xmlns:a="http://schemas.openxmlformats.org/drawingml/2006/main" xmlns:r="http://schemas.openxmlformats.org/officeDocument/2006/relationships" xmlns:p="http://schemas.openxmlformats.org/presentationml/2006/main">
-  <p:cSld>
-    <p:spTree>
-      <p:nvGrpSpPr>
-        <p:cNvPr id="1" name=""/>
-        <p:cNvGrpSpPr/>
-        <p:nvPr/>
-      </p:nvGrpSpPr>
-      <p:grpSpPr>
-        <a:xfrm>
-          <a:off x="0" y="0"/>
-          <a:ext cx="0" cy="0"/>
-          <a:chOff x="0" y="0"/>
-          <a:chExt cx="0" cy="0"/>
-        </a:xfrm>
-      </p:grpSpPr>
-      <p:sp>
-        <p:nvSpPr>
-          <p:cNvPr id="2" name="Título 1">
-            <a:extLst>
-              <a:ext uri="{FF2B5EF4-FFF2-40B4-BE49-F238E27FC236}">
-                <a16:creationId xmlns:a16="http://schemas.microsoft.com/office/drawing/2014/main" id="{5B3EB483-7023-48DD-AA8F-6B2C7D57BBBD}"/>
-              </a:ext>
-            </a:extLst>
-          </p:cNvPr>
-          <p:cNvSpPr>
-            <a:spLocks noGrp="1"/>
-          </p:cNvSpPr>
-          <p:nvPr>
-            <p:ph type="title"/>
-          </p:nvPr>
-        </p:nvSpPr>
-        <p:spPr/>
-        <p:txBody>
-          <a:bodyPr/>
-          <a:lstStyle/>
-          <a:p>
-            <a:r>
-              <a:rPr lang="en-GB" dirty="0"/>
-              <a:t>Contents</a:t>
-            </a:r>
-          </a:p>
-        </p:txBody>
-      </p:sp>
-      <p:sp>
-        <p:nvSpPr>
-          <p:cNvPr id="3" name="Marcador de contenido 2">
-            <a:extLst>
-              <a:ext uri="{FF2B5EF4-FFF2-40B4-BE49-F238E27FC236}">
-                <a16:creationId xmlns:a16="http://schemas.microsoft.com/office/drawing/2014/main" id="{4A99FFC1-F970-457E-8884-E323F2F6ADF1}"/>
-              </a:ext>
-            </a:extLst>
-          </p:cNvPr>
-          <p:cNvSpPr>
-            <a:spLocks noGrp="1"/>
-          </p:cNvSpPr>
-          <p:nvPr>
-            <p:ph idx="1"/>
-          </p:nvPr>
-        </p:nvSpPr>
-        <p:spPr/>
-        <p:txBody>
-          <a:bodyPr/>
-          <a:lstStyle/>
-          <a:p>
-            <a:pPr marL="457200" indent="-457200">
-              <a:buFont typeface="+mj-lt"/>
-              <a:buAutoNum type="arabicPeriod"/>
-            </a:pPr>
-            <a:r>
-              <a:rPr lang="en-GB" b="1" dirty="0"/>
-              <a:t>Introduction</a:t>
-            </a:r>
-          </a:p>
-          <a:p>
-            <a:pPr marL="457200" indent="-457200">
-              <a:buFont typeface="+mj-lt"/>
-              <a:buAutoNum type="arabicPeriod"/>
-            </a:pPr>
-            <a:r>
-              <a:rPr lang="es-MX" dirty="0" err="1"/>
-              <a:t>State</a:t>
-            </a:r>
-            <a:r>
-              <a:rPr lang="es-MX" dirty="0"/>
-              <a:t> </a:t>
-            </a:r>
-            <a:r>
-              <a:rPr lang="es-MX" dirty="0" err="1"/>
-              <a:t>of</a:t>
-            </a:r>
-            <a:r>
-              <a:rPr lang="es-MX" dirty="0"/>
-              <a:t> </a:t>
-            </a:r>
-            <a:r>
-              <a:rPr lang="es-MX" dirty="0" err="1"/>
-              <a:t>the</a:t>
-            </a:r>
-            <a:r>
-              <a:rPr lang="es-MX" dirty="0"/>
-              <a:t> art</a:t>
-            </a:r>
-          </a:p>
-          <a:p>
-            <a:pPr marL="457200" indent="-457200">
-              <a:buFont typeface="+mj-lt"/>
-              <a:buAutoNum type="arabicPeriod"/>
-            </a:pPr>
-            <a:r>
-              <a:rPr lang="en-GB" dirty="0"/>
-              <a:t>Previous work</a:t>
-            </a:r>
-            <a:endParaRPr lang="es-MX" dirty="0"/>
-          </a:p>
-          <a:p>
-            <a:pPr marL="457200" indent="-457200">
-              <a:buFont typeface="+mj-lt"/>
-              <a:buAutoNum type="arabicPeriod"/>
-            </a:pPr>
-            <a:r>
-              <a:rPr lang="es-MX" dirty="0" err="1"/>
-              <a:t>Proposed</a:t>
-            </a:r>
-            <a:r>
-              <a:rPr lang="es-MX" dirty="0"/>
-              <a:t> </a:t>
-            </a:r>
-            <a:r>
-              <a:rPr lang="es-MX" dirty="0" err="1"/>
-              <a:t>method</a:t>
-            </a:r>
-            <a:endParaRPr lang="es-MX" dirty="0"/>
-          </a:p>
-          <a:p>
-            <a:pPr marL="457200" indent="-457200">
-              <a:buFont typeface="+mj-lt"/>
-              <a:buAutoNum type="arabicPeriod"/>
-            </a:pPr>
-            <a:r>
-              <a:rPr lang="es-MX" dirty="0" err="1"/>
-              <a:t>Preliminary</a:t>
-            </a:r>
-            <a:r>
-              <a:rPr lang="es-MX" dirty="0"/>
-              <a:t> </a:t>
-            </a:r>
-            <a:r>
-              <a:rPr lang="es-MX" dirty="0" err="1"/>
-              <a:t>Results</a:t>
-            </a:r>
-            <a:endParaRPr lang="es-MX" dirty="0"/>
-          </a:p>
-          <a:p>
-            <a:pPr marL="457200" indent="-457200">
-              <a:buFont typeface="+mj-lt"/>
-              <a:buAutoNum type="arabicPeriod"/>
-            </a:pPr>
-            <a:r>
-              <a:rPr lang="es-MX" dirty="0"/>
-              <a:t>Future </a:t>
-            </a:r>
-            <a:r>
-              <a:rPr lang="es-MX" dirty="0" err="1"/>
-              <a:t>work</a:t>
-            </a:r>
-            <a:endParaRPr lang="es-MX" dirty="0"/>
-          </a:p>
-        </p:txBody>
-      </p:sp>
-      <p:sp>
-        <p:nvSpPr>
-          <p:cNvPr id="6" name="Marcador de número de diapositiva 5">
-            <a:extLst>
-              <a:ext uri="{FF2B5EF4-FFF2-40B4-BE49-F238E27FC236}">
-                <a16:creationId xmlns:a16="http://schemas.microsoft.com/office/drawing/2014/main" id="{5870CAD4-BA4A-44EA-B40E-7534B9141ED4}"/>
-              </a:ext>
-            </a:extLst>
-          </p:cNvPr>
-          <p:cNvSpPr>
-            <a:spLocks noGrp="1"/>
-          </p:cNvSpPr>
-          <p:nvPr>
-            <p:ph type="sldNum" sz="quarter" idx="12"/>
-          </p:nvPr>
-        </p:nvSpPr>
-        <p:spPr/>
-        <p:txBody>
-          <a:bodyPr/>
-          <a:lstStyle/>
-          <a:p>
-            <a:fld id="{8593F739-6935-4A8B-A2D0-1ADB6DBDBEE9}" type="slidenum">
-              <a:rPr lang="es-MX" smtClean="0"/>
-              <a:t>2</a:t>
-            </a:fld>
-            <a:endParaRPr lang="es-MX"/>
-          </a:p>
-        </p:txBody>
-      </p:sp>
-    </p:spTree>
-    <p:extLst>
-      <p:ext uri="{BB962C8B-B14F-4D97-AF65-F5344CB8AC3E}">
-        <p14:creationId xmlns:p14="http://schemas.microsoft.com/office/powerpoint/2010/main" val="863121660"/>
-      </p:ext>
-    </p:extLst>
-  </p:cSld>
-  <p:clrMapOvr>
-    <a:masterClrMapping/>
-  </p:clrMapOvr>
-</p:sld>
-</file>
-
-<file path=ppt/slides/slide20.xml><?xml version="1.0" encoding="utf-8"?>
+<file path=ppt/slides/slide21.xml><?xml version="1.0" encoding="utf-8"?>
 <p:sld xmlns:a="http://schemas.openxmlformats.org/drawingml/2006/main" xmlns:r="http://schemas.openxmlformats.org/officeDocument/2006/relationships" xmlns:p="http://schemas.openxmlformats.org/presentationml/2006/main">
   <p:cSld>
     <p:bg>
@@ -16053,15 +19545,20 @@
           <p:nvPr/>
         </p:nvPicPr>
         <p:blipFill>
-          <a:blip r:embed="rId2"/>
-          <a:stretch>
-            <a:fillRect/>
-          </a:stretch>
+          <a:blip r:embed="rId2">
+            <a:extLst>
+              <a:ext uri="{28A0092B-C50C-407E-A947-70E740481C1C}">
+                <a14:useLocalDpi xmlns:a14="http://schemas.microsoft.com/office/drawing/2010/main" val="0"/>
+              </a:ext>
+            </a:extLst>
+          </a:blip>
+          <a:srcRect/>
+          <a:stretch/>
         </p:blipFill>
         <p:spPr>
           <a:xfrm>
-            <a:off x="633999" y="1673481"/>
-            <a:ext cx="6909801" cy="3247606"/>
+            <a:off x="1166493" y="1673481"/>
+            <a:ext cx="5844812" cy="3247606"/>
           </a:xfrm>
           <a:prstGeom prst="rect">
             <a:avLst/>
@@ -16332,7 +19829,7 @@
           <a:p>
             <a:r>
               <a:rPr lang="en-GB" sz="1400" b="1" dirty="0"/>
-              <a:t>Figure 8. </a:t>
+              <a:t>Figure 9. </a:t>
             </a:r>
             <a:r>
               <a:rPr lang="en-GB" sz="1400" dirty="0"/>
@@ -16364,7 +19861,7 @@
           <a:p>
             <a:fld id="{8593F739-6935-4A8B-A2D0-1ADB6DBDBEE9}" type="slidenum">
               <a:rPr lang="es-MX" smtClean="0"/>
-              <a:t>20</a:t>
+              <a:t>21</a:t>
             </a:fld>
             <a:endParaRPr lang="es-MX"/>
           </a:p>
@@ -16383,7 +19880,7 @@
 </p:sld>
 </file>
 
-<file path=ppt/slides/slide21.xml><?xml version="1.0" encoding="utf-8"?>
+<file path=ppt/slides/slide22.xml><?xml version="1.0" encoding="utf-8"?>
 <p:sld xmlns:a="http://schemas.openxmlformats.org/drawingml/2006/main" xmlns:r="http://schemas.openxmlformats.org/officeDocument/2006/relationships" xmlns:p="http://schemas.openxmlformats.org/presentationml/2006/main">
   <p:cSld>
     <p:spTree>
@@ -16577,7 +20074,7 @@
           <a:p>
             <a:fld id="{8593F739-6935-4A8B-A2D0-1ADB6DBDBEE9}" type="slidenum">
               <a:rPr lang="es-MX" smtClean="0"/>
-              <a:t>21</a:t>
+              <a:t>22</a:t>
             </a:fld>
             <a:endParaRPr lang="es-MX"/>
           </a:p>
@@ -16596,7 +20093,7 @@
 </p:sld>
 </file>
 
-<file path=ppt/slides/slide22.xml><?xml version="1.0" encoding="utf-8"?>
+<file path=ppt/slides/slide23.xml><?xml version="1.0" encoding="utf-8"?>
 <p:sld xmlns:a="http://schemas.openxmlformats.org/drawingml/2006/main" xmlns:r="http://schemas.openxmlformats.org/officeDocument/2006/relationships" xmlns:p="http://schemas.openxmlformats.org/presentationml/2006/main">
   <p:cSld>
     <p:bg>
@@ -16884,7 +20381,7 @@
           <a:p>
             <a:fld id="{8593F739-6935-4A8B-A2D0-1ADB6DBDBEE9}" type="slidenum">
               <a:rPr lang="es-MX" smtClean="0"/>
-              <a:t>22</a:t>
+              <a:t>23</a:t>
             </a:fld>
             <a:endParaRPr lang="es-MX"/>
           </a:p>
@@ -16903,7 +20400,7 @@
 </p:sld>
 </file>
 
-<file path=ppt/slides/slide23.xml><?xml version="1.0" encoding="utf-8"?>
+<file path=ppt/slides/slide24.xml><?xml version="1.0" encoding="utf-8"?>
 <p:sld xmlns:a="http://schemas.openxmlformats.org/drawingml/2006/main" xmlns:r="http://schemas.openxmlformats.org/officeDocument/2006/relationships" xmlns:p="http://schemas.openxmlformats.org/presentationml/2006/main">
   <p:cSld>
     <p:spTree>
@@ -17675,7 +21172,7 @@
           <a:p>
             <a:fld id="{8593F739-6935-4A8B-A2D0-1ADB6DBDBEE9}" type="slidenum">
               <a:rPr lang="es-MX" smtClean="0"/>
-              <a:t>23</a:t>
+              <a:t>24</a:t>
             </a:fld>
             <a:endParaRPr lang="es-MX"/>
           </a:p>
@@ -17685,319 +21182,6 @@
     <p:extLst>
       <p:ext uri="{BB962C8B-B14F-4D97-AF65-F5344CB8AC3E}">
         <p14:creationId xmlns:p14="http://schemas.microsoft.com/office/powerpoint/2010/main" val="2085892425"/>
-      </p:ext>
-    </p:extLst>
-  </p:cSld>
-  <p:clrMapOvr>
-    <a:masterClrMapping/>
-  </p:clrMapOvr>
-</p:sld>
-</file>
-
-<file path=ppt/slides/slide24.xml><?xml version="1.0" encoding="utf-8"?>
-<p:sld xmlns:a="http://schemas.openxmlformats.org/drawingml/2006/main" xmlns:r="http://schemas.openxmlformats.org/officeDocument/2006/relationships" xmlns:p="http://schemas.openxmlformats.org/presentationml/2006/main" show="0">
-  <p:cSld>
-    <p:spTree>
-      <p:nvGrpSpPr>
-        <p:cNvPr id="1" name=""/>
-        <p:cNvGrpSpPr/>
-        <p:nvPr/>
-      </p:nvGrpSpPr>
-      <p:grpSpPr>
-        <a:xfrm>
-          <a:off x="0" y="0"/>
-          <a:ext cx="0" cy="0"/>
-          <a:chOff x="0" y="0"/>
-          <a:chExt cx="0" cy="0"/>
-        </a:xfrm>
-      </p:grpSpPr>
-      <p:sp>
-        <p:nvSpPr>
-          <p:cNvPr id="2" name="Título 1">
-            <a:extLst>
-              <a:ext uri="{FF2B5EF4-FFF2-40B4-BE49-F238E27FC236}">
-                <a16:creationId xmlns:a16="http://schemas.microsoft.com/office/drawing/2014/main" id="{84346242-6B4A-49E7-8121-22B27892EFD9}"/>
-              </a:ext>
-            </a:extLst>
-          </p:cNvPr>
-          <p:cNvSpPr>
-            <a:spLocks noGrp="1"/>
-          </p:cNvSpPr>
-          <p:nvPr>
-            <p:ph type="title"/>
-          </p:nvPr>
-        </p:nvSpPr>
-        <p:spPr/>
-        <p:txBody>
-          <a:bodyPr/>
-          <a:lstStyle/>
-          <a:p>
-            <a:r>
-              <a:rPr lang="en-GB" dirty="0"/>
-              <a:t>Introduction</a:t>
-            </a:r>
-          </a:p>
-        </p:txBody>
-      </p:sp>
-      <p:sp>
-        <p:nvSpPr>
-          <p:cNvPr id="3" name="Marcador de contenido 2">
-            <a:extLst>
-              <a:ext uri="{FF2B5EF4-FFF2-40B4-BE49-F238E27FC236}">
-                <a16:creationId xmlns:a16="http://schemas.microsoft.com/office/drawing/2014/main" id="{3A3E20C4-63B2-4EB5-BC58-B400E31ACD87}"/>
-              </a:ext>
-            </a:extLst>
-          </p:cNvPr>
-          <p:cNvSpPr>
-            <a:spLocks noGrp="1"/>
-          </p:cNvSpPr>
-          <p:nvPr>
-            <p:ph idx="1"/>
-          </p:nvPr>
-        </p:nvSpPr>
-        <p:spPr>
-          <a:xfrm>
-            <a:off x="1097280" y="1845733"/>
-            <a:ext cx="3856460" cy="4111184"/>
-          </a:xfrm>
-        </p:spPr>
-        <p:txBody>
-          <a:bodyPr/>
-          <a:lstStyle/>
-          <a:p>
-            <a:r>
-              <a:rPr lang="en-GB" dirty="0"/>
-              <a:t>Fluid-Structure Interaction (FSI) is a key feature in aircraft design.</a:t>
-            </a:r>
-          </a:p>
-          <a:p>
-            <a:r>
-              <a:rPr lang="en-GB" dirty="0"/>
-              <a:t>Failing to consider FSI effects can be catastrophic: </a:t>
-            </a:r>
-          </a:p>
-          <a:p>
-            <a:pPr lvl="1"/>
-            <a:r>
-              <a:rPr lang="en-GB" dirty="0"/>
-              <a:t>Flutter (Dynamic)</a:t>
-            </a:r>
-          </a:p>
-          <a:p>
-            <a:pPr lvl="1"/>
-            <a:r>
-              <a:rPr lang="en-GB" dirty="0"/>
-              <a:t>Buffeting (Dynamic)</a:t>
-            </a:r>
-          </a:p>
-          <a:p>
-            <a:pPr lvl="1"/>
-            <a:r>
-              <a:rPr lang="en-GB" dirty="0"/>
-              <a:t>Divergence (Static)</a:t>
-            </a:r>
-          </a:p>
-          <a:p>
-            <a:pPr lvl="1"/>
-            <a:r>
-              <a:rPr lang="en-GB" dirty="0"/>
-              <a:t>Control reversal (Static) </a:t>
-            </a:r>
-          </a:p>
-          <a:p>
-            <a:endParaRPr lang="en-GB" dirty="0"/>
-          </a:p>
-          <a:p>
-            <a:endParaRPr lang="en-GB" dirty="0"/>
-          </a:p>
-          <a:p>
-            <a:endParaRPr lang="es-MX" dirty="0"/>
-          </a:p>
-        </p:txBody>
-      </p:sp>
-      <p:pic>
-        <p:nvPicPr>
-          <p:cNvPr id="6" name="Imagen 5">
-            <a:extLst>
-              <a:ext uri="{FF2B5EF4-FFF2-40B4-BE49-F238E27FC236}">
-                <a16:creationId xmlns:a16="http://schemas.microsoft.com/office/drawing/2014/main" id="{CD531491-8100-42EA-8941-0D6B99EDA875}"/>
-              </a:ext>
-            </a:extLst>
-          </p:cNvPr>
-          <p:cNvPicPr>
-            <a:picLocks noChangeAspect="1"/>
-          </p:cNvPicPr>
-          <p:nvPr/>
-        </p:nvPicPr>
-        <p:blipFill>
-          <a:blip r:embed="rId2"/>
-          <a:stretch>
-            <a:fillRect/>
-          </a:stretch>
-        </p:blipFill>
-        <p:spPr>
-          <a:xfrm>
-            <a:off x="5742818" y="1845734"/>
-            <a:ext cx="5469665" cy="3408857"/>
-          </a:xfrm>
-          <a:prstGeom prst="rect">
-            <a:avLst/>
-          </a:prstGeom>
-        </p:spPr>
-      </p:pic>
-      <p:sp>
-        <p:nvSpPr>
-          <p:cNvPr id="7" name="CuadroTexto 6">
-            <a:extLst>
-              <a:ext uri="{FF2B5EF4-FFF2-40B4-BE49-F238E27FC236}">
-                <a16:creationId xmlns:a16="http://schemas.microsoft.com/office/drawing/2014/main" id="{D9B80356-878C-4E9A-B525-ED34BD2EDDF6}"/>
-              </a:ext>
-            </a:extLst>
-          </p:cNvPr>
-          <p:cNvSpPr txBox="1"/>
-          <p:nvPr/>
-        </p:nvSpPr>
-        <p:spPr>
-          <a:xfrm>
-            <a:off x="5742818" y="5254591"/>
-            <a:ext cx="5412862" cy="307777"/>
-          </a:xfrm>
-          <a:prstGeom prst="rect">
-            <a:avLst/>
-          </a:prstGeom>
-          <a:noFill/>
-        </p:spPr>
-        <p:txBody>
-          <a:bodyPr wrap="square" rtlCol="0">
-            <a:spAutoFit/>
-          </a:bodyPr>
-          <a:lstStyle/>
-          <a:p>
-            <a:r>
-              <a:rPr lang="en-GB" sz="1400" b="1" dirty="0"/>
-              <a:t>Figure 1. </a:t>
-            </a:r>
-            <a:r>
-              <a:rPr lang="en-GB" sz="1400" dirty="0"/>
-              <a:t>FSI schematic on an </a:t>
-            </a:r>
-            <a:r>
-              <a:rPr lang="en-GB" sz="1400" dirty="0" err="1"/>
-              <a:t>airfoil</a:t>
-            </a:r>
-            <a:r>
-              <a:rPr lang="en-GB" sz="1400" dirty="0"/>
-              <a:t>. </a:t>
-            </a:r>
-            <a:r>
-              <a:rPr lang="en-GB" sz="1400" i="1" dirty="0">
-                <a:hlinkClick r:id="rId3" action="ppaction://hlinksldjump"/>
-              </a:rPr>
-              <a:t>[1] </a:t>
-            </a:r>
-            <a:r>
-              <a:rPr lang="en-GB" sz="1400" i="1" dirty="0" err="1"/>
-              <a:t>Dugeai</a:t>
-            </a:r>
-            <a:r>
-              <a:rPr lang="en-GB" sz="1400" i="1" dirty="0"/>
-              <a:t>, ONERA/DADS</a:t>
-            </a:r>
-          </a:p>
-        </p:txBody>
-      </p:sp>
-      <p:sp>
-        <p:nvSpPr>
-          <p:cNvPr id="8" name="Marcador de número de diapositiva 7">
-            <a:extLst>
-              <a:ext uri="{FF2B5EF4-FFF2-40B4-BE49-F238E27FC236}">
-                <a16:creationId xmlns:a16="http://schemas.microsoft.com/office/drawing/2014/main" id="{BFC3A3B9-3F37-49A2-939F-3CCE0B154ED2}"/>
-              </a:ext>
-            </a:extLst>
-          </p:cNvPr>
-          <p:cNvSpPr>
-            <a:spLocks noGrp="1"/>
-          </p:cNvSpPr>
-          <p:nvPr>
-            <p:ph type="sldNum" sz="quarter" idx="12"/>
-          </p:nvPr>
-        </p:nvSpPr>
-        <p:spPr/>
-        <p:txBody>
-          <a:bodyPr/>
-          <a:lstStyle/>
-          <a:p>
-            <a:fld id="{8593F739-6935-4A8B-A2D0-1ADB6DBDBEE9}" type="slidenum">
-              <a:rPr lang="es-MX" smtClean="0"/>
-              <a:t>24</a:t>
-            </a:fld>
-            <a:endParaRPr lang="es-MX"/>
-          </a:p>
-        </p:txBody>
-      </p:sp>
-      <p:sp>
-        <p:nvSpPr>
-          <p:cNvPr id="9" name="CuadroTexto 8">
-            <a:extLst>
-              <a:ext uri="{FF2B5EF4-FFF2-40B4-BE49-F238E27FC236}">
-                <a16:creationId xmlns:a16="http://schemas.microsoft.com/office/drawing/2014/main" id="{51B77DC4-0859-48E8-894A-5D14AB6F3D1F}"/>
-              </a:ext>
-            </a:extLst>
-          </p:cNvPr>
-          <p:cNvSpPr txBox="1"/>
-          <p:nvPr/>
-        </p:nvSpPr>
-        <p:spPr>
-          <a:xfrm>
-            <a:off x="87312" y="5787640"/>
-            <a:ext cx="9953815" cy="646331"/>
-          </a:xfrm>
-          <a:prstGeom prst="rect">
-            <a:avLst/>
-          </a:prstGeom>
-          <a:noFill/>
-        </p:spPr>
-        <p:txBody>
-          <a:bodyPr wrap="none" rtlCol="0">
-            <a:spAutoFit/>
-          </a:bodyPr>
-          <a:lstStyle/>
-          <a:p>
-            <a:r>
-              <a:rPr lang="en-GB" dirty="0"/>
-              <a:t>[1] </a:t>
-            </a:r>
-            <a:r>
-              <a:rPr lang="en-GB" dirty="0" err="1"/>
-              <a:t>Dugeai</a:t>
-            </a:r>
-            <a:r>
-              <a:rPr lang="en-GB" dirty="0"/>
-              <a:t>, A. (2018). Aeroelasticity Phenomena and basics on numerical modelling. </a:t>
-            </a:r>
-            <a:r>
-              <a:rPr lang="en-GB" i="1" dirty="0"/>
-              <a:t>ONERA/DADS, </a:t>
-            </a:r>
-            <a:r>
-              <a:rPr lang="en-GB" dirty="0"/>
-              <a:t>7-10</a:t>
-            </a:r>
-            <a:r>
-              <a:rPr lang="en-GB" i="1" dirty="0"/>
-              <a:t>.</a:t>
-            </a:r>
-            <a:endParaRPr lang="en-GB" dirty="0"/>
-          </a:p>
-          <a:p>
-            <a:endParaRPr lang="es-MX" dirty="0"/>
-          </a:p>
-        </p:txBody>
-      </p:sp>
-    </p:spTree>
-    <p:extLst>
-      <p:ext uri="{BB962C8B-B14F-4D97-AF65-F5344CB8AC3E}">
-        <p14:creationId xmlns:p14="http://schemas.microsoft.com/office/powerpoint/2010/main" val="1749888668"/>
       </p:ext>
     </p:extLst>
   </p:cSld>
@@ -21294,10 +24478,10 @@
       </p:sp>
       <p:sp>
         <p:nvSpPr>
-          <p:cNvPr id="4" name="CuadroTexto 3">
+          <p:cNvPr id="7" name="CuadroTexto 5">
             <a:extLst>
               <a:ext uri="{FF2B5EF4-FFF2-40B4-BE49-F238E27FC236}">
-                <a16:creationId xmlns:a16="http://schemas.microsoft.com/office/drawing/2014/main" id="{7FAB7C3B-7DEB-4961-BF7A-ECE23484ABD8}"/>
+                <a16:creationId xmlns:a16="http://schemas.microsoft.com/office/drawing/2014/main" id="{F0E4CD0A-EBDB-4D85-B14E-A97722A08A2D}"/>
               </a:ext>
             </a:extLst>
           </p:cNvPr>
@@ -21306,8 +24490,8 @@
         </p:nvSpPr>
         <p:spPr>
           <a:xfrm>
-            <a:off x="9618135" y="5951569"/>
-            <a:ext cx="2095445" cy="369332"/>
+            <a:off x="8124213" y="5961595"/>
+            <a:ext cx="3937488" cy="369332"/>
           </a:xfrm>
           <a:prstGeom prst="rect">
             <a:avLst/>
@@ -21315,7 +24499,7 @@
           <a:noFill/>
         </p:spPr>
         <p:txBody>
-          <a:bodyPr wrap="none" rtlCol="0">
+          <a:bodyPr wrap="none" rtlCol="0" anchor="t">
             <a:spAutoFit/>
           </a:bodyPr>
           <a:lstStyle/>
@@ -21324,11 +24508,27 @@
               <a:rPr lang="es-MX" i="1" dirty="0">
                 <a:hlinkClick r:id="rId3" action="ppaction://hlinksldjump"/>
               </a:rPr>
-              <a:t>[9]</a:t>
+              <a:t>[2]</a:t>
             </a:r>
             <a:r>
               <a:rPr lang="es-MX" i="1" dirty="0"/>
-              <a:t> Zhang et al. AIAA</a:t>
+              <a:t> Forrester et al. </a:t>
+            </a:r>
+            <a:r>
+              <a:rPr lang="es-MX" i="1" dirty="0" err="1"/>
+              <a:t>Proc</a:t>
+            </a:r>
+            <a:r>
+              <a:rPr lang="es-MX" i="1" dirty="0"/>
+              <a:t>. Royal Soc. </a:t>
+            </a:r>
+            <a:r>
+              <a:rPr lang="es-MX" i="1" dirty="0" err="1"/>
+              <a:t>Lond</a:t>
+            </a:r>
+            <a:r>
+              <a:rPr lang="es-MX" i="1" dirty="0"/>
+              <a:t>.</a:t>
             </a:r>
           </a:p>
         </p:txBody>
@@ -21857,8 +25057,8 @@
         </p:nvSpPr>
         <p:spPr>
           <a:xfrm>
-            <a:off x="9618135" y="5951569"/>
-            <a:ext cx="2095445" cy="369332"/>
+            <a:off x="8124214" y="5961595"/>
+            <a:ext cx="3937488" cy="369332"/>
           </a:xfrm>
           <a:prstGeom prst="rect">
             <a:avLst/>
@@ -21866,7 +25066,7 @@
           <a:noFill/>
         </p:spPr>
         <p:txBody>
-          <a:bodyPr wrap="none" rtlCol="0">
+          <a:bodyPr wrap="none" rtlCol="0" anchor="t">
             <a:spAutoFit/>
           </a:bodyPr>
           <a:lstStyle/>
@@ -21875,11 +25075,27 @@
               <a:rPr lang="es-MX" i="1" dirty="0">
                 <a:hlinkClick r:id="rId3" action="ppaction://hlinksldjump"/>
               </a:rPr>
-              <a:t>[9]</a:t>
+              <a:t>[2]</a:t>
             </a:r>
             <a:r>
               <a:rPr lang="es-MX" i="1" dirty="0"/>
-              <a:t> Zhang et al. AIAA</a:t>
+              <a:t> Forrester et al. </a:t>
+            </a:r>
+            <a:r>
+              <a:rPr lang="es-MX" i="1" dirty="0" err="1"/>
+              <a:t>Proc</a:t>
+            </a:r>
+            <a:r>
+              <a:rPr lang="es-MX" i="1" dirty="0"/>
+              <a:t>. Royal Soc. </a:t>
+            </a:r>
+            <a:r>
+              <a:rPr lang="es-MX" i="1" dirty="0" err="1"/>
+              <a:t>Lond</a:t>
+            </a:r>
+            <a:r>
+              <a:rPr lang="es-MX" i="1" dirty="0"/>
+              <a:t>.</a:t>
             </a:r>
           </a:p>
         </p:txBody>

</xml_diff>